<commit_message>
fixed cpx pin diagram
</commit_message>
<xml_diff>
--- a/cpx/CPX.pptx
+++ b/cpx/CPX.pptx
@@ -5,7 +5,7 @@
     <p:sldMasterId id="2147483648" r:id="rId1"/>
   </p:sldMasterIdLst>
   <p:notesMasterIdLst>
-    <p:notesMasterId r:id="rId17"/>
+    <p:notesMasterId r:id="rId18"/>
   </p:notesMasterIdLst>
   <p:sldIdLst>
     <p:sldId id="256" r:id="rId2"/>
@@ -22,7 +22,8 @@
     <p:sldId id="270" r:id="rId13"/>
     <p:sldId id="267" r:id="rId14"/>
     <p:sldId id="269" r:id="rId15"/>
-    <p:sldId id="264" r:id="rId16"/>
+    <p:sldId id="271" r:id="rId16"/>
+    <p:sldId id="264" r:id="rId17"/>
   </p:sldIdLst>
   <p:sldSz cx="12192000" cy="6858000"/>
   <p:notesSz cx="6858000" cy="9144000"/>
@@ -211,7 +212,7 @@
           <a:p>
             <a:fld id="{50945AAA-A64C-433D-AA04-308BEDFA8581}" type="datetimeFigureOut">
               <a:rPr lang="en-US" smtClean="0"/>
-              <a:t>1/12/2023</a:t>
+              <a:t>1/19/2023</a:t>
             </a:fld>
             <a:endParaRPr lang="en-US"/>
           </a:p>
@@ -794,7 +795,7 @@
           <a:p>
             <a:r>
               <a:rPr lang="en-US" dirty="0"/>
-              <a:t>https://krisswanson.blog/2017/05/05/circuit-circuit-a-makey-makey-like-setup-for-the-adafruit-circuit-playground/</a:t>
+              <a:t>https://learn.adafruit.com/adafruit-circuit-playground-express/guided-tour</a:t>
             </a:r>
           </a:p>
         </p:txBody>
@@ -817,6 +818,93 @@
             <a:fld id="{71596CF9-A975-4239-BDE0-B84240AD6B4E}" type="slidenum">
               <a:rPr lang="en-US" smtClean="0"/>
               <a:t>15</a:t>
+            </a:fld>
+            <a:endParaRPr lang="en-US"/>
+          </a:p>
+        </p:txBody>
+      </p:sp>
+    </p:spTree>
+    <p:extLst>
+      <p:ext uri="{BB962C8B-B14F-4D97-AF65-F5344CB8AC3E}">
+        <p14:creationId xmlns:p14="http://schemas.microsoft.com/office/powerpoint/2010/main" val="2830599142"/>
+      </p:ext>
+    </p:extLst>
+  </p:cSld>
+  <p:clrMapOvr>
+    <a:masterClrMapping/>
+  </p:clrMapOvr>
+</p:notes>
+</file>
+
+<file path=ppt/notesSlides/notesSlide13.xml><?xml version="1.0" encoding="utf-8"?>
+<p:notes xmlns:a="http://schemas.openxmlformats.org/drawingml/2006/main" xmlns:r="http://schemas.openxmlformats.org/officeDocument/2006/relationships" xmlns:p="http://schemas.openxmlformats.org/presentationml/2006/main">
+  <p:cSld>
+    <p:spTree>
+      <p:nvGrpSpPr>
+        <p:cNvPr id="1" name=""/>
+        <p:cNvGrpSpPr/>
+        <p:nvPr/>
+      </p:nvGrpSpPr>
+      <p:grpSpPr>
+        <a:xfrm>
+          <a:off x="0" y="0"/>
+          <a:ext cx="0" cy="0"/>
+          <a:chOff x="0" y="0"/>
+          <a:chExt cx="0" cy="0"/>
+        </a:xfrm>
+      </p:grpSpPr>
+      <p:sp>
+        <p:nvSpPr>
+          <p:cNvPr id="2" name="Slide Image Placeholder 1"/>
+          <p:cNvSpPr>
+            <a:spLocks noGrp="1" noRot="1" noChangeAspect="1"/>
+          </p:cNvSpPr>
+          <p:nvPr>
+            <p:ph type="sldImg"/>
+          </p:nvPr>
+        </p:nvSpPr>
+        <p:spPr/>
+      </p:sp>
+      <p:sp>
+        <p:nvSpPr>
+          <p:cNvPr id="3" name="Notes Placeholder 2"/>
+          <p:cNvSpPr>
+            <a:spLocks noGrp="1"/>
+          </p:cNvSpPr>
+          <p:nvPr>
+            <p:ph type="body" idx="1"/>
+          </p:nvPr>
+        </p:nvSpPr>
+        <p:spPr/>
+        <p:txBody>
+          <a:bodyPr/>
+          <a:lstStyle/>
+          <a:p>
+            <a:r>
+              <a:rPr lang="en-US" dirty="0"/>
+              <a:t>https://krisswanson.blog/2017/05/05/circuit-circuit-a-makey-makey-like-setup-for-the-adafruit-circuit-playground/</a:t>
+            </a:r>
+          </a:p>
+        </p:txBody>
+      </p:sp>
+      <p:sp>
+        <p:nvSpPr>
+          <p:cNvPr id="4" name="Slide Number Placeholder 3"/>
+          <p:cNvSpPr>
+            <a:spLocks noGrp="1"/>
+          </p:cNvSpPr>
+          <p:nvPr>
+            <p:ph type="sldNum" sz="quarter" idx="5"/>
+          </p:nvPr>
+        </p:nvSpPr>
+        <p:spPr/>
+        <p:txBody>
+          <a:bodyPr/>
+          <a:lstStyle/>
+          <a:p>
+            <a:fld id="{71596CF9-A975-4239-BDE0-B84240AD6B4E}" type="slidenum">
+              <a:rPr lang="en-US" smtClean="0"/>
+              <a:t>16</a:t>
             </a:fld>
             <a:endParaRPr lang="en-US"/>
           </a:p>
@@ -1678,7 +1766,7 @@
           <a:p>
             <a:fld id="{568E76DE-1A27-4093-8228-AE39B1D03AFB}" type="datetimeFigureOut">
               <a:rPr lang="en-US" smtClean="0"/>
-              <a:t>1/12/2023</a:t>
+              <a:t>1/19/2023</a:t>
             </a:fld>
             <a:endParaRPr lang="en-US"/>
           </a:p>
@@ -1876,7 +1964,7 @@
           <a:p>
             <a:fld id="{568E76DE-1A27-4093-8228-AE39B1D03AFB}" type="datetimeFigureOut">
               <a:rPr lang="en-US" smtClean="0"/>
-              <a:t>1/12/2023</a:t>
+              <a:t>1/19/2023</a:t>
             </a:fld>
             <a:endParaRPr lang="en-US"/>
           </a:p>
@@ -2084,7 +2172,7 @@
           <a:p>
             <a:fld id="{568E76DE-1A27-4093-8228-AE39B1D03AFB}" type="datetimeFigureOut">
               <a:rPr lang="en-US" smtClean="0"/>
-              <a:t>1/12/2023</a:t>
+              <a:t>1/19/2023</a:t>
             </a:fld>
             <a:endParaRPr lang="en-US"/>
           </a:p>
@@ -2282,7 +2370,7 @@
           <a:p>
             <a:fld id="{568E76DE-1A27-4093-8228-AE39B1D03AFB}" type="datetimeFigureOut">
               <a:rPr lang="en-US" smtClean="0"/>
-              <a:t>1/12/2023</a:t>
+              <a:t>1/19/2023</a:t>
             </a:fld>
             <a:endParaRPr lang="en-US"/>
           </a:p>
@@ -2557,7 +2645,7 @@
           <a:p>
             <a:fld id="{568E76DE-1A27-4093-8228-AE39B1D03AFB}" type="datetimeFigureOut">
               <a:rPr lang="en-US" smtClean="0"/>
-              <a:t>1/12/2023</a:t>
+              <a:t>1/19/2023</a:t>
             </a:fld>
             <a:endParaRPr lang="en-US"/>
           </a:p>
@@ -2822,7 +2910,7 @@
           <a:p>
             <a:fld id="{568E76DE-1A27-4093-8228-AE39B1D03AFB}" type="datetimeFigureOut">
               <a:rPr lang="en-US" smtClean="0"/>
-              <a:t>1/12/2023</a:t>
+              <a:t>1/19/2023</a:t>
             </a:fld>
             <a:endParaRPr lang="en-US"/>
           </a:p>
@@ -3234,7 +3322,7 @@
           <a:p>
             <a:fld id="{568E76DE-1A27-4093-8228-AE39B1D03AFB}" type="datetimeFigureOut">
               <a:rPr lang="en-US" smtClean="0"/>
-              <a:t>1/12/2023</a:t>
+              <a:t>1/19/2023</a:t>
             </a:fld>
             <a:endParaRPr lang="en-US"/>
           </a:p>
@@ -3375,7 +3463,7 @@
           <a:p>
             <a:fld id="{568E76DE-1A27-4093-8228-AE39B1D03AFB}" type="datetimeFigureOut">
               <a:rPr lang="en-US" smtClean="0"/>
-              <a:t>1/12/2023</a:t>
+              <a:t>1/19/2023</a:t>
             </a:fld>
             <a:endParaRPr lang="en-US"/>
           </a:p>
@@ -3488,7 +3576,7 @@
           <a:p>
             <a:fld id="{568E76DE-1A27-4093-8228-AE39B1D03AFB}" type="datetimeFigureOut">
               <a:rPr lang="en-US" smtClean="0"/>
-              <a:t>1/12/2023</a:t>
+              <a:t>1/19/2023</a:t>
             </a:fld>
             <a:endParaRPr lang="en-US"/>
           </a:p>
@@ -3799,7 +3887,7 @@
           <a:p>
             <a:fld id="{568E76DE-1A27-4093-8228-AE39B1D03AFB}" type="datetimeFigureOut">
               <a:rPr lang="en-US" smtClean="0"/>
-              <a:t>1/12/2023</a:t>
+              <a:t>1/19/2023</a:t>
             </a:fld>
             <a:endParaRPr lang="en-US"/>
           </a:p>
@@ -4087,7 +4175,7 @@
           <a:p>
             <a:fld id="{568E76DE-1A27-4093-8228-AE39B1D03AFB}" type="datetimeFigureOut">
               <a:rPr lang="en-US" smtClean="0"/>
-              <a:t>1/12/2023</a:t>
+              <a:t>1/19/2023</a:t>
             </a:fld>
             <a:endParaRPr lang="en-US"/>
           </a:p>
@@ -4328,7 +4416,7 @@
           <a:p>
             <a:fld id="{568E76DE-1A27-4093-8228-AE39B1D03AFB}" type="datetimeFigureOut">
               <a:rPr lang="en-US" smtClean="0"/>
-              <a:t>1/12/2023</a:t>
+              <a:t>1/19/2023</a:t>
             </a:fld>
             <a:endParaRPr lang="en-US"/>
           </a:p>
@@ -13544,7 +13632,7 @@
                 </a:solidFill>
                 <a:latin typeface="Segoe Condensed" panose="020B0606040200020203" pitchFamily="34" charset="0"/>
               </a:rPr>
-              <a:t>A5 / D1</a:t>
+              <a:t>A7 / D1</a:t>
             </a:r>
             <a:br>
               <a:rPr lang="en-US" b="1" dirty="0">
@@ -18261,7 +18349,7 @@
                 </a:solidFill>
                 <a:latin typeface="Segoe Condensed" panose="020B0606040200020203" pitchFamily="34" charset="0"/>
               </a:rPr>
-              <a:t>A5 / D1</a:t>
+              <a:t>A7 / D1</a:t>
             </a:r>
             <a:endParaRPr lang="en-US" b="1" baseline="-25000" dirty="0">
               <a:solidFill>
@@ -18334,6 +18422,2448 @@
 </file>
 
 <file path=ppt/slides/slide15.xml><?xml version="1.0" encoding="utf-8"?>
+<p:sld xmlns:a="http://schemas.openxmlformats.org/drawingml/2006/main" xmlns:r="http://schemas.openxmlformats.org/officeDocument/2006/relationships" xmlns:p="http://schemas.openxmlformats.org/presentationml/2006/main">
+  <p:cSld>
+    <p:spTree>
+      <p:nvGrpSpPr>
+        <p:cNvPr id="1" name=""/>
+        <p:cNvGrpSpPr/>
+        <p:nvPr/>
+      </p:nvGrpSpPr>
+      <p:grpSpPr>
+        <a:xfrm>
+          <a:off x="0" y="0"/>
+          <a:ext cx="0" cy="0"/>
+          <a:chOff x="0" y="0"/>
+          <a:chExt cx="0" cy="0"/>
+        </a:xfrm>
+      </p:grpSpPr>
+      <p:pic>
+        <p:nvPicPr>
+          <p:cNvPr id="4" name="Picture 2">
+            <a:extLst>
+              <a:ext uri="{FF2B5EF4-FFF2-40B4-BE49-F238E27FC236}">
+                <a16:creationId xmlns:a16="http://schemas.microsoft.com/office/drawing/2014/main" id="{44461B67-A181-421A-889F-3D02021FFF0C}"/>
+              </a:ext>
+            </a:extLst>
+          </p:cNvPr>
+          <p:cNvPicPr>
+            <a:picLocks noChangeAspect="1" noChangeArrowheads="1"/>
+          </p:cNvPicPr>
+          <p:nvPr/>
+        </p:nvPicPr>
+        <p:blipFill>
+          <a:blip r:embed="rId3">
+            <a:extLst>
+              <a:ext uri="{28A0092B-C50C-407E-A947-70E740481C1C}">
+                <a14:useLocalDpi xmlns:a14="http://schemas.microsoft.com/office/drawing/2010/main" val="0"/>
+              </a:ext>
+            </a:extLst>
+          </a:blip>
+          <a:srcRect/>
+          <a:stretch>
+            <a:fillRect/>
+          </a:stretch>
+        </p:blipFill>
+        <p:spPr bwMode="auto">
+          <a:xfrm>
+            <a:off x="3054909" y="676111"/>
+            <a:ext cx="6096000" cy="6096000"/>
+          </a:xfrm>
+          <a:prstGeom prst="rect">
+            <a:avLst/>
+          </a:prstGeom>
+          <a:noFill/>
+          <a:extLst>
+            <a:ext uri="{909E8E84-426E-40DD-AFC4-6F175D3DCCD1}">
+              <a14:hiddenFill xmlns:a14="http://schemas.microsoft.com/office/drawing/2010/main">
+                <a:solidFill>
+                  <a:srgbClr val="FFFFFF"/>
+                </a:solidFill>
+              </a14:hiddenFill>
+            </a:ext>
+          </a:extLst>
+        </p:spPr>
+      </p:pic>
+      <p:pic>
+        <p:nvPicPr>
+          <p:cNvPr id="44" name="Picture 4">
+            <a:extLst>
+              <a:ext uri="{FF2B5EF4-FFF2-40B4-BE49-F238E27FC236}">
+                <a16:creationId xmlns:a16="http://schemas.microsoft.com/office/drawing/2014/main" id="{DD2F5E64-EE01-40F6-BFD3-EE21CED1CDED}"/>
+              </a:ext>
+            </a:extLst>
+          </p:cNvPr>
+          <p:cNvPicPr>
+            <a:picLocks noChangeAspect="1" noChangeArrowheads="1"/>
+          </p:cNvPicPr>
+          <p:nvPr/>
+        </p:nvPicPr>
+        <p:blipFill>
+          <a:blip r:embed="rId4">
+            <a:extLst>
+              <a:ext uri="{28A0092B-C50C-407E-A947-70E740481C1C}">
+                <a14:useLocalDpi xmlns:a14="http://schemas.microsoft.com/office/drawing/2010/main" val="0"/>
+              </a:ext>
+            </a:extLst>
+          </a:blip>
+          <a:srcRect/>
+          <a:stretch>
+            <a:fillRect/>
+          </a:stretch>
+        </p:blipFill>
+        <p:spPr bwMode="auto">
+          <a:xfrm>
+            <a:off x="3877452" y="1485560"/>
+            <a:ext cx="4406986" cy="4406986"/>
+          </a:xfrm>
+          <a:prstGeom prst="rect">
+            <a:avLst/>
+          </a:prstGeom>
+          <a:noFill/>
+          <a:extLst>
+            <a:ext uri="{909E8E84-426E-40DD-AFC4-6F175D3DCCD1}">
+              <a14:hiddenFill xmlns:a14="http://schemas.microsoft.com/office/drawing/2010/main">
+                <a:solidFill>
+                  <a:srgbClr val="FFFFFF"/>
+                </a:solidFill>
+              </a14:hiddenFill>
+            </a:ext>
+          </a:extLst>
+        </p:spPr>
+      </p:pic>
+      <p:sp>
+        <p:nvSpPr>
+          <p:cNvPr id="2" name="Freeform: Shape 1">
+            <a:extLst>
+              <a:ext uri="{FF2B5EF4-FFF2-40B4-BE49-F238E27FC236}">
+                <a16:creationId xmlns:a16="http://schemas.microsoft.com/office/drawing/2014/main" id="{F2A125A6-4562-4945-58AF-0135A0B97022}"/>
+              </a:ext>
+            </a:extLst>
+          </p:cNvPr>
+          <p:cNvSpPr/>
+          <p:nvPr/>
+        </p:nvSpPr>
+        <p:spPr>
+          <a:xfrm>
+            <a:off x="4230229" y="1789921"/>
+            <a:ext cx="3721608" cy="3721608"/>
+          </a:xfrm>
+          <a:custGeom>
+            <a:avLst/>
+            <a:gdLst>
+              <a:gd name="connsiteX0" fmla="*/ 1860804 w 3721608"/>
+              <a:gd name="connsiteY0" fmla="*/ 0 h 3721608"/>
+              <a:gd name="connsiteX1" fmla="*/ 3027130 w 3721608"/>
+              <a:gd name="connsiteY1" fmla="*/ 410798 h 3721608"/>
+              <a:gd name="connsiteX2" fmla="*/ 3170679 w 3721608"/>
+              <a:gd name="connsiteY2" fmla="*/ 542833 h 3721608"/>
+              <a:gd name="connsiteX3" fmla="*/ 3015458 w 3721608"/>
+              <a:gd name="connsiteY3" fmla="*/ 654952 h 3721608"/>
+              <a:gd name="connsiteX4" fmla="*/ 2995668 w 3721608"/>
+              <a:gd name="connsiteY4" fmla="*/ 669247 h 3721608"/>
+              <a:gd name="connsiteX5" fmla="*/ 2996856 w 3721608"/>
+              <a:gd name="connsiteY5" fmla="*/ 670892 h 3721608"/>
+              <a:gd name="connsiteX6" fmla="*/ 2976925 w 3721608"/>
+              <a:gd name="connsiteY6" fmla="*/ 687970 h 3721608"/>
+              <a:gd name="connsiteX7" fmla="*/ 2933190 w 3721608"/>
+              <a:gd name="connsiteY7" fmla="*/ 969591 h 3721608"/>
+              <a:gd name="connsiteX8" fmla="*/ 3214287 w 3721608"/>
+              <a:gd name="connsiteY8" fmla="*/ 1016582 h 3721608"/>
+              <a:gd name="connsiteX9" fmla="*/ 3236764 w 3721608"/>
+              <a:gd name="connsiteY9" fmla="*/ 1003028 h 3721608"/>
+              <a:gd name="connsiteX10" fmla="*/ 3237952 w 3721608"/>
+              <a:gd name="connsiteY10" fmla="*/ 1004673 h 3721608"/>
+              <a:gd name="connsiteX11" fmla="*/ 3257742 w 3721608"/>
+              <a:gd name="connsiteY11" fmla="*/ 990378 h 3721608"/>
+              <a:gd name="connsiteX12" fmla="*/ 3429168 w 3721608"/>
+              <a:gd name="connsiteY12" fmla="*/ 866555 h 3721608"/>
+              <a:gd name="connsiteX13" fmla="*/ 3497019 w 3721608"/>
+              <a:gd name="connsiteY13" fmla="*/ 973834 h 3721608"/>
+              <a:gd name="connsiteX14" fmla="*/ 3529588 w 3721608"/>
+              <a:gd name="connsiteY14" fmla="*/ 1041442 h 3721608"/>
+              <a:gd name="connsiteX15" fmla="*/ 3362962 w 3721608"/>
+              <a:gd name="connsiteY15" fmla="*/ 1103515 h 3721608"/>
+              <a:gd name="connsiteX16" fmla="*/ 3340085 w 3721608"/>
+              <a:gd name="connsiteY16" fmla="*/ 1112037 h 3721608"/>
+              <a:gd name="connsiteX17" fmla="*/ 3340794 w 3721608"/>
+              <a:gd name="connsiteY17" fmla="*/ 1113938 h 3721608"/>
+              <a:gd name="connsiteX18" fmla="*/ 3317041 w 3721608"/>
+              <a:gd name="connsiteY18" fmla="*/ 1125107 h 3721608"/>
+              <a:gd name="connsiteX19" fmla="*/ 3200048 w 3721608"/>
+              <a:gd name="connsiteY19" fmla="*/ 1384984 h 3721608"/>
+              <a:gd name="connsiteX20" fmla="*/ 3458554 w 3721608"/>
+              <a:gd name="connsiteY20" fmla="*/ 1504976 h 3721608"/>
+              <a:gd name="connsiteX21" fmla="*/ 3483824 w 3721608"/>
+              <a:gd name="connsiteY21" fmla="*/ 1497882 h 3721608"/>
+              <a:gd name="connsiteX22" fmla="*/ 3484532 w 3721608"/>
+              <a:gd name="connsiteY22" fmla="*/ 1499783 h 3721608"/>
+              <a:gd name="connsiteX23" fmla="*/ 3507410 w 3721608"/>
+              <a:gd name="connsiteY23" fmla="*/ 1491261 h 3721608"/>
+              <a:gd name="connsiteX24" fmla="*/ 3669668 w 3721608"/>
+              <a:gd name="connsiteY24" fmla="*/ 1430815 h 3721608"/>
+              <a:gd name="connsiteX25" fmla="*/ 3683803 w 3721608"/>
+              <a:gd name="connsiteY25" fmla="*/ 1485787 h 3721608"/>
+              <a:gd name="connsiteX26" fmla="*/ 3721608 w 3721608"/>
+              <a:gd name="connsiteY26" fmla="*/ 1860804 h 3721608"/>
+              <a:gd name="connsiteX27" fmla="*/ 3683803 w 3721608"/>
+              <a:gd name="connsiteY27" fmla="*/ 2235821 h 3721608"/>
+              <a:gd name="connsiteX28" fmla="*/ 3668199 w 3721608"/>
+              <a:gd name="connsiteY28" fmla="*/ 2296507 h 3721608"/>
+              <a:gd name="connsiteX29" fmla="*/ 3521153 w 3721608"/>
+              <a:gd name="connsiteY29" fmla="*/ 2233674 h 3721608"/>
+              <a:gd name="connsiteX30" fmla="*/ 3498704 w 3721608"/>
+              <a:gd name="connsiteY30" fmla="*/ 2224081 h 3721608"/>
+              <a:gd name="connsiteX31" fmla="*/ 3497907 w 3721608"/>
+              <a:gd name="connsiteY31" fmla="*/ 2225947 h 3721608"/>
+              <a:gd name="connsiteX32" fmla="*/ 3472999 w 3721608"/>
+              <a:gd name="connsiteY32" fmla="*/ 2217668 h 3721608"/>
+              <a:gd name="connsiteX33" fmla="*/ 3209118 w 3721608"/>
+              <a:gd name="connsiteY33" fmla="*/ 2325326 h 3721608"/>
+              <a:gd name="connsiteX34" fmla="*/ 3313715 w 3721608"/>
+              <a:gd name="connsiteY34" fmla="*/ 2590435 h 3721608"/>
+              <a:gd name="connsiteX35" fmla="*/ 3336914 w 3721608"/>
+              <a:gd name="connsiteY35" fmla="*/ 2602712 h 3721608"/>
+              <a:gd name="connsiteX36" fmla="*/ 3336117 w 3721608"/>
+              <a:gd name="connsiteY36" fmla="*/ 2604578 h 3721608"/>
+              <a:gd name="connsiteX37" fmla="*/ 3358566 w 3721608"/>
+              <a:gd name="connsiteY37" fmla="*/ 2614170 h 3721608"/>
+              <a:gd name="connsiteX38" fmla="*/ 3526758 w 3721608"/>
+              <a:gd name="connsiteY38" fmla="*/ 2686039 h 3721608"/>
+              <a:gd name="connsiteX39" fmla="*/ 3497019 w 3721608"/>
+              <a:gd name="connsiteY39" fmla="*/ 2747774 h 3721608"/>
+              <a:gd name="connsiteX40" fmla="*/ 1860804 w 3721608"/>
+              <a:gd name="connsiteY40" fmla="*/ 3721608 h 3721608"/>
+              <a:gd name="connsiteX41" fmla="*/ 694478 w 3721608"/>
+              <a:gd name="connsiteY41" fmla="*/ 3310810 h 3721608"/>
+              <a:gd name="connsiteX42" fmla="*/ 623876 w 3721608"/>
+              <a:gd name="connsiteY42" fmla="*/ 3245871 h 3721608"/>
+              <a:gd name="connsiteX43" fmla="*/ 634440 w 3721608"/>
+              <a:gd name="connsiteY43" fmla="*/ 3238490 h 3721608"/>
+              <a:gd name="connsiteX44" fmla="*/ 654452 w 3721608"/>
+              <a:gd name="connsiteY44" fmla="*/ 3224507 h 3721608"/>
+              <a:gd name="connsiteX45" fmla="*/ 653290 w 3721608"/>
+              <a:gd name="connsiteY45" fmla="*/ 3222845 h 3721608"/>
+              <a:gd name="connsiteX46" fmla="*/ 663375 w 3721608"/>
+              <a:gd name="connsiteY46" fmla="*/ 3214474 h 3721608"/>
+              <a:gd name="connsiteX47" fmla="*/ 701524 w 3721608"/>
+              <a:gd name="connsiteY47" fmla="*/ 3219549 h 3721608"/>
+              <a:gd name="connsiteX48" fmla="*/ 832378 w 3721608"/>
+              <a:gd name="connsiteY48" fmla="*/ 3179629 h 3721608"/>
+              <a:gd name="connsiteX49" fmla="*/ 850515 w 3721608"/>
+              <a:gd name="connsiteY49" fmla="*/ 2821920 h 3721608"/>
+              <a:gd name="connsiteX50" fmla="*/ 501609 w 3721608"/>
+              <a:gd name="connsiteY50" fmla="*/ 2740993 h 3721608"/>
+              <a:gd name="connsiteX51" fmla="*/ 427245 w 3721608"/>
+              <a:gd name="connsiteY51" fmla="*/ 2855825 h 3721608"/>
+              <a:gd name="connsiteX52" fmla="*/ 423031 w 3721608"/>
+              <a:gd name="connsiteY52" fmla="*/ 2884420 h 3721608"/>
+              <a:gd name="connsiteX53" fmla="*/ 418630 w 3721608"/>
+              <a:gd name="connsiteY53" fmla="*/ 2886980 h 3721608"/>
+              <a:gd name="connsiteX54" fmla="*/ 417468 w 3721608"/>
+              <a:gd name="connsiteY54" fmla="*/ 2885317 h 3721608"/>
+              <a:gd name="connsiteX55" fmla="*/ 397455 w 3721608"/>
+              <a:gd name="connsiteY55" fmla="*/ 2899299 h 3721608"/>
+              <a:gd name="connsiteX56" fmla="*/ 344031 w 3721608"/>
+              <a:gd name="connsiteY56" fmla="*/ 2936625 h 3721608"/>
+              <a:gd name="connsiteX57" fmla="*/ 224589 w 3721608"/>
+              <a:gd name="connsiteY57" fmla="*/ 2747774 h 3721608"/>
+              <a:gd name="connsiteX58" fmla="*/ 208466 w 3721608"/>
+              <a:gd name="connsiteY58" fmla="*/ 2714304 h 3721608"/>
+              <a:gd name="connsiteX59" fmla="*/ 236707 w 3721608"/>
+              <a:gd name="connsiteY59" fmla="*/ 2703546 h 3721608"/>
+              <a:gd name="connsiteX60" fmla="*/ 259520 w 3721608"/>
+              <a:gd name="connsiteY60" fmla="*/ 2694854 h 3721608"/>
+              <a:gd name="connsiteX61" fmla="*/ 258798 w 3721608"/>
+              <a:gd name="connsiteY61" fmla="*/ 2692959 h 3721608"/>
+              <a:gd name="connsiteX62" fmla="*/ 270617 w 3721608"/>
+              <a:gd name="connsiteY62" fmla="*/ 2687294 h 3721608"/>
+              <a:gd name="connsiteX63" fmla="*/ 306383 w 3721608"/>
+              <a:gd name="connsiteY63" fmla="*/ 2701501 h 3721608"/>
+              <a:gd name="connsiteX64" fmla="*/ 443018 w 3721608"/>
+              <a:gd name="connsiteY64" fmla="*/ 2694629 h 3721608"/>
+              <a:gd name="connsiteX65" fmla="*/ 547670 w 3721608"/>
+              <a:gd name="connsiteY65" fmla="*/ 2352090 h 3721608"/>
+              <a:gd name="connsiteX66" fmla="*/ 228951 w 3721608"/>
+              <a:gd name="connsiteY66" fmla="*/ 2188679 h 3721608"/>
+              <a:gd name="connsiteX67" fmla="*/ 128876 w 3721608"/>
+              <a:gd name="connsiteY67" fmla="*/ 2281959 h 3721608"/>
+              <a:gd name="connsiteX68" fmla="*/ 117829 w 3721608"/>
+              <a:gd name="connsiteY68" fmla="*/ 2308669 h 3721608"/>
+              <a:gd name="connsiteX69" fmla="*/ 112937 w 3721608"/>
+              <a:gd name="connsiteY69" fmla="*/ 2310081 h 3721608"/>
+              <a:gd name="connsiteX70" fmla="*/ 112215 w 3721608"/>
+              <a:gd name="connsiteY70" fmla="*/ 2308185 h 3721608"/>
+              <a:gd name="connsiteX71" fmla="*/ 89401 w 3721608"/>
+              <a:gd name="connsiteY71" fmla="*/ 2316876 h 3721608"/>
+              <a:gd name="connsiteX72" fmla="*/ 61390 w 3721608"/>
+              <a:gd name="connsiteY72" fmla="*/ 2327547 h 3721608"/>
+              <a:gd name="connsiteX73" fmla="*/ 37805 w 3721608"/>
+              <a:gd name="connsiteY73" fmla="*/ 2235821 h 3721608"/>
+              <a:gd name="connsiteX74" fmla="*/ 0 w 3721608"/>
+              <a:gd name="connsiteY74" fmla="*/ 1860804 h 3721608"/>
+              <a:gd name="connsiteX75" fmla="*/ 14951 w 3721608"/>
+              <a:gd name="connsiteY75" fmla="*/ 1623806 h 3721608"/>
+              <a:gd name="connsiteX76" fmla="*/ 47671 w 3721608"/>
+              <a:gd name="connsiteY76" fmla="*/ 1452795 h 3721608"/>
+              <a:gd name="connsiteX77" fmla="*/ 92757 w 3721608"/>
+              <a:gd name="connsiteY77" fmla="*/ 1468349 h 3721608"/>
+              <a:gd name="connsiteX78" fmla="*/ 115836 w 3721608"/>
+              <a:gd name="connsiteY78" fmla="*/ 1476310 h 3721608"/>
+              <a:gd name="connsiteX79" fmla="*/ 116497 w 3721608"/>
+              <a:gd name="connsiteY79" fmla="*/ 1474392 h 3721608"/>
+              <a:gd name="connsiteX80" fmla="*/ 129198 w 3721608"/>
+              <a:gd name="connsiteY80" fmla="*/ 1477625 h 3721608"/>
+              <a:gd name="connsiteX81" fmla="*/ 147531 w 3721608"/>
+              <a:gd name="connsiteY81" fmla="*/ 1511463 h 3721608"/>
+              <a:gd name="connsiteX82" fmla="*/ 256778 w 3721608"/>
+              <a:gd name="connsiteY82" fmla="*/ 1593813 h 3721608"/>
+              <a:gd name="connsiteX83" fmla="*/ 556744 w 3721608"/>
+              <a:gd name="connsiteY83" fmla="*/ 1398096 h 3721608"/>
+              <a:gd name="connsiteX84" fmla="*/ 416986 w 3721608"/>
+              <a:gd name="connsiteY84" fmla="*/ 1068320 h 3721608"/>
+              <a:gd name="connsiteX85" fmla="*/ 280378 w 3721608"/>
+              <a:gd name="connsiteY85" fmla="*/ 1075715 h 3721608"/>
+              <a:gd name="connsiteX86" fmla="*/ 254774 w 3721608"/>
+              <a:gd name="connsiteY86" fmla="*/ 1089126 h 3721608"/>
+              <a:gd name="connsiteX87" fmla="*/ 250114 w 3721608"/>
+              <a:gd name="connsiteY87" fmla="*/ 1087071 h 3721608"/>
+              <a:gd name="connsiteX88" fmla="*/ 250776 w 3721608"/>
+              <a:gd name="connsiteY88" fmla="*/ 1085154 h 3721608"/>
+              <a:gd name="connsiteX89" fmla="*/ 227698 w 3721608"/>
+              <a:gd name="connsiteY89" fmla="*/ 1077192 h 3721608"/>
+              <a:gd name="connsiteX90" fmla="*/ 183472 w 3721608"/>
+              <a:gd name="connsiteY90" fmla="*/ 1061935 h 3721608"/>
+              <a:gd name="connsiteX91" fmla="*/ 224589 w 3721608"/>
+              <a:gd name="connsiteY91" fmla="*/ 973834 h 3721608"/>
+              <a:gd name="connsiteX92" fmla="*/ 282157 w 3721608"/>
+              <a:gd name="connsiteY92" fmla="*/ 879076 h 3721608"/>
+              <a:gd name="connsiteX93" fmla="*/ 343265 w 3721608"/>
+              <a:gd name="connsiteY93" fmla="*/ 915632 h 3721608"/>
+              <a:gd name="connsiteX94" fmla="*/ 364215 w 3721608"/>
+              <a:gd name="connsiteY94" fmla="*/ 928164 h 3721608"/>
+              <a:gd name="connsiteX95" fmla="*/ 365256 w 3721608"/>
+              <a:gd name="connsiteY95" fmla="*/ 926423 h 3721608"/>
+              <a:gd name="connsiteX96" fmla="*/ 377022 w 3721608"/>
+              <a:gd name="connsiteY96" fmla="*/ 932196 h 3721608"/>
+              <a:gd name="connsiteX97" fmla="*/ 388013 w 3721608"/>
+              <a:gd name="connsiteY97" fmla="*/ 969079 h 3721608"/>
+              <a:gd name="connsiteX98" fmla="*/ 478011 w 3721608"/>
+              <a:gd name="connsiteY98" fmla="*/ 1072116 h 3721608"/>
+              <a:gd name="connsiteX99" fmla="*/ 811787 w 3721608"/>
+              <a:gd name="connsiteY99" fmla="*/ 942201 h 3721608"/>
+              <a:gd name="connsiteX100" fmla="*/ 742760 w 3721608"/>
+              <a:gd name="connsiteY100" fmla="*/ 590746 h 3721608"/>
+              <a:gd name="connsiteX101" fmla="*/ 607547 w 3721608"/>
+              <a:gd name="connsiteY101" fmla="*/ 569919 h 3721608"/>
+              <a:gd name="connsiteX102" fmla="*/ 579734 w 3721608"/>
+              <a:gd name="connsiteY102" fmla="*/ 577783 h 3721608"/>
+              <a:gd name="connsiteX103" fmla="*/ 575596 w 3721608"/>
+              <a:gd name="connsiteY103" fmla="*/ 574816 h 3721608"/>
+              <a:gd name="connsiteX104" fmla="*/ 576637 w 3721608"/>
+              <a:gd name="connsiteY104" fmla="*/ 573075 h 3721608"/>
+              <a:gd name="connsiteX105" fmla="*/ 555687 w 3721608"/>
+              <a:gd name="connsiteY105" fmla="*/ 560542 h 3721608"/>
+              <a:gd name="connsiteX106" fmla="*/ 539635 w 3721608"/>
+              <a:gd name="connsiteY106" fmla="*/ 550939 h 3721608"/>
+              <a:gd name="connsiteX107" fmla="*/ 545017 w 3721608"/>
+              <a:gd name="connsiteY107" fmla="*/ 545017 h 3721608"/>
+              <a:gd name="connsiteX108" fmla="*/ 1860804 w 3721608"/>
+              <a:gd name="connsiteY108" fmla="*/ 0 h 3721608"/>
+            </a:gdLst>
+            <a:ahLst/>
+            <a:cxnLst>
+              <a:cxn ang="0">
+                <a:pos x="connsiteX0" y="connsiteY0"/>
+              </a:cxn>
+              <a:cxn ang="0">
+                <a:pos x="connsiteX1" y="connsiteY1"/>
+              </a:cxn>
+              <a:cxn ang="0">
+                <a:pos x="connsiteX2" y="connsiteY2"/>
+              </a:cxn>
+              <a:cxn ang="0">
+                <a:pos x="connsiteX3" y="connsiteY3"/>
+              </a:cxn>
+              <a:cxn ang="0">
+                <a:pos x="connsiteX4" y="connsiteY4"/>
+              </a:cxn>
+              <a:cxn ang="0">
+                <a:pos x="connsiteX5" y="connsiteY5"/>
+              </a:cxn>
+              <a:cxn ang="0">
+                <a:pos x="connsiteX6" y="connsiteY6"/>
+              </a:cxn>
+              <a:cxn ang="0">
+                <a:pos x="connsiteX7" y="connsiteY7"/>
+              </a:cxn>
+              <a:cxn ang="0">
+                <a:pos x="connsiteX8" y="connsiteY8"/>
+              </a:cxn>
+              <a:cxn ang="0">
+                <a:pos x="connsiteX9" y="connsiteY9"/>
+              </a:cxn>
+              <a:cxn ang="0">
+                <a:pos x="connsiteX10" y="connsiteY10"/>
+              </a:cxn>
+              <a:cxn ang="0">
+                <a:pos x="connsiteX11" y="connsiteY11"/>
+              </a:cxn>
+              <a:cxn ang="0">
+                <a:pos x="connsiteX12" y="connsiteY12"/>
+              </a:cxn>
+              <a:cxn ang="0">
+                <a:pos x="connsiteX13" y="connsiteY13"/>
+              </a:cxn>
+              <a:cxn ang="0">
+                <a:pos x="connsiteX14" y="connsiteY14"/>
+              </a:cxn>
+              <a:cxn ang="0">
+                <a:pos x="connsiteX15" y="connsiteY15"/>
+              </a:cxn>
+              <a:cxn ang="0">
+                <a:pos x="connsiteX16" y="connsiteY16"/>
+              </a:cxn>
+              <a:cxn ang="0">
+                <a:pos x="connsiteX17" y="connsiteY17"/>
+              </a:cxn>
+              <a:cxn ang="0">
+                <a:pos x="connsiteX18" y="connsiteY18"/>
+              </a:cxn>
+              <a:cxn ang="0">
+                <a:pos x="connsiteX19" y="connsiteY19"/>
+              </a:cxn>
+              <a:cxn ang="0">
+                <a:pos x="connsiteX20" y="connsiteY20"/>
+              </a:cxn>
+              <a:cxn ang="0">
+                <a:pos x="connsiteX21" y="connsiteY21"/>
+              </a:cxn>
+              <a:cxn ang="0">
+                <a:pos x="connsiteX22" y="connsiteY22"/>
+              </a:cxn>
+              <a:cxn ang="0">
+                <a:pos x="connsiteX23" y="connsiteY23"/>
+              </a:cxn>
+              <a:cxn ang="0">
+                <a:pos x="connsiteX24" y="connsiteY24"/>
+              </a:cxn>
+              <a:cxn ang="0">
+                <a:pos x="connsiteX25" y="connsiteY25"/>
+              </a:cxn>
+              <a:cxn ang="0">
+                <a:pos x="connsiteX26" y="connsiteY26"/>
+              </a:cxn>
+              <a:cxn ang="0">
+                <a:pos x="connsiteX27" y="connsiteY27"/>
+              </a:cxn>
+              <a:cxn ang="0">
+                <a:pos x="connsiteX28" y="connsiteY28"/>
+              </a:cxn>
+              <a:cxn ang="0">
+                <a:pos x="connsiteX29" y="connsiteY29"/>
+              </a:cxn>
+              <a:cxn ang="0">
+                <a:pos x="connsiteX30" y="connsiteY30"/>
+              </a:cxn>
+              <a:cxn ang="0">
+                <a:pos x="connsiteX31" y="connsiteY31"/>
+              </a:cxn>
+              <a:cxn ang="0">
+                <a:pos x="connsiteX32" y="connsiteY32"/>
+              </a:cxn>
+              <a:cxn ang="0">
+                <a:pos x="connsiteX33" y="connsiteY33"/>
+              </a:cxn>
+              <a:cxn ang="0">
+                <a:pos x="connsiteX34" y="connsiteY34"/>
+              </a:cxn>
+              <a:cxn ang="0">
+                <a:pos x="connsiteX35" y="connsiteY35"/>
+              </a:cxn>
+              <a:cxn ang="0">
+                <a:pos x="connsiteX36" y="connsiteY36"/>
+              </a:cxn>
+              <a:cxn ang="0">
+                <a:pos x="connsiteX37" y="connsiteY37"/>
+              </a:cxn>
+              <a:cxn ang="0">
+                <a:pos x="connsiteX38" y="connsiteY38"/>
+              </a:cxn>
+              <a:cxn ang="0">
+                <a:pos x="connsiteX39" y="connsiteY39"/>
+              </a:cxn>
+              <a:cxn ang="0">
+                <a:pos x="connsiteX40" y="connsiteY40"/>
+              </a:cxn>
+              <a:cxn ang="0">
+                <a:pos x="connsiteX41" y="connsiteY41"/>
+              </a:cxn>
+              <a:cxn ang="0">
+                <a:pos x="connsiteX42" y="connsiteY42"/>
+              </a:cxn>
+              <a:cxn ang="0">
+                <a:pos x="connsiteX43" y="connsiteY43"/>
+              </a:cxn>
+              <a:cxn ang="0">
+                <a:pos x="connsiteX44" y="connsiteY44"/>
+              </a:cxn>
+              <a:cxn ang="0">
+                <a:pos x="connsiteX45" y="connsiteY45"/>
+              </a:cxn>
+              <a:cxn ang="0">
+                <a:pos x="connsiteX46" y="connsiteY46"/>
+              </a:cxn>
+              <a:cxn ang="0">
+                <a:pos x="connsiteX47" y="connsiteY47"/>
+              </a:cxn>
+              <a:cxn ang="0">
+                <a:pos x="connsiteX48" y="connsiteY48"/>
+              </a:cxn>
+              <a:cxn ang="0">
+                <a:pos x="connsiteX49" y="connsiteY49"/>
+              </a:cxn>
+              <a:cxn ang="0">
+                <a:pos x="connsiteX50" y="connsiteY50"/>
+              </a:cxn>
+              <a:cxn ang="0">
+                <a:pos x="connsiteX51" y="connsiteY51"/>
+              </a:cxn>
+              <a:cxn ang="0">
+                <a:pos x="connsiteX52" y="connsiteY52"/>
+              </a:cxn>
+              <a:cxn ang="0">
+                <a:pos x="connsiteX53" y="connsiteY53"/>
+              </a:cxn>
+              <a:cxn ang="0">
+                <a:pos x="connsiteX54" y="connsiteY54"/>
+              </a:cxn>
+              <a:cxn ang="0">
+                <a:pos x="connsiteX55" y="connsiteY55"/>
+              </a:cxn>
+              <a:cxn ang="0">
+                <a:pos x="connsiteX56" y="connsiteY56"/>
+              </a:cxn>
+              <a:cxn ang="0">
+                <a:pos x="connsiteX57" y="connsiteY57"/>
+              </a:cxn>
+              <a:cxn ang="0">
+                <a:pos x="connsiteX58" y="connsiteY58"/>
+              </a:cxn>
+              <a:cxn ang="0">
+                <a:pos x="connsiteX59" y="connsiteY59"/>
+              </a:cxn>
+              <a:cxn ang="0">
+                <a:pos x="connsiteX60" y="connsiteY60"/>
+              </a:cxn>
+              <a:cxn ang="0">
+                <a:pos x="connsiteX61" y="connsiteY61"/>
+              </a:cxn>
+              <a:cxn ang="0">
+                <a:pos x="connsiteX62" y="connsiteY62"/>
+              </a:cxn>
+              <a:cxn ang="0">
+                <a:pos x="connsiteX63" y="connsiteY63"/>
+              </a:cxn>
+              <a:cxn ang="0">
+                <a:pos x="connsiteX64" y="connsiteY64"/>
+              </a:cxn>
+              <a:cxn ang="0">
+                <a:pos x="connsiteX65" y="connsiteY65"/>
+              </a:cxn>
+              <a:cxn ang="0">
+                <a:pos x="connsiteX66" y="connsiteY66"/>
+              </a:cxn>
+              <a:cxn ang="0">
+                <a:pos x="connsiteX67" y="connsiteY67"/>
+              </a:cxn>
+              <a:cxn ang="0">
+                <a:pos x="connsiteX68" y="connsiteY68"/>
+              </a:cxn>
+              <a:cxn ang="0">
+                <a:pos x="connsiteX69" y="connsiteY69"/>
+              </a:cxn>
+              <a:cxn ang="0">
+                <a:pos x="connsiteX70" y="connsiteY70"/>
+              </a:cxn>
+              <a:cxn ang="0">
+                <a:pos x="connsiteX71" y="connsiteY71"/>
+              </a:cxn>
+              <a:cxn ang="0">
+                <a:pos x="connsiteX72" y="connsiteY72"/>
+              </a:cxn>
+              <a:cxn ang="0">
+                <a:pos x="connsiteX73" y="connsiteY73"/>
+              </a:cxn>
+              <a:cxn ang="0">
+                <a:pos x="connsiteX74" y="connsiteY74"/>
+              </a:cxn>
+              <a:cxn ang="0">
+                <a:pos x="connsiteX75" y="connsiteY75"/>
+              </a:cxn>
+              <a:cxn ang="0">
+                <a:pos x="connsiteX76" y="connsiteY76"/>
+              </a:cxn>
+              <a:cxn ang="0">
+                <a:pos x="connsiteX77" y="connsiteY77"/>
+              </a:cxn>
+              <a:cxn ang="0">
+                <a:pos x="connsiteX78" y="connsiteY78"/>
+              </a:cxn>
+              <a:cxn ang="0">
+                <a:pos x="connsiteX79" y="connsiteY79"/>
+              </a:cxn>
+              <a:cxn ang="0">
+                <a:pos x="connsiteX80" y="connsiteY80"/>
+              </a:cxn>
+              <a:cxn ang="0">
+                <a:pos x="connsiteX81" y="connsiteY81"/>
+              </a:cxn>
+              <a:cxn ang="0">
+                <a:pos x="connsiteX82" y="connsiteY82"/>
+              </a:cxn>
+              <a:cxn ang="0">
+                <a:pos x="connsiteX83" y="connsiteY83"/>
+              </a:cxn>
+              <a:cxn ang="0">
+                <a:pos x="connsiteX84" y="connsiteY84"/>
+              </a:cxn>
+              <a:cxn ang="0">
+                <a:pos x="connsiteX85" y="connsiteY85"/>
+              </a:cxn>
+              <a:cxn ang="0">
+                <a:pos x="connsiteX86" y="connsiteY86"/>
+              </a:cxn>
+              <a:cxn ang="0">
+                <a:pos x="connsiteX87" y="connsiteY87"/>
+              </a:cxn>
+              <a:cxn ang="0">
+                <a:pos x="connsiteX88" y="connsiteY88"/>
+              </a:cxn>
+              <a:cxn ang="0">
+                <a:pos x="connsiteX89" y="connsiteY89"/>
+              </a:cxn>
+              <a:cxn ang="0">
+                <a:pos x="connsiteX90" y="connsiteY90"/>
+              </a:cxn>
+              <a:cxn ang="0">
+                <a:pos x="connsiteX91" y="connsiteY91"/>
+              </a:cxn>
+              <a:cxn ang="0">
+                <a:pos x="connsiteX92" y="connsiteY92"/>
+              </a:cxn>
+              <a:cxn ang="0">
+                <a:pos x="connsiteX93" y="connsiteY93"/>
+              </a:cxn>
+              <a:cxn ang="0">
+                <a:pos x="connsiteX94" y="connsiteY94"/>
+              </a:cxn>
+              <a:cxn ang="0">
+                <a:pos x="connsiteX95" y="connsiteY95"/>
+              </a:cxn>
+              <a:cxn ang="0">
+                <a:pos x="connsiteX96" y="connsiteY96"/>
+              </a:cxn>
+              <a:cxn ang="0">
+                <a:pos x="connsiteX97" y="connsiteY97"/>
+              </a:cxn>
+              <a:cxn ang="0">
+                <a:pos x="connsiteX98" y="connsiteY98"/>
+              </a:cxn>
+              <a:cxn ang="0">
+                <a:pos x="connsiteX99" y="connsiteY99"/>
+              </a:cxn>
+              <a:cxn ang="0">
+                <a:pos x="connsiteX100" y="connsiteY100"/>
+              </a:cxn>
+              <a:cxn ang="0">
+                <a:pos x="connsiteX101" y="connsiteY101"/>
+              </a:cxn>
+              <a:cxn ang="0">
+                <a:pos x="connsiteX102" y="connsiteY102"/>
+              </a:cxn>
+              <a:cxn ang="0">
+                <a:pos x="connsiteX103" y="connsiteY103"/>
+              </a:cxn>
+              <a:cxn ang="0">
+                <a:pos x="connsiteX104" y="connsiteY104"/>
+              </a:cxn>
+              <a:cxn ang="0">
+                <a:pos x="connsiteX105" y="connsiteY105"/>
+              </a:cxn>
+              <a:cxn ang="0">
+                <a:pos x="connsiteX106" y="connsiteY106"/>
+              </a:cxn>
+              <a:cxn ang="0">
+                <a:pos x="connsiteX107" y="connsiteY107"/>
+              </a:cxn>
+              <a:cxn ang="0">
+                <a:pos x="connsiteX108" y="connsiteY108"/>
+              </a:cxn>
+            </a:cxnLst>
+            <a:rect l="l" t="t" r="r" b="b"/>
+            <a:pathLst>
+              <a:path w="3721608" h="3721608">
+                <a:moveTo>
+                  <a:pt x="1860804" y="0"/>
+                </a:moveTo>
+                <a:cubicBezTo>
+                  <a:pt x="2302391" y="0"/>
+                  <a:pt x="2708052" y="153818"/>
+                  <a:pt x="3027130" y="410798"/>
+                </a:cubicBezTo>
+                <a:lnTo>
+                  <a:pt x="3170679" y="542833"/>
+                </a:lnTo>
+                <a:lnTo>
+                  <a:pt x="3015458" y="654952"/>
+                </a:lnTo>
+                <a:lnTo>
+                  <a:pt x="2995668" y="669247"/>
+                </a:lnTo>
+                <a:lnTo>
+                  <a:pt x="2996856" y="670892"/>
+                </a:lnTo>
+                <a:lnTo>
+                  <a:pt x="2976925" y="687970"/>
+                </a:lnTo>
+                <a:cubicBezTo>
+                  <a:pt x="2895531" y="770561"/>
+                  <a:pt x="2874649" y="888544"/>
+                  <a:pt x="2933190" y="969591"/>
+                </a:cubicBezTo>
+                <a:cubicBezTo>
+                  <a:pt x="2991732" y="1050639"/>
+                  <a:pt x="3110300" y="1067895"/>
+                  <a:pt x="3214287" y="1016582"/>
+                </a:cubicBezTo>
+                <a:lnTo>
+                  <a:pt x="3236764" y="1003028"/>
+                </a:lnTo>
+                <a:lnTo>
+                  <a:pt x="3237952" y="1004673"/>
+                </a:lnTo>
+                <a:lnTo>
+                  <a:pt x="3257742" y="990378"/>
+                </a:lnTo>
+                <a:lnTo>
+                  <a:pt x="3429168" y="866555"/>
+                </a:lnTo>
+                <a:lnTo>
+                  <a:pt x="3497019" y="973834"/>
+                </a:lnTo>
+                <a:lnTo>
+                  <a:pt x="3529588" y="1041442"/>
+                </a:lnTo>
+                <a:lnTo>
+                  <a:pt x="3362962" y="1103515"/>
+                </a:lnTo>
+                <a:lnTo>
+                  <a:pt x="3340085" y="1112037"/>
+                </a:lnTo>
+                <a:lnTo>
+                  <a:pt x="3340794" y="1113938"/>
+                </a:lnTo>
+                <a:lnTo>
+                  <a:pt x="3317041" y="1125107"/>
+                </a:lnTo>
+                <a:cubicBezTo>
+                  <a:pt x="3216627" y="1183101"/>
+                  <a:pt x="3165146" y="1291295"/>
+                  <a:pt x="3200048" y="1384984"/>
+                </a:cubicBezTo>
+                <a:cubicBezTo>
+                  <a:pt x="3234950" y="1478673"/>
+                  <a:pt x="3344671" y="1526814"/>
+                  <a:pt x="3458554" y="1504976"/>
+                </a:cubicBezTo>
+                <a:lnTo>
+                  <a:pt x="3483824" y="1497882"/>
+                </a:lnTo>
+                <a:lnTo>
+                  <a:pt x="3484532" y="1499783"/>
+                </a:lnTo>
+                <a:lnTo>
+                  <a:pt x="3507410" y="1491261"/>
+                </a:lnTo>
+                <a:lnTo>
+                  <a:pt x="3669668" y="1430815"/>
+                </a:lnTo>
+                <a:lnTo>
+                  <a:pt x="3683803" y="1485787"/>
+                </a:lnTo>
+                <a:cubicBezTo>
+                  <a:pt x="3708591" y="1606921"/>
+                  <a:pt x="3721608" y="1732342"/>
+                  <a:pt x="3721608" y="1860804"/>
+                </a:cubicBezTo>
+                <a:cubicBezTo>
+                  <a:pt x="3721608" y="1989266"/>
+                  <a:pt x="3708591" y="2114687"/>
+                  <a:pt x="3683803" y="2235821"/>
+                </a:cubicBezTo>
+                <a:lnTo>
+                  <a:pt x="3668199" y="2296507"/>
+                </a:lnTo>
+                <a:lnTo>
+                  <a:pt x="3521153" y="2233674"/>
+                </a:lnTo>
+                <a:lnTo>
+                  <a:pt x="3498704" y="2224081"/>
+                </a:lnTo>
+                <a:lnTo>
+                  <a:pt x="3497907" y="2225947"/>
+                </a:lnTo>
+                <a:lnTo>
+                  <a:pt x="3472999" y="2217668"/>
+                </a:lnTo>
+                <a:cubicBezTo>
+                  <a:pt x="3360274" y="2190479"/>
+                  <a:pt x="3248403" y="2233388"/>
+                  <a:pt x="3209118" y="2325326"/>
+                </a:cubicBezTo>
+                <a:cubicBezTo>
+                  <a:pt x="3169833" y="2417263"/>
+                  <a:pt x="3216150" y="2527766"/>
+                  <a:pt x="3313715" y="2590435"/>
+                </a:cubicBezTo>
+                <a:lnTo>
+                  <a:pt x="3336914" y="2602712"/>
+                </a:lnTo>
+                <a:lnTo>
+                  <a:pt x="3336117" y="2604578"/>
+                </a:lnTo>
+                <a:lnTo>
+                  <a:pt x="3358566" y="2614170"/>
+                </a:lnTo>
+                <a:lnTo>
+                  <a:pt x="3526758" y="2686039"/>
+                </a:lnTo>
+                <a:lnTo>
+                  <a:pt x="3497019" y="2747774"/>
+                </a:lnTo>
+                <a:cubicBezTo>
+                  <a:pt x="3181912" y="3327834"/>
+                  <a:pt x="2567344" y="3721608"/>
+                  <a:pt x="1860804" y="3721608"/>
+                </a:cubicBezTo>
+                <a:cubicBezTo>
+                  <a:pt x="1419217" y="3721608"/>
+                  <a:pt x="1013556" y="3567790"/>
+                  <a:pt x="694478" y="3310810"/>
+                </a:cubicBezTo>
+                <a:lnTo>
+                  <a:pt x="623876" y="3245871"/>
+                </a:lnTo>
+                <a:lnTo>
+                  <a:pt x="634440" y="3238490"/>
+                </a:lnTo>
+                <a:lnTo>
+                  <a:pt x="654452" y="3224507"/>
+                </a:lnTo>
+                <a:lnTo>
+                  <a:pt x="653290" y="3222845"/>
+                </a:lnTo>
+                <a:lnTo>
+                  <a:pt x="663375" y="3214474"/>
+                </a:lnTo>
+                <a:lnTo>
+                  <a:pt x="701524" y="3219549"/>
+                </a:lnTo>
+                <a:cubicBezTo>
+                  <a:pt x="748647" y="3221109"/>
+                  <a:pt x="794369" y="3208291"/>
+                  <a:pt x="832378" y="3179629"/>
+                </a:cubicBezTo>
+                <a:cubicBezTo>
+                  <a:pt x="933734" y="3103198"/>
+                  <a:pt x="941855" y="2943046"/>
+                  <a:pt x="850515" y="2821920"/>
+                </a:cubicBezTo>
+                <a:cubicBezTo>
+                  <a:pt x="759176" y="2700794"/>
+                  <a:pt x="602965" y="2664562"/>
+                  <a:pt x="501609" y="2740993"/>
+                </a:cubicBezTo>
+                <a:cubicBezTo>
+                  <a:pt x="463600" y="2769655"/>
+                  <a:pt x="438703" y="2810089"/>
+                  <a:pt x="427245" y="2855825"/>
+                </a:cubicBezTo>
+                <a:lnTo>
+                  <a:pt x="423031" y="2884420"/>
+                </a:lnTo>
+                <a:lnTo>
+                  <a:pt x="418630" y="2886980"/>
+                </a:lnTo>
+                <a:lnTo>
+                  <a:pt x="417468" y="2885317"/>
+                </a:lnTo>
+                <a:lnTo>
+                  <a:pt x="397455" y="2899299"/>
+                </a:lnTo>
+                <a:lnTo>
+                  <a:pt x="344031" y="2936625"/>
+                </a:lnTo>
+                <a:lnTo>
+                  <a:pt x="224589" y="2747774"/>
+                </a:lnTo>
+                <a:lnTo>
+                  <a:pt x="208466" y="2714304"/>
+                </a:lnTo>
+                <a:lnTo>
+                  <a:pt x="236707" y="2703546"/>
+                </a:lnTo>
+                <a:lnTo>
+                  <a:pt x="259520" y="2694854"/>
+                </a:lnTo>
+                <a:lnTo>
+                  <a:pt x="258798" y="2692959"/>
+                </a:lnTo>
+                <a:lnTo>
+                  <a:pt x="270617" y="2687294"/>
+                </a:lnTo>
+                <a:lnTo>
+                  <a:pt x="306383" y="2701501"/>
+                </a:lnTo>
+                <a:cubicBezTo>
+                  <a:pt x="351710" y="2714483"/>
+                  <a:pt x="399177" y="2713178"/>
+                  <a:pt x="443018" y="2694629"/>
+                </a:cubicBezTo>
+                <a:cubicBezTo>
+                  <a:pt x="559929" y="2645164"/>
+                  <a:pt x="606783" y="2491805"/>
+                  <a:pt x="547670" y="2352090"/>
+                </a:cubicBezTo>
+                <a:cubicBezTo>
+                  <a:pt x="488557" y="2212376"/>
+                  <a:pt x="345862" y="2139215"/>
+                  <a:pt x="228951" y="2188679"/>
+                </a:cubicBezTo>
+                <a:cubicBezTo>
+                  <a:pt x="185110" y="2207229"/>
+                  <a:pt x="151120" y="2240388"/>
+                  <a:pt x="128876" y="2281959"/>
+                </a:cubicBezTo>
+                <a:lnTo>
+                  <a:pt x="117829" y="2308669"/>
+                </a:lnTo>
+                <a:lnTo>
+                  <a:pt x="112937" y="2310081"/>
+                </a:lnTo>
+                <a:lnTo>
+                  <a:pt x="112215" y="2308185"/>
+                </a:lnTo>
+                <a:lnTo>
+                  <a:pt x="89401" y="2316876"/>
+                </a:lnTo>
+                <a:lnTo>
+                  <a:pt x="61390" y="2327547"/>
+                </a:lnTo>
+                <a:lnTo>
+                  <a:pt x="37805" y="2235821"/>
+                </a:lnTo>
+                <a:cubicBezTo>
+                  <a:pt x="13018" y="2114687"/>
+                  <a:pt x="0" y="1989266"/>
+                  <a:pt x="0" y="1860804"/>
+                </a:cubicBezTo>
+                <a:cubicBezTo>
+                  <a:pt x="0" y="1780516"/>
+                  <a:pt x="5085" y="1701415"/>
+                  <a:pt x="14951" y="1623806"/>
+                </a:cubicBezTo>
+                <a:lnTo>
+                  <a:pt x="47671" y="1452795"/>
+                </a:lnTo>
+                <a:lnTo>
+                  <a:pt x="92757" y="1468349"/>
+                </a:lnTo>
+                <a:lnTo>
+                  <a:pt x="115836" y="1476310"/>
+                </a:lnTo>
+                <a:lnTo>
+                  <a:pt x="116497" y="1474392"/>
+                </a:lnTo>
+                <a:lnTo>
+                  <a:pt x="129198" y="1477625"/>
+                </a:lnTo>
+                <a:lnTo>
+                  <a:pt x="147531" y="1511463"/>
+                </a:lnTo>
+                <a:cubicBezTo>
+                  <a:pt x="173985" y="1550491"/>
+                  <a:pt x="211243" y="1579930"/>
+                  <a:pt x="256778" y="1593813"/>
+                </a:cubicBezTo>
+                <a:cubicBezTo>
+                  <a:pt x="378204" y="1630832"/>
+                  <a:pt x="512504" y="1543207"/>
+                  <a:pt x="556744" y="1398096"/>
+                </a:cubicBezTo>
+                <a:cubicBezTo>
+                  <a:pt x="600984" y="1252985"/>
+                  <a:pt x="538412" y="1105339"/>
+                  <a:pt x="416986" y="1068320"/>
+                </a:cubicBezTo>
+                <a:cubicBezTo>
+                  <a:pt x="371451" y="1054437"/>
+                  <a:pt x="324106" y="1058083"/>
+                  <a:pt x="280378" y="1075715"/>
+                </a:cubicBezTo>
+                <a:lnTo>
+                  <a:pt x="254774" y="1089126"/>
+                </a:lnTo>
+                <a:lnTo>
+                  <a:pt x="250114" y="1087071"/>
+                </a:lnTo>
+                <a:lnTo>
+                  <a:pt x="250776" y="1085154"/>
+                </a:lnTo>
+                <a:lnTo>
+                  <a:pt x="227698" y="1077192"/>
+                </a:lnTo>
+                <a:lnTo>
+                  <a:pt x="183472" y="1061935"/>
+                </a:lnTo>
+                <a:lnTo>
+                  <a:pt x="224589" y="973834"/>
+                </a:lnTo>
+                <a:lnTo>
+                  <a:pt x="282157" y="879076"/>
+                </a:lnTo>
+                <a:lnTo>
+                  <a:pt x="343265" y="915632"/>
+                </a:lnTo>
+                <a:lnTo>
+                  <a:pt x="364215" y="928164"/>
+                </a:lnTo>
+                <a:lnTo>
+                  <a:pt x="365256" y="926423"/>
+                </a:lnTo>
+                <a:lnTo>
+                  <a:pt x="377022" y="932196"/>
+                </a:lnTo>
+                <a:lnTo>
+                  <a:pt x="388013" y="969079"/>
+                </a:lnTo>
+                <a:cubicBezTo>
+                  <a:pt x="405883" y="1012710"/>
+                  <a:pt x="436299" y="1049175"/>
+                  <a:pt x="478011" y="1072116"/>
+                </a:cubicBezTo>
+                <a:cubicBezTo>
+                  <a:pt x="589241" y="1133292"/>
+                  <a:pt x="738678" y="1075127"/>
+                  <a:pt x="811787" y="942201"/>
+                </a:cubicBezTo>
+                <a:cubicBezTo>
+                  <a:pt x="884896" y="809274"/>
+                  <a:pt x="853991" y="651922"/>
+                  <a:pt x="742760" y="590746"/>
+                </a:cubicBezTo>
+                <a:cubicBezTo>
+                  <a:pt x="701049" y="567805"/>
+                  <a:pt x="653965" y="561647"/>
+                  <a:pt x="607547" y="569919"/>
+                </a:cubicBezTo>
+                <a:lnTo>
+                  <a:pt x="579734" y="577783"/>
+                </a:lnTo>
+                <a:lnTo>
+                  <a:pt x="575596" y="574816"/>
+                </a:lnTo>
+                <a:lnTo>
+                  <a:pt x="576637" y="573075"/>
+                </a:lnTo>
+                <a:lnTo>
+                  <a:pt x="555687" y="560542"/>
+                </a:lnTo>
+                <a:lnTo>
+                  <a:pt x="539635" y="550939"/>
+                </a:lnTo>
+                <a:lnTo>
+                  <a:pt x="545017" y="545017"/>
+                </a:lnTo>
+                <a:cubicBezTo>
+                  <a:pt x="881756" y="208278"/>
+                  <a:pt x="1346957" y="0"/>
+                  <a:pt x="1860804" y="0"/>
+                </a:cubicBezTo>
+                <a:close/>
+              </a:path>
+            </a:pathLst>
+          </a:custGeom>
+          <a:solidFill>
+            <a:schemeClr val="tx1">
+              <a:alpha val="70000"/>
+            </a:schemeClr>
+          </a:solidFill>
+          <a:ln>
+            <a:noFill/>
+          </a:ln>
+        </p:spPr>
+        <p:style>
+          <a:lnRef idx="2">
+            <a:schemeClr val="accent1">
+              <a:shade val="50000"/>
+            </a:schemeClr>
+          </a:lnRef>
+          <a:fillRef idx="1">
+            <a:schemeClr val="accent1"/>
+          </a:fillRef>
+          <a:effectRef idx="0">
+            <a:schemeClr val="accent1"/>
+          </a:effectRef>
+          <a:fontRef idx="minor">
+            <a:schemeClr val="lt1"/>
+          </a:fontRef>
+        </p:style>
+        <p:txBody>
+          <a:bodyPr wrap="square" rtlCol="0" anchor="ctr">
+            <a:noAutofit/>
+          </a:bodyPr>
+          <a:lstStyle/>
+          <a:p>
+            <a:pPr algn="ctr"/>
+            <a:endParaRPr lang="en-US"/>
+          </a:p>
+        </p:txBody>
+      </p:sp>
+      <p:pic>
+        <p:nvPicPr>
+          <p:cNvPr id="2050" name="Picture 2">
+            <a:extLst>
+              <a:ext uri="{FF2B5EF4-FFF2-40B4-BE49-F238E27FC236}">
+                <a16:creationId xmlns:a16="http://schemas.microsoft.com/office/drawing/2014/main" id="{D7009883-AACA-4B6F-8315-225410359D8B}"/>
+              </a:ext>
+            </a:extLst>
+          </p:cNvPr>
+          <p:cNvPicPr>
+            <a:picLocks noChangeAspect="1" noChangeArrowheads="1"/>
+          </p:cNvPicPr>
+          <p:nvPr/>
+        </p:nvPicPr>
+        <p:blipFill>
+          <a:blip r:embed="rId5">
+            <a:extLst>
+              <a:ext uri="{28A0092B-C50C-407E-A947-70E740481C1C}">
+                <a14:useLocalDpi xmlns:a14="http://schemas.microsoft.com/office/drawing/2010/main" val="0"/>
+              </a:ext>
+            </a:extLst>
+          </a:blip>
+          <a:srcRect/>
+          <a:stretch>
+            <a:fillRect/>
+          </a:stretch>
+        </p:blipFill>
+        <p:spPr bwMode="auto">
+          <a:xfrm>
+            <a:off x="-1951146" y="0"/>
+            <a:ext cx="1385570" cy="1124043"/>
+          </a:xfrm>
+          <a:prstGeom prst="rect">
+            <a:avLst/>
+          </a:prstGeom>
+          <a:noFill/>
+          <a:extLst>
+            <a:ext uri="{909E8E84-426E-40DD-AFC4-6F175D3DCCD1}">
+              <a14:hiddenFill xmlns:a14="http://schemas.microsoft.com/office/drawing/2010/main">
+                <a:solidFill>
+                  <a:srgbClr val="FFFFFF"/>
+                </a:solidFill>
+              </a14:hiddenFill>
+            </a:ext>
+          </a:extLst>
+        </p:spPr>
+      </p:pic>
+      <p:sp>
+        <p:nvSpPr>
+          <p:cNvPr id="6" name="TextBox 5">
+            <a:extLst>
+              <a:ext uri="{FF2B5EF4-FFF2-40B4-BE49-F238E27FC236}">
+                <a16:creationId xmlns:a16="http://schemas.microsoft.com/office/drawing/2014/main" id="{BB090F8C-68F9-49C3-86D1-10750B84A578}"/>
+              </a:ext>
+            </a:extLst>
+          </p:cNvPr>
+          <p:cNvSpPr txBox="1"/>
+          <p:nvPr/>
+        </p:nvSpPr>
+        <p:spPr>
+          <a:xfrm>
+            <a:off x="3335154" y="774097"/>
+            <a:ext cx="5521693" cy="707886"/>
+          </a:xfrm>
+          <a:prstGeom prst="rect">
+            <a:avLst/>
+          </a:prstGeom>
+          <a:noFill/>
+        </p:spPr>
+        <p:txBody>
+          <a:bodyPr wrap="square" rtlCol="0">
+            <a:spAutoFit/>
+          </a:bodyPr>
+          <a:lstStyle/>
+          <a:p>
+            <a:pPr algn="ctr"/>
+            <a:r>
+              <a:rPr lang="en-US" sz="4000" dirty="0">
+                <a:latin typeface="Bebas Neue" panose="020B0606020202050201" pitchFamily="34" charset="0"/>
+              </a:rPr>
+              <a:t>Capacitive Touch Sensor Pads</a:t>
+            </a:r>
+          </a:p>
+        </p:txBody>
+      </p:sp>
+      <p:pic>
+        <p:nvPicPr>
+          <p:cNvPr id="7" name="Picture 6">
+            <a:extLst>
+              <a:ext uri="{FF2B5EF4-FFF2-40B4-BE49-F238E27FC236}">
+                <a16:creationId xmlns:a16="http://schemas.microsoft.com/office/drawing/2014/main" id="{263BBA7D-7D6A-7025-DB5B-189D116456F4}"/>
+              </a:ext>
+            </a:extLst>
+          </p:cNvPr>
+          <p:cNvPicPr>
+            <a:picLocks noChangeAspect="1"/>
+          </p:cNvPicPr>
+          <p:nvPr/>
+        </p:nvPicPr>
+        <p:blipFill>
+          <a:blip r:embed="rId6"/>
+          <a:stretch>
+            <a:fillRect/>
+          </a:stretch>
+        </p:blipFill>
+        <p:spPr>
+          <a:xfrm>
+            <a:off x="12271221" y="21764"/>
+            <a:ext cx="4679439" cy="6858000"/>
+          </a:xfrm>
+          <a:prstGeom prst="rect">
+            <a:avLst/>
+          </a:prstGeom>
+        </p:spPr>
+      </p:pic>
+      <p:pic>
+        <p:nvPicPr>
+          <p:cNvPr id="9" name="Picture 8">
+            <a:extLst>
+              <a:ext uri="{FF2B5EF4-FFF2-40B4-BE49-F238E27FC236}">
+                <a16:creationId xmlns:a16="http://schemas.microsoft.com/office/drawing/2014/main" id="{31DEEC0B-2502-B7FE-2C90-A0F4D38D0AE2}"/>
+              </a:ext>
+            </a:extLst>
+          </p:cNvPr>
+          <p:cNvPicPr>
+            <a:picLocks noChangeAspect="1"/>
+          </p:cNvPicPr>
+          <p:nvPr/>
+        </p:nvPicPr>
+        <p:blipFill>
+          <a:blip r:embed="rId7"/>
+          <a:stretch>
+            <a:fillRect/>
+          </a:stretch>
+        </p:blipFill>
+        <p:spPr>
+          <a:xfrm>
+            <a:off x="12542050" y="1757749"/>
+            <a:ext cx="5409051" cy="5068079"/>
+          </a:xfrm>
+          <a:prstGeom prst="rect">
+            <a:avLst/>
+          </a:prstGeom>
+        </p:spPr>
+      </p:pic>
+      <p:pic>
+        <p:nvPicPr>
+          <p:cNvPr id="5" name="Picture 4">
+            <a:extLst>
+              <a:ext uri="{FF2B5EF4-FFF2-40B4-BE49-F238E27FC236}">
+                <a16:creationId xmlns:a16="http://schemas.microsoft.com/office/drawing/2014/main" id="{2AC31AAE-40A5-11E6-1EDA-24C3D444D466}"/>
+              </a:ext>
+            </a:extLst>
+          </p:cNvPr>
+          <p:cNvPicPr>
+            <a:picLocks noChangeAspect="1"/>
+          </p:cNvPicPr>
+          <p:nvPr/>
+        </p:nvPicPr>
+        <p:blipFill>
+          <a:blip r:embed="rId6"/>
+          <a:stretch>
+            <a:fillRect/>
+          </a:stretch>
+        </p:blipFill>
+        <p:spPr>
+          <a:xfrm>
+            <a:off x="11871171" y="0"/>
+            <a:ext cx="4679439" cy="6858000"/>
+          </a:xfrm>
+          <a:prstGeom prst="rect">
+            <a:avLst/>
+          </a:prstGeom>
+        </p:spPr>
+      </p:pic>
+      <p:pic>
+        <p:nvPicPr>
+          <p:cNvPr id="8" name="Picture 7">
+            <a:extLst>
+              <a:ext uri="{FF2B5EF4-FFF2-40B4-BE49-F238E27FC236}">
+                <a16:creationId xmlns:a16="http://schemas.microsoft.com/office/drawing/2014/main" id="{0DCD7299-15DC-D7B6-3EEF-1CEFA2CDC1E3}"/>
+              </a:ext>
+            </a:extLst>
+          </p:cNvPr>
+          <p:cNvPicPr>
+            <a:picLocks noChangeAspect="1"/>
+          </p:cNvPicPr>
+          <p:nvPr/>
+        </p:nvPicPr>
+        <p:blipFill>
+          <a:blip r:embed="rId7"/>
+          <a:stretch>
+            <a:fillRect/>
+          </a:stretch>
+        </p:blipFill>
+        <p:spPr>
+          <a:xfrm>
+            <a:off x="12313449" y="2364005"/>
+            <a:ext cx="5409051" cy="5068079"/>
+          </a:xfrm>
+          <a:prstGeom prst="rect">
+            <a:avLst/>
+          </a:prstGeom>
+        </p:spPr>
+      </p:pic>
+      <p:sp>
+        <p:nvSpPr>
+          <p:cNvPr id="11" name="Freeform: Shape 10">
+            <a:extLst>
+              <a:ext uri="{FF2B5EF4-FFF2-40B4-BE49-F238E27FC236}">
+                <a16:creationId xmlns:a16="http://schemas.microsoft.com/office/drawing/2014/main" id="{B72CEE6D-F364-407C-269F-F27FB9B6A809}"/>
+              </a:ext>
+            </a:extLst>
+          </p:cNvPr>
+          <p:cNvSpPr/>
+          <p:nvPr/>
+        </p:nvSpPr>
+        <p:spPr>
+          <a:xfrm rot="10800000" flipV="1">
+            <a:off x="7711722" y="2837828"/>
+            <a:ext cx="517429" cy="225638"/>
+          </a:xfrm>
+          <a:custGeom>
+            <a:avLst/>
+            <a:gdLst>
+              <a:gd name="connsiteX0" fmla="*/ 1835888 w 1835888"/>
+              <a:gd name="connsiteY0" fmla="*/ 311888 h 311888"/>
+              <a:gd name="connsiteX1" fmla="*/ 1524000 w 1835888"/>
+              <a:gd name="connsiteY1" fmla="*/ 0 h 311888"/>
+              <a:gd name="connsiteX2" fmla="*/ 0 w 1835888"/>
+              <a:gd name="connsiteY2" fmla="*/ 0 h 311888"/>
+            </a:gdLst>
+            <a:ahLst/>
+            <a:cxnLst>
+              <a:cxn ang="0">
+                <a:pos x="connsiteX0" y="connsiteY0"/>
+              </a:cxn>
+              <a:cxn ang="0">
+                <a:pos x="connsiteX1" y="connsiteY1"/>
+              </a:cxn>
+              <a:cxn ang="0">
+                <a:pos x="connsiteX2" y="connsiteY2"/>
+              </a:cxn>
+            </a:cxnLst>
+            <a:rect l="l" t="t" r="r" b="b"/>
+            <a:pathLst>
+              <a:path w="1835888" h="311888">
+                <a:moveTo>
+                  <a:pt x="1835888" y="311888"/>
+                </a:moveTo>
+                <a:lnTo>
+                  <a:pt x="1524000" y="0"/>
+                </a:lnTo>
+                <a:lnTo>
+                  <a:pt x="0" y="0"/>
+                </a:lnTo>
+              </a:path>
+            </a:pathLst>
+          </a:custGeom>
+          <a:noFill/>
+          <a:ln>
+            <a:solidFill>
+              <a:srgbClr val="ED7D31"/>
+            </a:solidFill>
+            <a:headEnd type="oval" w="med" len="med"/>
+            <a:tailEnd type="none" w="med" len="med"/>
+          </a:ln>
+        </p:spPr>
+        <p:style>
+          <a:lnRef idx="2">
+            <a:schemeClr val="accent1">
+              <a:shade val="50000"/>
+            </a:schemeClr>
+          </a:lnRef>
+          <a:fillRef idx="1">
+            <a:schemeClr val="accent1"/>
+          </a:fillRef>
+          <a:effectRef idx="0">
+            <a:schemeClr val="accent1"/>
+          </a:effectRef>
+          <a:fontRef idx="minor">
+            <a:schemeClr val="lt1"/>
+          </a:fontRef>
+        </p:style>
+        <p:txBody>
+          <a:bodyPr rtlCol="0" anchor="ctr"/>
+          <a:lstStyle/>
+          <a:p>
+            <a:pPr algn="ctr"/>
+            <a:endParaRPr lang="en-US">
+              <a:solidFill>
+                <a:srgbClr val="ED7D31"/>
+              </a:solidFill>
+            </a:endParaRPr>
+          </a:p>
+        </p:txBody>
+      </p:sp>
+      <p:sp>
+        <p:nvSpPr>
+          <p:cNvPr id="14" name="TextBox 13">
+            <a:extLst>
+              <a:ext uri="{FF2B5EF4-FFF2-40B4-BE49-F238E27FC236}">
+                <a16:creationId xmlns:a16="http://schemas.microsoft.com/office/drawing/2014/main" id="{CA445854-3E5F-5279-3CBC-9FB7514274EA}"/>
+              </a:ext>
+            </a:extLst>
+          </p:cNvPr>
+          <p:cNvSpPr txBox="1"/>
+          <p:nvPr/>
+        </p:nvSpPr>
+        <p:spPr>
+          <a:xfrm>
+            <a:off x="8202684" y="4152117"/>
+            <a:ext cx="2956296" cy="553998"/>
+          </a:xfrm>
+          <a:prstGeom prst="rect">
+            <a:avLst/>
+          </a:prstGeom>
+          <a:noFill/>
+        </p:spPr>
+        <p:txBody>
+          <a:bodyPr wrap="square" rtlCol="0">
+            <a:spAutoFit/>
+          </a:bodyPr>
+          <a:lstStyle/>
+          <a:p>
+            <a:r>
+              <a:rPr lang="en-US" b="1" dirty="0">
+                <a:solidFill>
+                  <a:srgbClr val="ED7D31"/>
+                </a:solidFill>
+                <a:latin typeface="Segoe Condensed" panose="020B0606040200020203" pitchFamily="34" charset="0"/>
+              </a:rPr>
+              <a:t>A1</a:t>
+            </a:r>
+            <a:endParaRPr lang="en-US" b="1" baseline="-25000" dirty="0">
+              <a:solidFill>
+                <a:srgbClr val="ED7D31"/>
+              </a:solidFill>
+              <a:latin typeface="Segoe Condensed" panose="020B0606040200020203" pitchFamily="34" charset="0"/>
+            </a:endParaRPr>
+          </a:p>
+          <a:p>
+            <a:r>
+              <a:rPr lang="en-US" sz="1200" dirty="0">
+                <a:solidFill>
+                  <a:srgbClr val="ED7D31"/>
+                </a:solidFill>
+                <a:latin typeface="Segoe Condensed" panose="020B0606040200020203" pitchFamily="34" charset="0"/>
+              </a:rPr>
+              <a:t>Supports capacitive touch.</a:t>
+            </a:r>
+            <a:endParaRPr lang="en-US" sz="1600" dirty="0">
+              <a:solidFill>
+                <a:srgbClr val="ED7D31"/>
+              </a:solidFill>
+              <a:latin typeface="Segoe Condensed" panose="020B0606040200020203" pitchFamily="34" charset="0"/>
+            </a:endParaRPr>
+          </a:p>
+        </p:txBody>
+      </p:sp>
+      <p:sp>
+        <p:nvSpPr>
+          <p:cNvPr id="15" name="Freeform: Shape 14">
+            <a:extLst>
+              <a:ext uri="{FF2B5EF4-FFF2-40B4-BE49-F238E27FC236}">
+                <a16:creationId xmlns:a16="http://schemas.microsoft.com/office/drawing/2014/main" id="{A46514ED-2679-20A4-E8B9-EB0C712A17D5}"/>
+              </a:ext>
+            </a:extLst>
+          </p:cNvPr>
+          <p:cNvSpPr/>
+          <p:nvPr/>
+        </p:nvSpPr>
+        <p:spPr>
+          <a:xfrm rot="10800000">
+            <a:off x="7712063" y="4223674"/>
+            <a:ext cx="517088" cy="136230"/>
+          </a:xfrm>
+          <a:custGeom>
+            <a:avLst/>
+            <a:gdLst>
+              <a:gd name="connsiteX0" fmla="*/ 1835888 w 1835888"/>
+              <a:gd name="connsiteY0" fmla="*/ 311888 h 311888"/>
+              <a:gd name="connsiteX1" fmla="*/ 1524000 w 1835888"/>
+              <a:gd name="connsiteY1" fmla="*/ 0 h 311888"/>
+              <a:gd name="connsiteX2" fmla="*/ 0 w 1835888"/>
+              <a:gd name="connsiteY2" fmla="*/ 0 h 311888"/>
+            </a:gdLst>
+            <a:ahLst/>
+            <a:cxnLst>
+              <a:cxn ang="0">
+                <a:pos x="connsiteX0" y="connsiteY0"/>
+              </a:cxn>
+              <a:cxn ang="0">
+                <a:pos x="connsiteX1" y="connsiteY1"/>
+              </a:cxn>
+              <a:cxn ang="0">
+                <a:pos x="connsiteX2" y="connsiteY2"/>
+              </a:cxn>
+            </a:cxnLst>
+            <a:rect l="l" t="t" r="r" b="b"/>
+            <a:pathLst>
+              <a:path w="1835888" h="311888">
+                <a:moveTo>
+                  <a:pt x="1835888" y="311888"/>
+                </a:moveTo>
+                <a:lnTo>
+                  <a:pt x="1524000" y="0"/>
+                </a:lnTo>
+                <a:lnTo>
+                  <a:pt x="0" y="0"/>
+                </a:lnTo>
+              </a:path>
+            </a:pathLst>
+          </a:custGeom>
+          <a:noFill/>
+          <a:ln>
+            <a:solidFill>
+              <a:srgbClr val="ED7D31"/>
+            </a:solidFill>
+            <a:headEnd type="oval" w="med" len="med"/>
+            <a:tailEnd type="none" w="med" len="med"/>
+          </a:ln>
+        </p:spPr>
+        <p:style>
+          <a:lnRef idx="2">
+            <a:schemeClr val="accent1">
+              <a:shade val="50000"/>
+            </a:schemeClr>
+          </a:lnRef>
+          <a:fillRef idx="1">
+            <a:schemeClr val="accent1"/>
+          </a:fillRef>
+          <a:effectRef idx="0">
+            <a:schemeClr val="accent1"/>
+          </a:effectRef>
+          <a:fontRef idx="minor">
+            <a:schemeClr val="lt1"/>
+          </a:fontRef>
+        </p:style>
+        <p:txBody>
+          <a:bodyPr rtlCol="0" anchor="ctr"/>
+          <a:lstStyle/>
+          <a:p>
+            <a:pPr algn="ctr"/>
+            <a:endParaRPr lang="en-US">
+              <a:solidFill>
+                <a:srgbClr val="ED7D31"/>
+              </a:solidFill>
+            </a:endParaRPr>
+          </a:p>
+        </p:txBody>
+      </p:sp>
+      <p:sp>
+        <p:nvSpPr>
+          <p:cNvPr id="17" name="TextBox 16">
+            <a:extLst>
+              <a:ext uri="{FF2B5EF4-FFF2-40B4-BE49-F238E27FC236}">
+                <a16:creationId xmlns:a16="http://schemas.microsoft.com/office/drawing/2014/main" id="{01291E72-E096-4F8D-7729-9E771F0183A9}"/>
+              </a:ext>
+            </a:extLst>
+          </p:cNvPr>
+          <p:cNvSpPr txBox="1"/>
+          <p:nvPr/>
+        </p:nvSpPr>
+        <p:spPr>
+          <a:xfrm>
+            <a:off x="8202684" y="2663582"/>
+            <a:ext cx="2956296" cy="553998"/>
+          </a:xfrm>
+          <a:prstGeom prst="rect">
+            <a:avLst/>
+          </a:prstGeom>
+          <a:noFill/>
+        </p:spPr>
+        <p:txBody>
+          <a:bodyPr wrap="square" rtlCol="0">
+            <a:spAutoFit/>
+          </a:bodyPr>
+          <a:lstStyle/>
+          <a:p>
+            <a:r>
+              <a:rPr lang="en-US" b="1" dirty="0">
+                <a:solidFill>
+                  <a:srgbClr val="ED7D31"/>
+                </a:solidFill>
+                <a:latin typeface="Segoe Condensed" panose="020B0606040200020203" pitchFamily="34" charset="0"/>
+              </a:rPr>
+              <a:t>A2</a:t>
+            </a:r>
+            <a:endParaRPr lang="en-US" b="1" baseline="-25000" dirty="0">
+              <a:solidFill>
+                <a:srgbClr val="ED7D31"/>
+              </a:solidFill>
+              <a:latin typeface="Segoe Condensed" panose="020B0606040200020203" pitchFamily="34" charset="0"/>
+            </a:endParaRPr>
+          </a:p>
+          <a:p>
+            <a:r>
+              <a:rPr lang="en-US" sz="1200" dirty="0">
+                <a:solidFill>
+                  <a:srgbClr val="ED7D31"/>
+                </a:solidFill>
+                <a:latin typeface="Segoe Condensed" panose="020B0606040200020203" pitchFamily="34" charset="0"/>
+              </a:rPr>
+              <a:t>Supports capacitive touch.</a:t>
+            </a:r>
+            <a:endParaRPr lang="en-US" sz="1600" dirty="0">
+              <a:solidFill>
+                <a:srgbClr val="ED7D31"/>
+              </a:solidFill>
+              <a:latin typeface="Segoe Condensed" panose="020B0606040200020203" pitchFamily="34" charset="0"/>
+            </a:endParaRPr>
+          </a:p>
+        </p:txBody>
+      </p:sp>
+      <p:sp>
+        <p:nvSpPr>
+          <p:cNvPr id="18" name="Freeform: Shape 17">
+            <a:extLst>
+              <a:ext uri="{FF2B5EF4-FFF2-40B4-BE49-F238E27FC236}">
+                <a16:creationId xmlns:a16="http://schemas.microsoft.com/office/drawing/2014/main" id="{D2B30A14-EEA8-77BA-7308-A6C9F5F30CD1}"/>
+              </a:ext>
+            </a:extLst>
+          </p:cNvPr>
+          <p:cNvSpPr/>
+          <p:nvPr/>
+        </p:nvSpPr>
+        <p:spPr>
+          <a:xfrm rot="10800000" flipV="1">
+            <a:off x="7420768" y="2087601"/>
+            <a:ext cx="440541" cy="454829"/>
+          </a:xfrm>
+          <a:custGeom>
+            <a:avLst/>
+            <a:gdLst>
+              <a:gd name="connsiteX0" fmla="*/ 1835888 w 1835888"/>
+              <a:gd name="connsiteY0" fmla="*/ 311888 h 311888"/>
+              <a:gd name="connsiteX1" fmla="*/ 1524000 w 1835888"/>
+              <a:gd name="connsiteY1" fmla="*/ 0 h 311888"/>
+              <a:gd name="connsiteX2" fmla="*/ 0 w 1835888"/>
+              <a:gd name="connsiteY2" fmla="*/ 0 h 311888"/>
+            </a:gdLst>
+            <a:ahLst/>
+            <a:cxnLst>
+              <a:cxn ang="0">
+                <a:pos x="connsiteX0" y="connsiteY0"/>
+              </a:cxn>
+              <a:cxn ang="0">
+                <a:pos x="connsiteX1" y="connsiteY1"/>
+              </a:cxn>
+              <a:cxn ang="0">
+                <a:pos x="connsiteX2" y="connsiteY2"/>
+              </a:cxn>
+            </a:cxnLst>
+            <a:rect l="l" t="t" r="r" b="b"/>
+            <a:pathLst>
+              <a:path w="1835888" h="311888">
+                <a:moveTo>
+                  <a:pt x="1835888" y="311888"/>
+                </a:moveTo>
+                <a:lnTo>
+                  <a:pt x="1524000" y="0"/>
+                </a:lnTo>
+                <a:lnTo>
+                  <a:pt x="0" y="0"/>
+                </a:lnTo>
+              </a:path>
+            </a:pathLst>
+          </a:custGeom>
+          <a:noFill/>
+          <a:ln>
+            <a:solidFill>
+              <a:srgbClr val="ED7D31"/>
+            </a:solidFill>
+            <a:headEnd type="oval" w="med" len="med"/>
+            <a:tailEnd type="none" w="med" len="med"/>
+          </a:ln>
+        </p:spPr>
+        <p:style>
+          <a:lnRef idx="2">
+            <a:schemeClr val="accent1">
+              <a:shade val="50000"/>
+            </a:schemeClr>
+          </a:lnRef>
+          <a:fillRef idx="1">
+            <a:schemeClr val="accent1"/>
+          </a:fillRef>
+          <a:effectRef idx="0">
+            <a:schemeClr val="accent1"/>
+          </a:effectRef>
+          <a:fontRef idx="minor">
+            <a:schemeClr val="lt1"/>
+          </a:fontRef>
+        </p:style>
+        <p:txBody>
+          <a:bodyPr rtlCol="0" anchor="ctr"/>
+          <a:lstStyle/>
+          <a:p>
+            <a:pPr algn="ctr"/>
+            <a:endParaRPr lang="en-US">
+              <a:solidFill>
+                <a:srgbClr val="ED7D31"/>
+              </a:solidFill>
+            </a:endParaRPr>
+          </a:p>
+        </p:txBody>
+      </p:sp>
+      <p:sp>
+        <p:nvSpPr>
+          <p:cNvPr id="19" name="TextBox 18">
+            <a:extLst>
+              <a:ext uri="{FF2B5EF4-FFF2-40B4-BE49-F238E27FC236}">
+                <a16:creationId xmlns:a16="http://schemas.microsoft.com/office/drawing/2014/main" id="{F92D5519-92A5-FE97-356B-48A23F463112}"/>
+              </a:ext>
+            </a:extLst>
+          </p:cNvPr>
+          <p:cNvSpPr txBox="1"/>
+          <p:nvPr/>
+        </p:nvSpPr>
+        <p:spPr>
+          <a:xfrm>
+            <a:off x="7824271" y="1889922"/>
+            <a:ext cx="2956296" cy="553998"/>
+          </a:xfrm>
+          <a:prstGeom prst="rect">
+            <a:avLst/>
+          </a:prstGeom>
+          <a:noFill/>
+        </p:spPr>
+        <p:txBody>
+          <a:bodyPr wrap="square" rtlCol="0">
+            <a:spAutoFit/>
+          </a:bodyPr>
+          <a:lstStyle/>
+          <a:p>
+            <a:r>
+              <a:rPr lang="en-US" b="1" dirty="0">
+                <a:solidFill>
+                  <a:srgbClr val="ED7D31"/>
+                </a:solidFill>
+                <a:latin typeface="Segoe Condensed" panose="020B0606040200020203" pitchFamily="34" charset="0"/>
+              </a:rPr>
+              <a:t>A3</a:t>
+            </a:r>
+            <a:endParaRPr lang="en-US" b="1" baseline="-25000" dirty="0">
+              <a:solidFill>
+                <a:srgbClr val="ED7D31"/>
+              </a:solidFill>
+              <a:latin typeface="Segoe Condensed" panose="020B0606040200020203" pitchFamily="34" charset="0"/>
+            </a:endParaRPr>
+          </a:p>
+          <a:p>
+            <a:r>
+              <a:rPr lang="en-US" sz="1200" dirty="0">
+                <a:solidFill>
+                  <a:srgbClr val="ED7D31"/>
+                </a:solidFill>
+                <a:latin typeface="Segoe Condensed" panose="020B0606040200020203" pitchFamily="34" charset="0"/>
+              </a:rPr>
+              <a:t>Supports capacitive touch.</a:t>
+            </a:r>
+            <a:endParaRPr lang="en-US" sz="1600" dirty="0">
+              <a:solidFill>
+                <a:srgbClr val="ED7D31"/>
+              </a:solidFill>
+              <a:latin typeface="Segoe Condensed" panose="020B0606040200020203" pitchFamily="34" charset="0"/>
+            </a:endParaRPr>
+          </a:p>
+        </p:txBody>
+      </p:sp>
+      <p:grpSp>
+        <p:nvGrpSpPr>
+          <p:cNvPr id="20" name="Group 19">
+            <a:extLst>
+              <a:ext uri="{FF2B5EF4-FFF2-40B4-BE49-F238E27FC236}">
+                <a16:creationId xmlns:a16="http://schemas.microsoft.com/office/drawing/2014/main" id="{00450B81-4DBB-6126-E786-A43CEADEC3C0}"/>
+              </a:ext>
+            </a:extLst>
+          </p:cNvPr>
+          <p:cNvGrpSpPr/>
+          <p:nvPr/>
+        </p:nvGrpSpPr>
+        <p:grpSpPr>
+          <a:xfrm flipH="1">
+            <a:off x="3963495" y="2126669"/>
+            <a:ext cx="861408" cy="2931762"/>
+            <a:chOff x="7967899" y="2269716"/>
+            <a:chExt cx="861408" cy="2931762"/>
+          </a:xfrm>
+        </p:grpSpPr>
+        <p:sp>
+          <p:nvSpPr>
+            <p:cNvPr id="22" name="Freeform: Shape 21">
+              <a:extLst>
+                <a:ext uri="{FF2B5EF4-FFF2-40B4-BE49-F238E27FC236}">
+                  <a16:creationId xmlns:a16="http://schemas.microsoft.com/office/drawing/2014/main" id="{FE4ACE03-B085-94DD-C60E-D0E8A02C3262}"/>
+                </a:ext>
+              </a:extLst>
+            </p:cNvPr>
+            <p:cNvSpPr/>
+            <p:nvPr/>
+          </p:nvSpPr>
+          <p:spPr>
+            <a:xfrm rot="10800000" flipV="1">
+              <a:off x="8311878" y="3011992"/>
+              <a:ext cx="517429" cy="225638"/>
+            </a:xfrm>
+            <a:custGeom>
+              <a:avLst/>
+              <a:gdLst>
+                <a:gd name="connsiteX0" fmla="*/ 1835888 w 1835888"/>
+                <a:gd name="connsiteY0" fmla="*/ 311888 h 311888"/>
+                <a:gd name="connsiteX1" fmla="*/ 1524000 w 1835888"/>
+                <a:gd name="connsiteY1" fmla="*/ 0 h 311888"/>
+                <a:gd name="connsiteX2" fmla="*/ 0 w 1835888"/>
+                <a:gd name="connsiteY2" fmla="*/ 0 h 311888"/>
+              </a:gdLst>
+              <a:ahLst/>
+              <a:cxnLst>
+                <a:cxn ang="0">
+                  <a:pos x="connsiteX0" y="connsiteY0"/>
+                </a:cxn>
+                <a:cxn ang="0">
+                  <a:pos x="connsiteX1" y="connsiteY1"/>
+                </a:cxn>
+                <a:cxn ang="0">
+                  <a:pos x="connsiteX2" y="connsiteY2"/>
+                </a:cxn>
+              </a:cxnLst>
+              <a:rect l="l" t="t" r="r" b="b"/>
+              <a:pathLst>
+                <a:path w="1835888" h="311888">
+                  <a:moveTo>
+                    <a:pt x="1835888" y="311888"/>
+                  </a:moveTo>
+                  <a:lnTo>
+                    <a:pt x="1524000" y="0"/>
+                  </a:lnTo>
+                  <a:lnTo>
+                    <a:pt x="0" y="0"/>
+                  </a:lnTo>
+                </a:path>
+              </a:pathLst>
+            </a:custGeom>
+            <a:noFill/>
+            <a:ln>
+              <a:solidFill>
+                <a:srgbClr val="ED7D31"/>
+              </a:solidFill>
+              <a:headEnd type="oval" w="med" len="med"/>
+              <a:tailEnd type="none" w="med" len="med"/>
+            </a:ln>
+          </p:spPr>
+          <p:style>
+            <a:lnRef idx="2">
+              <a:schemeClr val="accent1">
+                <a:shade val="50000"/>
+              </a:schemeClr>
+            </a:lnRef>
+            <a:fillRef idx="1">
+              <a:schemeClr val="accent1"/>
+            </a:fillRef>
+            <a:effectRef idx="0">
+              <a:schemeClr val="accent1"/>
+            </a:effectRef>
+            <a:fontRef idx="minor">
+              <a:schemeClr val="lt1"/>
+            </a:fontRef>
+          </p:style>
+          <p:txBody>
+            <a:bodyPr rtlCol="0" anchor="ctr"/>
+            <a:lstStyle/>
+            <a:p>
+              <a:pPr algn="ctr"/>
+              <a:endParaRPr lang="en-US">
+                <a:solidFill>
+                  <a:srgbClr val="ED7D31"/>
+                </a:solidFill>
+              </a:endParaRPr>
+            </a:p>
+          </p:txBody>
+        </p:sp>
+        <p:sp>
+          <p:nvSpPr>
+            <p:cNvPr id="27" name="Freeform: Shape 26">
+              <a:extLst>
+                <a:ext uri="{FF2B5EF4-FFF2-40B4-BE49-F238E27FC236}">
+                  <a16:creationId xmlns:a16="http://schemas.microsoft.com/office/drawing/2014/main" id="{A2CAE67A-9175-BDE9-B59B-2C4494A25E9D}"/>
+                </a:ext>
+              </a:extLst>
+            </p:cNvPr>
+            <p:cNvSpPr/>
+            <p:nvPr/>
+          </p:nvSpPr>
+          <p:spPr>
+            <a:xfrm rot="10800000">
+              <a:off x="7967899" y="4880706"/>
+              <a:ext cx="455966" cy="320772"/>
+            </a:xfrm>
+            <a:custGeom>
+              <a:avLst/>
+              <a:gdLst>
+                <a:gd name="connsiteX0" fmla="*/ 1835888 w 1835888"/>
+                <a:gd name="connsiteY0" fmla="*/ 311888 h 311888"/>
+                <a:gd name="connsiteX1" fmla="*/ 1524000 w 1835888"/>
+                <a:gd name="connsiteY1" fmla="*/ 0 h 311888"/>
+                <a:gd name="connsiteX2" fmla="*/ 0 w 1835888"/>
+                <a:gd name="connsiteY2" fmla="*/ 0 h 311888"/>
+              </a:gdLst>
+              <a:ahLst/>
+              <a:cxnLst>
+                <a:cxn ang="0">
+                  <a:pos x="connsiteX0" y="connsiteY0"/>
+                </a:cxn>
+                <a:cxn ang="0">
+                  <a:pos x="connsiteX1" y="connsiteY1"/>
+                </a:cxn>
+                <a:cxn ang="0">
+                  <a:pos x="connsiteX2" y="connsiteY2"/>
+                </a:cxn>
+              </a:cxnLst>
+              <a:rect l="l" t="t" r="r" b="b"/>
+              <a:pathLst>
+                <a:path w="1835888" h="311888">
+                  <a:moveTo>
+                    <a:pt x="1835888" y="311888"/>
+                  </a:moveTo>
+                  <a:lnTo>
+                    <a:pt x="1524000" y="0"/>
+                  </a:lnTo>
+                  <a:lnTo>
+                    <a:pt x="0" y="0"/>
+                  </a:lnTo>
+                </a:path>
+              </a:pathLst>
+            </a:custGeom>
+            <a:noFill/>
+            <a:ln>
+              <a:solidFill>
+                <a:srgbClr val="ED7D31"/>
+              </a:solidFill>
+              <a:headEnd type="oval" w="med" len="med"/>
+              <a:tailEnd type="none" w="med" len="med"/>
+            </a:ln>
+          </p:spPr>
+          <p:style>
+            <a:lnRef idx="2">
+              <a:schemeClr val="accent1">
+                <a:shade val="50000"/>
+              </a:schemeClr>
+            </a:lnRef>
+            <a:fillRef idx="1">
+              <a:schemeClr val="accent1"/>
+            </a:fillRef>
+            <a:effectRef idx="0">
+              <a:schemeClr val="accent1"/>
+            </a:effectRef>
+            <a:fontRef idx="minor">
+              <a:schemeClr val="lt1"/>
+            </a:fontRef>
+          </p:style>
+          <p:txBody>
+            <a:bodyPr rtlCol="0" anchor="ctr"/>
+            <a:lstStyle/>
+            <a:p>
+              <a:pPr algn="ctr"/>
+              <a:endParaRPr lang="en-US">
+                <a:solidFill>
+                  <a:srgbClr val="ED7D31"/>
+                </a:solidFill>
+              </a:endParaRPr>
+            </a:p>
+          </p:txBody>
+        </p:sp>
+        <p:sp>
+          <p:nvSpPr>
+            <p:cNvPr id="28" name="Freeform: Shape 27">
+              <a:extLst>
+                <a:ext uri="{FF2B5EF4-FFF2-40B4-BE49-F238E27FC236}">
+                  <a16:creationId xmlns:a16="http://schemas.microsoft.com/office/drawing/2014/main" id="{C20E07C3-320C-0DBA-B40A-9DDF3B83E25F}"/>
+                </a:ext>
+              </a:extLst>
+            </p:cNvPr>
+            <p:cNvSpPr/>
+            <p:nvPr/>
+          </p:nvSpPr>
+          <p:spPr>
+            <a:xfrm rot="10800000">
+              <a:off x="8280415" y="4373985"/>
+              <a:ext cx="517088" cy="136230"/>
+            </a:xfrm>
+            <a:custGeom>
+              <a:avLst/>
+              <a:gdLst>
+                <a:gd name="connsiteX0" fmla="*/ 1835888 w 1835888"/>
+                <a:gd name="connsiteY0" fmla="*/ 311888 h 311888"/>
+                <a:gd name="connsiteX1" fmla="*/ 1524000 w 1835888"/>
+                <a:gd name="connsiteY1" fmla="*/ 0 h 311888"/>
+                <a:gd name="connsiteX2" fmla="*/ 0 w 1835888"/>
+                <a:gd name="connsiteY2" fmla="*/ 0 h 311888"/>
+              </a:gdLst>
+              <a:ahLst/>
+              <a:cxnLst>
+                <a:cxn ang="0">
+                  <a:pos x="connsiteX0" y="connsiteY0"/>
+                </a:cxn>
+                <a:cxn ang="0">
+                  <a:pos x="connsiteX1" y="connsiteY1"/>
+                </a:cxn>
+                <a:cxn ang="0">
+                  <a:pos x="connsiteX2" y="connsiteY2"/>
+                </a:cxn>
+              </a:cxnLst>
+              <a:rect l="l" t="t" r="r" b="b"/>
+              <a:pathLst>
+                <a:path w="1835888" h="311888">
+                  <a:moveTo>
+                    <a:pt x="1835888" y="311888"/>
+                  </a:moveTo>
+                  <a:lnTo>
+                    <a:pt x="1524000" y="0"/>
+                  </a:lnTo>
+                  <a:lnTo>
+                    <a:pt x="0" y="0"/>
+                  </a:lnTo>
+                </a:path>
+              </a:pathLst>
+            </a:custGeom>
+            <a:noFill/>
+            <a:ln>
+              <a:solidFill>
+                <a:srgbClr val="ED7D31"/>
+              </a:solidFill>
+              <a:headEnd type="oval" w="med" len="med"/>
+              <a:tailEnd type="none" w="med" len="med"/>
+            </a:ln>
+          </p:spPr>
+          <p:style>
+            <a:lnRef idx="2">
+              <a:schemeClr val="accent1">
+                <a:shade val="50000"/>
+              </a:schemeClr>
+            </a:lnRef>
+            <a:fillRef idx="1">
+              <a:schemeClr val="accent1"/>
+            </a:fillRef>
+            <a:effectRef idx="0">
+              <a:schemeClr val="accent1"/>
+            </a:effectRef>
+            <a:fontRef idx="minor">
+              <a:schemeClr val="lt1"/>
+            </a:fontRef>
+          </p:style>
+          <p:txBody>
+            <a:bodyPr rtlCol="0" anchor="ctr"/>
+            <a:lstStyle/>
+            <a:p>
+              <a:pPr algn="ctr"/>
+              <a:endParaRPr lang="en-US">
+                <a:solidFill>
+                  <a:srgbClr val="ED7D31"/>
+                </a:solidFill>
+              </a:endParaRPr>
+            </a:p>
+          </p:txBody>
+        </p:sp>
+        <p:sp>
+          <p:nvSpPr>
+            <p:cNvPr id="29" name="Freeform: Shape 28">
+              <a:extLst>
+                <a:ext uri="{FF2B5EF4-FFF2-40B4-BE49-F238E27FC236}">
+                  <a16:creationId xmlns:a16="http://schemas.microsoft.com/office/drawing/2014/main" id="{D72C6D6B-B267-6E6C-787B-6F6613F18E6D}"/>
+                </a:ext>
+              </a:extLst>
+            </p:cNvPr>
+            <p:cNvSpPr/>
+            <p:nvPr/>
+          </p:nvSpPr>
+          <p:spPr>
+            <a:xfrm rot="10800000" flipV="1">
+              <a:off x="8020926" y="2269716"/>
+              <a:ext cx="440541" cy="454829"/>
+            </a:xfrm>
+            <a:custGeom>
+              <a:avLst/>
+              <a:gdLst>
+                <a:gd name="connsiteX0" fmla="*/ 1835888 w 1835888"/>
+                <a:gd name="connsiteY0" fmla="*/ 311888 h 311888"/>
+                <a:gd name="connsiteX1" fmla="*/ 1524000 w 1835888"/>
+                <a:gd name="connsiteY1" fmla="*/ 0 h 311888"/>
+                <a:gd name="connsiteX2" fmla="*/ 0 w 1835888"/>
+                <a:gd name="connsiteY2" fmla="*/ 0 h 311888"/>
+              </a:gdLst>
+              <a:ahLst/>
+              <a:cxnLst>
+                <a:cxn ang="0">
+                  <a:pos x="connsiteX0" y="connsiteY0"/>
+                </a:cxn>
+                <a:cxn ang="0">
+                  <a:pos x="connsiteX1" y="connsiteY1"/>
+                </a:cxn>
+                <a:cxn ang="0">
+                  <a:pos x="connsiteX2" y="connsiteY2"/>
+                </a:cxn>
+              </a:cxnLst>
+              <a:rect l="l" t="t" r="r" b="b"/>
+              <a:pathLst>
+                <a:path w="1835888" h="311888">
+                  <a:moveTo>
+                    <a:pt x="1835888" y="311888"/>
+                  </a:moveTo>
+                  <a:lnTo>
+                    <a:pt x="1524000" y="0"/>
+                  </a:lnTo>
+                  <a:lnTo>
+                    <a:pt x="0" y="0"/>
+                  </a:lnTo>
+                </a:path>
+              </a:pathLst>
+            </a:custGeom>
+            <a:noFill/>
+            <a:ln>
+              <a:solidFill>
+                <a:srgbClr val="ED7D31"/>
+              </a:solidFill>
+              <a:headEnd type="oval" w="med" len="med"/>
+              <a:tailEnd type="none" w="med" len="med"/>
+            </a:ln>
+          </p:spPr>
+          <p:style>
+            <a:lnRef idx="2">
+              <a:schemeClr val="accent1">
+                <a:shade val="50000"/>
+              </a:schemeClr>
+            </a:lnRef>
+            <a:fillRef idx="1">
+              <a:schemeClr val="accent1"/>
+            </a:fillRef>
+            <a:effectRef idx="0">
+              <a:schemeClr val="accent1"/>
+            </a:effectRef>
+            <a:fontRef idx="minor">
+              <a:schemeClr val="lt1"/>
+            </a:fontRef>
+          </p:style>
+          <p:txBody>
+            <a:bodyPr rtlCol="0" anchor="ctr"/>
+            <a:lstStyle/>
+            <a:p>
+              <a:pPr algn="ctr"/>
+              <a:endParaRPr lang="en-US">
+                <a:solidFill>
+                  <a:srgbClr val="ED7D31"/>
+                </a:solidFill>
+              </a:endParaRPr>
+            </a:p>
+          </p:txBody>
+        </p:sp>
+      </p:grpSp>
+      <p:sp>
+        <p:nvSpPr>
+          <p:cNvPr id="30" name="TextBox 29">
+            <a:extLst>
+              <a:ext uri="{FF2B5EF4-FFF2-40B4-BE49-F238E27FC236}">
+                <a16:creationId xmlns:a16="http://schemas.microsoft.com/office/drawing/2014/main" id="{413030C5-6523-23B9-2CA3-95710ED9F67C}"/>
+              </a:ext>
+            </a:extLst>
+          </p:cNvPr>
+          <p:cNvSpPr txBox="1"/>
+          <p:nvPr/>
+        </p:nvSpPr>
+        <p:spPr>
+          <a:xfrm>
+            <a:off x="1025635" y="1921561"/>
+            <a:ext cx="3315360" cy="553998"/>
+          </a:xfrm>
+          <a:prstGeom prst="rect">
+            <a:avLst/>
+          </a:prstGeom>
+          <a:noFill/>
+        </p:spPr>
+        <p:txBody>
+          <a:bodyPr wrap="square" rtlCol="0">
+            <a:spAutoFit/>
+          </a:bodyPr>
+          <a:lstStyle/>
+          <a:p>
+            <a:pPr algn="r"/>
+            <a:r>
+              <a:rPr lang="en-US" b="1" dirty="0">
+                <a:solidFill>
+                  <a:srgbClr val="ED7D31"/>
+                </a:solidFill>
+                <a:latin typeface="Segoe Condensed" panose="020B0606040200020203" pitchFamily="34" charset="0"/>
+              </a:rPr>
+              <a:t>A4</a:t>
+            </a:r>
+            <a:endParaRPr lang="en-US" b="1" baseline="-25000" dirty="0">
+              <a:solidFill>
+                <a:srgbClr val="ED7D31"/>
+              </a:solidFill>
+              <a:latin typeface="Segoe Condensed" panose="020B0606040200020203" pitchFamily="34" charset="0"/>
+            </a:endParaRPr>
+          </a:p>
+          <a:p>
+            <a:pPr algn="r"/>
+            <a:r>
+              <a:rPr lang="en-US" sz="1200" dirty="0">
+                <a:solidFill>
+                  <a:srgbClr val="ED7D31"/>
+                </a:solidFill>
+                <a:latin typeface="Segoe Condensed" panose="020B0606040200020203" pitchFamily="34" charset="0"/>
+              </a:rPr>
+              <a:t>Supports capacitive touch. </a:t>
+            </a:r>
+            <a:endParaRPr lang="en-US" sz="1600" dirty="0">
+              <a:solidFill>
+                <a:srgbClr val="ED7D31"/>
+              </a:solidFill>
+              <a:latin typeface="Segoe Condensed" panose="020B0606040200020203" pitchFamily="34" charset="0"/>
+            </a:endParaRPr>
+          </a:p>
+        </p:txBody>
+      </p:sp>
+      <p:sp>
+        <p:nvSpPr>
+          <p:cNvPr id="32" name="TextBox 31">
+            <a:extLst>
+              <a:ext uri="{FF2B5EF4-FFF2-40B4-BE49-F238E27FC236}">
+                <a16:creationId xmlns:a16="http://schemas.microsoft.com/office/drawing/2014/main" id="{A916C3A2-FBCA-57C7-10A8-0732596B5E57}"/>
+              </a:ext>
+            </a:extLst>
+          </p:cNvPr>
+          <p:cNvSpPr txBox="1"/>
+          <p:nvPr/>
+        </p:nvSpPr>
+        <p:spPr>
+          <a:xfrm>
+            <a:off x="1025635" y="2692453"/>
+            <a:ext cx="2956296" cy="553998"/>
+          </a:xfrm>
+          <a:prstGeom prst="rect">
+            <a:avLst/>
+          </a:prstGeom>
+          <a:noFill/>
+        </p:spPr>
+        <p:txBody>
+          <a:bodyPr wrap="square" rtlCol="0">
+            <a:spAutoFit/>
+          </a:bodyPr>
+          <a:lstStyle/>
+          <a:p>
+            <a:pPr algn="r"/>
+            <a:r>
+              <a:rPr lang="en-US" b="1" dirty="0">
+                <a:solidFill>
+                  <a:srgbClr val="ED7D31"/>
+                </a:solidFill>
+                <a:latin typeface="Segoe Condensed" panose="020B0606040200020203" pitchFamily="34" charset="0"/>
+              </a:rPr>
+              <a:t>A5 </a:t>
+            </a:r>
+            <a:endParaRPr lang="en-US" b="1" baseline="-25000" dirty="0">
+              <a:solidFill>
+                <a:srgbClr val="ED7D31"/>
+              </a:solidFill>
+              <a:latin typeface="Segoe Condensed" panose="020B0606040200020203" pitchFamily="34" charset="0"/>
+            </a:endParaRPr>
+          </a:p>
+          <a:p>
+            <a:pPr algn="r"/>
+            <a:r>
+              <a:rPr lang="en-US" sz="1200" dirty="0">
+                <a:solidFill>
+                  <a:srgbClr val="ED7D31"/>
+                </a:solidFill>
+                <a:latin typeface="Segoe Condensed" panose="020B0606040200020203" pitchFamily="34" charset="0"/>
+              </a:rPr>
+              <a:t>Supports capacitive touch</a:t>
+            </a:r>
+            <a:endParaRPr lang="en-US" sz="1600" dirty="0">
+              <a:solidFill>
+                <a:srgbClr val="ED7D31"/>
+              </a:solidFill>
+              <a:latin typeface="Segoe Condensed" panose="020B0606040200020203" pitchFamily="34" charset="0"/>
+            </a:endParaRPr>
+          </a:p>
+        </p:txBody>
+      </p:sp>
+      <p:sp>
+        <p:nvSpPr>
+          <p:cNvPr id="33" name="TextBox 32">
+            <a:extLst>
+              <a:ext uri="{FF2B5EF4-FFF2-40B4-BE49-F238E27FC236}">
+                <a16:creationId xmlns:a16="http://schemas.microsoft.com/office/drawing/2014/main" id="{56C816BA-C2C3-52FB-8B3F-6398D5461B39}"/>
+              </a:ext>
+            </a:extLst>
+          </p:cNvPr>
+          <p:cNvSpPr txBox="1"/>
+          <p:nvPr/>
+        </p:nvSpPr>
+        <p:spPr>
+          <a:xfrm>
+            <a:off x="679939" y="4159381"/>
+            <a:ext cx="3315359" cy="553998"/>
+          </a:xfrm>
+          <a:prstGeom prst="rect">
+            <a:avLst/>
+          </a:prstGeom>
+          <a:noFill/>
+        </p:spPr>
+        <p:txBody>
+          <a:bodyPr wrap="square" rtlCol="0">
+            <a:spAutoFit/>
+          </a:bodyPr>
+          <a:lstStyle/>
+          <a:p>
+            <a:pPr algn="r"/>
+            <a:r>
+              <a:rPr lang="en-US" b="1" dirty="0">
+                <a:solidFill>
+                  <a:srgbClr val="ED7D31"/>
+                </a:solidFill>
+                <a:latin typeface="Segoe Condensed" panose="020B0606040200020203" pitchFamily="34" charset="0"/>
+              </a:rPr>
+              <a:t>A6</a:t>
+            </a:r>
+            <a:endParaRPr lang="en-US" b="1" baseline="-25000" dirty="0">
+              <a:solidFill>
+                <a:srgbClr val="ED7D31"/>
+              </a:solidFill>
+              <a:latin typeface="Segoe Condensed" panose="020B0606040200020203" pitchFamily="34" charset="0"/>
+            </a:endParaRPr>
+          </a:p>
+          <a:p>
+            <a:pPr algn="r"/>
+            <a:r>
+              <a:rPr lang="en-US" sz="1200" dirty="0">
+                <a:solidFill>
+                  <a:srgbClr val="ED7D31"/>
+                </a:solidFill>
+                <a:latin typeface="Segoe Condensed" panose="020B0606040200020203" pitchFamily="34" charset="0"/>
+              </a:rPr>
+              <a:t>Supports capacitive touch.</a:t>
+            </a:r>
+            <a:endParaRPr lang="en-US" sz="1600" dirty="0">
+              <a:solidFill>
+                <a:srgbClr val="ED7D31"/>
+              </a:solidFill>
+              <a:latin typeface="Segoe Condensed" panose="020B0606040200020203" pitchFamily="34" charset="0"/>
+            </a:endParaRPr>
+          </a:p>
+        </p:txBody>
+      </p:sp>
+      <p:sp>
+        <p:nvSpPr>
+          <p:cNvPr id="40" name="TextBox 39">
+            <a:extLst>
+              <a:ext uri="{FF2B5EF4-FFF2-40B4-BE49-F238E27FC236}">
+                <a16:creationId xmlns:a16="http://schemas.microsoft.com/office/drawing/2014/main" id="{8FE75F4F-58AE-8944-333C-5CC26EDFF99E}"/>
+              </a:ext>
+            </a:extLst>
+          </p:cNvPr>
+          <p:cNvSpPr txBox="1"/>
+          <p:nvPr/>
+        </p:nvSpPr>
+        <p:spPr>
+          <a:xfrm>
+            <a:off x="1067336" y="4876520"/>
+            <a:ext cx="3315359" cy="553998"/>
+          </a:xfrm>
+          <a:prstGeom prst="rect">
+            <a:avLst/>
+          </a:prstGeom>
+          <a:noFill/>
+        </p:spPr>
+        <p:txBody>
+          <a:bodyPr wrap="square" rtlCol="0">
+            <a:spAutoFit/>
+          </a:bodyPr>
+          <a:lstStyle/>
+          <a:p>
+            <a:pPr algn="r"/>
+            <a:r>
+              <a:rPr lang="en-US" b="1" dirty="0">
+                <a:solidFill>
+                  <a:srgbClr val="ED7D31"/>
+                </a:solidFill>
+                <a:latin typeface="Segoe Condensed" panose="020B0606040200020203" pitchFamily="34" charset="0"/>
+              </a:rPr>
+              <a:t>A7</a:t>
+            </a:r>
+            <a:endParaRPr lang="en-US" b="1" baseline="-25000" dirty="0">
+              <a:solidFill>
+                <a:srgbClr val="ED7D31"/>
+              </a:solidFill>
+              <a:latin typeface="Segoe Condensed" panose="020B0606040200020203" pitchFamily="34" charset="0"/>
+            </a:endParaRPr>
+          </a:p>
+          <a:p>
+            <a:pPr algn="r"/>
+            <a:r>
+              <a:rPr lang="en-US" sz="1200" dirty="0">
+                <a:solidFill>
+                  <a:srgbClr val="ED7D31"/>
+                </a:solidFill>
+                <a:latin typeface="Segoe Condensed" panose="020B0606040200020203" pitchFamily="34" charset="0"/>
+              </a:rPr>
+              <a:t>Supports capacitive touch.</a:t>
+            </a:r>
+            <a:endParaRPr lang="en-US" sz="1600" dirty="0">
+              <a:solidFill>
+                <a:srgbClr val="ED7D31"/>
+              </a:solidFill>
+              <a:latin typeface="Segoe Condensed" panose="020B0606040200020203" pitchFamily="34" charset="0"/>
+            </a:endParaRPr>
+          </a:p>
+        </p:txBody>
+      </p:sp>
+    </p:spTree>
+    <p:extLst>
+      <p:ext uri="{BB962C8B-B14F-4D97-AF65-F5344CB8AC3E}">
+        <p14:creationId xmlns:p14="http://schemas.microsoft.com/office/powerpoint/2010/main" val="33672294"/>
+      </p:ext>
+    </p:extLst>
+  </p:cSld>
+  <p:clrMapOvr>
+    <a:masterClrMapping/>
+  </p:clrMapOvr>
+</p:sld>
+</file>
+
+<file path=ppt/slides/slide16.xml><?xml version="1.0" encoding="utf-8"?>
 <p:sld xmlns:a="http://schemas.openxmlformats.org/drawingml/2006/main" xmlns:r="http://schemas.openxmlformats.org/officeDocument/2006/relationships" xmlns:p="http://schemas.openxmlformats.org/presentationml/2006/main">
   <p:cSld>
     <p:spTree>

</xml_diff>

<commit_message>
added more cpx fritzing circuit diagrams
</commit_message>
<xml_diff>
--- a/cpx/CPX.pptx
+++ b/cpx/CPX.pptx
@@ -5,7 +5,7 @@
     <p:sldMasterId id="2147483648" r:id="rId1"/>
   </p:sldMasterIdLst>
   <p:notesMasterIdLst>
-    <p:notesMasterId r:id="rId18"/>
+    <p:notesMasterId r:id="rId19"/>
   </p:notesMasterIdLst>
   <p:sldIdLst>
     <p:sldId id="256" r:id="rId2"/>
@@ -18,12 +18,13 @@
     <p:sldId id="261" r:id="rId9"/>
     <p:sldId id="265" r:id="rId10"/>
     <p:sldId id="268" r:id="rId11"/>
-    <p:sldId id="266" r:id="rId12"/>
-    <p:sldId id="270" r:id="rId13"/>
-    <p:sldId id="267" r:id="rId14"/>
-    <p:sldId id="269" r:id="rId15"/>
-    <p:sldId id="271" r:id="rId16"/>
-    <p:sldId id="264" r:id="rId17"/>
+    <p:sldId id="272" r:id="rId12"/>
+    <p:sldId id="266" r:id="rId13"/>
+    <p:sldId id="270" r:id="rId14"/>
+    <p:sldId id="267" r:id="rId15"/>
+    <p:sldId id="269" r:id="rId16"/>
+    <p:sldId id="271" r:id="rId17"/>
+    <p:sldId id="264" r:id="rId18"/>
   </p:sldIdLst>
   <p:sldSz cx="12192000" cy="6858000"/>
   <p:notesSz cx="6858000" cy="9144000"/>
@@ -212,7 +213,7 @@
           <a:p>
             <a:fld id="{50945AAA-A64C-433D-AA04-308BEDFA8581}" type="datetimeFigureOut">
               <a:rPr lang="en-US" smtClean="0"/>
-              <a:t>1/19/2023</a:t>
+              <a:t>1/28/2024</a:t>
             </a:fld>
             <a:endParaRPr lang="en-US"/>
           </a:p>
@@ -615,15 +616,6 @@
               <a:t>https://learn.adafruit.com/adafruit-circuit-playground-express/guided-tour</a:t>
             </a:r>
           </a:p>
-          <a:p>
-            <a:endParaRPr lang="en-US" dirty="0"/>
-          </a:p>
-          <a:p>
-            <a:r>
-              <a:rPr lang="en-US" dirty="0"/>
-              <a:t>https://learn.adafruit.com/adafruit-circuit-playground-express/pinouts</a:t>
-            </a:r>
-          </a:p>
         </p:txBody>
       </p:sp>
       <p:sp>
@@ -652,7 +644,7 @@
     </p:spTree>
     <p:extLst>
       <p:ext uri="{BB962C8B-B14F-4D97-AF65-F5344CB8AC3E}">
-        <p14:creationId xmlns:p14="http://schemas.microsoft.com/office/powerpoint/2010/main" val="495886665"/>
+        <p14:creationId xmlns:p14="http://schemas.microsoft.com/office/powerpoint/2010/main" val="1657849380"/>
       </p:ext>
     </p:extLst>
   </p:cSld>
@@ -711,6 +703,15 @@
               <a:t>https://learn.adafruit.com/adafruit-circuit-playground-express/guided-tour</a:t>
             </a:r>
           </a:p>
+          <a:p>
+            <a:endParaRPr lang="en-US" dirty="0"/>
+          </a:p>
+          <a:p>
+            <a:r>
+              <a:rPr lang="en-US" dirty="0"/>
+              <a:t>https://learn.adafruit.com/adafruit-circuit-playground-express/pinouts</a:t>
+            </a:r>
+          </a:p>
         </p:txBody>
       </p:sp>
       <p:sp>
@@ -739,7 +740,7 @@
     </p:spTree>
     <p:extLst>
       <p:ext uri="{BB962C8B-B14F-4D97-AF65-F5344CB8AC3E}">
-        <p14:creationId xmlns:p14="http://schemas.microsoft.com/office/powerpoint/2010/main" val="4036427155"/>
+        <p14:creationId xmlns:p14="http://schemas.microsoft.com/office/powerpoint/2010/main" val="495886665"/>
       </p:ext>
     </p:extLst>
   </p:cSld>
@@ -826,7 +827,7 @@
     </p:spTree>
     <p:extLst>
       <p:ext uri="{BB962C8B-B14F-4D97-AF65-F5344CB8AC3E}">
-        <p14:creationId xmlns:p14="http://schemas.microsoft.com/office/powerpoint/2010/main" val="2830599142"/>
+        <p14:creationId xmlns:p14="http://schemas.microsoft.com/office/powerpoint/2010/main" val="4036427155"/>
       </p:ext>
     </p:extLst>
   </p:cSld>
@@ -882,7 +883,7 @@
           <a:p>
             <a:r>
               <a:rPr lang="en-US" dirty="0"/>
-              <a:t>https://krisswanson.blog/2017/05/05/circuit-circuit-a-makey-makey-like-setup-for-the-adafruit-circuit-playground/</a:t>
+              <a:t>https://learn.adafruit.com/adafruit-circuit-playground-express/guided-tour</a:t>
             </a:r>
           </a:p>
         </p:txBody>
@@ -905,6 +906,93 @@
             <a:fld id="{71596CF9-A975-4239-BDE0-B84240AD6B4E}" type="slidenum">
               <a:rPr lang="en-US" smtClean="0"/>
               <a:t>16</a:t>
+            </a:fld>
+            <a:endParaRPr lang="en-US"/>
+          </a:p>
+        </p:txBody>
+      </p:sp>
+    </p:spTree>
+    <p:extLst>
+      <p:ext uri="{BB962C8B-B14F-4D97-AF65-F5344CB8AC3E}">
+        <p14:creationId xmlns:p14="http://schemas.microsoft.com/office/powerpoint/2010/main" val="2830599142"/>
+      </p:ext>
+    </p:extLst>
+  </p:cSld>
+  <p:clrMapOvr>
+    <a:masterClrMapping/>
+  </p:clrMapOvr>
+</p:notes>
+</file>
+
+<file path=ppt/notesSlides/notesSlide14.xml><?xml version="1.0" encoding="utf-8"?>
+<p:notes xmlns:a="http://schemas.openxmlformats.org/drawingml/2006/main" xmlns:r="http://schemas.openxmlformats.org/officeDocument/2006/relationships" xmlns:p="http://schemas.openxmlformats.org/presentationml/2006/main">
+  <p:cSld>
+    <p:spTree>
+      <p:nvGrpSpPr>
+        <p:cNvPr id="1" name=""/>
+        <p:cNvGrpSpPr/>
+        <p:nvPr/>
+      </p:nvGrpSpPr>
+      <p:grpSpPr>
+        <a:xfrm>
+          <a:off x="0" y="0"/>
+          <a:ext cx="0" cy="0"/>
+          <a:chOff x="0" y="0"/>
+          <a:chExt cx="0" cy="0"/>
+        </a:xfrm>
+      </p:grpSpPr>
+      <p:sp>
+        <p:nvSpPr>
+          <p:cNvPr id="2" name="Slide Image Placeholder 1"/>
+          <p:cNvSpPr>
+            <a:spLocks noGrp="1" noRot="1" noChangeAspect="1"/>
+          </p:cNvSpPr>
+          <p:nvPr>
+            <p:ph type="sldImg"/>
+          </p:nvPr>
+        </p:nvSpPr>
+        <p:spPr/>
+      </p:sp>
+      <p:sp>
+        <p:nvSpPr>
+          <p:cNvPr id="3" name="Notes Placeholder 2"/>
+          <p:cNvSpPr>
+            <a:spLocks noGrp="1"/>
+          </p:cNvSpPr>
+          <p:nvPr>
+            <p:ph type="body" idx="1"/>
+          </p:nvPr>
+        </p:nvSpPr>
+        <p:spPr/>
+        <p:txBody>
+          <a:bodyPr/>
+          <a:lstStyle/>
+          <a:p>
+            <a:r>
+              <a:rPr lang="en-US" dirty="0"/>
+              <a:t>https://krisswanson.blog/2017/05/05/circuit-circuit-a-makey-makey-like-setup-for-the-adafruit-circuit-playground/</a:t>
+            </a:r>
+          </a:p>
+        </p:txBody>
+      </p:sp>
+      <p:sp>
+        <p:nvSpPr>
+          <p:cNvPr id="4" name="Slide Number Placeholder 3"/>
+          <p:cNvSpPr>
+            <a:spLocks noGrp="1"/>
+          </p:cNvSpPr>
+          <p:nvPr>
+            <p:ph type="sldNum" sz="quarter" idx="5"/>
+          </p:nvPr>
+        </p:nvSpPr>
+        <p:spPr/>
+        <p:txBody>
+          <a:bodyPr/>
+          <a:lstStyle/>
+          <a:p>
+            <a:fld id="{71596CF9-A975-4239-BDE0-B84240AD6B4E}" type="slidenum">
+              <a:rPr lang="en-US" smtClean="0"/>
+              <a:t>17</a:t>
             </a:fld>
             <a:endParaRPr lang="en-US"/>
           </a:p>
@@ -1522,7 +1610,7 @@
     </p:spTree>
     <p:extLst>
       <p:ext uri="{BB962C8B-B14F-4D97-AF65-F5344CB8AC3E}">
-        <p14:creationId xmlns:p14="http://schemas.microsoft.com/office/powerpoint/2010/main" val="1138593247"/>
+        <p14:creationId xmlns:p14="http://schemas.microsoft.com/office/powerpoint/2010/main" val="52787969"/>
       </p:ext>
     </p:extLst>
   </p:cSld>
@@ -1609,7 +1697,7 @@
     </p:spTree>
     <p:extLst>
       <p:ext uri="{BB962C8B-B14F-4D97-AF65-F5344CB8AC3E}">
-        <p14:creationId xmlns:p14="http://schemas.microsoft.com/office/powerpoint/2010/main" val="1657849380"/>
+        <p14:creationId xmlns:p14="http://schemas.microsoft.com/office/powerpoint/2010/main" val="1138593247"/>
       </p:ext>
     </p:extLst>
   </p:cSld>
@@ -1766,7 +1854,7 @@
           <a:p>
             <a:fld id="{568E76DE-1A27-4093-8228-AE39B1D03AFB}" type="datetimeFigureOut">
               <a:rPr lang="en-US" smtClean="0"/>
-              <a:t>1/19/2023</a:t>
+              <a:t>1/28/2024</a:t>
             </a:fld>
             <a:endParaRPr lang="en-US"/>
           </a:p>
@@ -1964,7 +2052,7 @@
           <a:p>
             <a:fld id="{568E76DE-1A27-4093-8228-AE39B1D03AFB}" type="datetimeFigureOut">
               <a:rPr lang="en-US" smtClean="0"/>
-              <a:t>1/19/2023</a:t>
+              <a:t>1/28/2024</a:t>
             </a:fld>
             <a:endParaRPr lang="en-US"/>
           </a:p>
@@ -2172,7 +2260,7 @@
           <a:p>
             <a:fld id="{568E76DE-1A27-4093-8228-AE39B1D03AFB}" type="datetimeFigureOut">
               <a:rPr lang="en-US" smtClean="0"/>
-              <a:t>1/19/2023</a:t>
+              <a:t>1/28/2024</a:t>
             </a:fld>
             <a:endParaRPr lang="en-US"/>
           </a:p>
@@ -2370,7 +2458,7 @@
           <a:p>
             <a:fld id="{568E76DE-1A27-4093-8228-AE39B1D03AFB}" type="datetimeFigureOut">
               <a:rPr lang="en-US" smtClean="0"/>
-              <a:t>1/19/2023</a:t>
+              <a:t>1/28/2024</a:t>
             </a:fld>
             <a:endParaRPr lang="en-US"/>
           </a:p>
@@ -2645,7 +2733,7 @@
           <a:p>
             <a:fld id="{568E76DE-1A27-4093-8228-AE39B1D03AFB}" type="datetimeFigureOut">
               <a:rPr lang="en-US" smtClean="0"/>
-              <a:t>1/19/2023</a:t>
+              <a:t>1/28/2024</a:t>
             </a:fld>
             <a:endParaRPr lang="en-US"/>
           </a:p>
@@ -2910,7 +2998,7 @@
           <a:p>
             <a:fld id="{568E76DE-1A27-4093-8228-AE39B1D03AFB}" type="datetimeFigureOut">
               <a:rPr lang="en-US" smtClean="0"/>
-              <a:t>1/19/2023</a:t>
+              <a:t>1/28/2024</a:t>
             </a:fld>
             <a:endParaRPr lang="en-US"/>
           </a:p>
@@ -3322,7 +3410,7 @@
           <a:p>
             <a:fld id="{568E76DE-1A27-4093-8228-AE39B1D03AFB}" type="datetimeFigureOut">
               <a:rPr lang="en-US" smtClean="0"/>
-              <a:t>1/19/2023</a:t>
+              <a:t>1/28/2024</a:t>
             </a:fld>
             <a:endParaRPr lang="en-US"/>
           </a:p>
@@ -3463,7 +3551,7 @@
           <a:p>
             <a:fld id="{568E76DE-1A27-4093-8228-AE39B1D03AFB}" type="datetimeFigureOut">
               <a:rPr lang="en-US" smtClean="0"/>
-              <a:t>1/19/2023</a:t>
+              <a:t>1/28/2024</a:t>
             </a:fld>
             <a:endParaRPr lang="en-US"/>
           </a:p>
@@ -3576,7 +3664,7 @@
           <a:p>
             <a:fld id="{568E76DE-1A27-4093-8228-AE39B1D03AFB}" type="datetimeFigureOut">
               <a:rPr lang="en-US" smtClean="0"/>
-              <a:t>1/19/2023</a:t>
+              <a:t>1/28/2024</a:t>
             </a:fld>
             <a:endParaRPr lang="en-US"/>
           </a:p>
@@ -3887,7 +3975,7 @@
           <a:p>
             <a:fld id="{568E76DE-1A27-4093-8228-AE39B1D03AFB}" type="datetimeFigureOut">
               <a:rPr lang="en-US" smtClean="0"/>
-              <a:t>1/19/2023</a:t>
+              <a:t>1/28/2024</a:t>
             </a:fld>
             <a:endParaRPr lang="en-US"/>
           </a:p>
@@ -4175,7 +4263,7 @@
           <a:p>
             <a:fld id="{568E76DE-1A27-4093-8228-AE39B1D03AFB}" type="datetimeFigureOut">
               <a:rPr lang="en-US" smtClean="0"/>
-              <a:t>1/19/2023</a:t>
+              <a:t>1/28/2024</a:t>
             </a:fld>
             <a:endParaRPr lang="en-US"/>
           </a:p>
@@ -4416,7 +4504,7 @@
           <a:p>
             <a:fld id="{568E76DE-1A27-4093-8228-AE39B1D03AFB}" type="datetimeFigureOut">
               <a:rPr lang="en-US" smtClean="0"/>
-              <a:t>1/19/2023</a:t>
+              <a:t>1/28/2024</a:t>
             </a:fld>
             <a:endParaRPr lang="en-US"/>
           </a:p>
@@ -7510,6 +7598,2416 @@
 </file>
 
 <file path=ppt/slides/slide11.xml><?xml version="1.0" encoding="utf-8"?>
+<p:sld xmlns:a="http://schemas.openxmlformats.org/drawingml/2006/main" xmlns:r="http://schemas.openxmlformats.org/officeDocument/2006/relationships" xmlns:p="http://schemas.openxmlformats.org/presentationml/2006/main">
+  <p:cSld>
+    <p:spTree>
+      <p:nvGrpSpPr>
+        <p:cNvPr id="1" name=""/>
+        <p:cNvGrpSpPr/>
+        <p:nvPr/>
+      </p:nvGrpSpPr>
+      <p:grpSpPr>
+        <a:xfrm>
+          <a:off x="0" y="0"/>
+          <a:ext cx="0" cy="0"/>
+          <a:chOff x="0" y="0"/>
+          <a:chExt cx="0" cy="0"/>
+        </a:xfrm>
+      </p:grpSpPr>
+      <p:pic>
+        <p:nvPicPr>
+          <p:cNvPr id="4" name="Picture 2">
+            <a:extLst>
+              <a:ext uri="{FF2B5EF4-FFF2-40B4-BE49-F238E27FC236}">
+                <a16:creationId xmlns:a16="http://schemas.microsoft.com/office/drawing/2014/main" id="{44461B67-A181-421A-889F-3D02021FFF0C}"/>
+              </a:ext>
+            </a:extLst>
+          </p:cNvPr>
+          <p:cNvPicPr>
+            <a:picLocks noChangeAspect="1" noChangeArrowheads="1"/>
+          </p:cNvPicPr>
+          <p:nvPr/>
+        </p:nvPicPr>
+        <p:blipFill>
+          <a:blip r:embed="rId3">
+            <a:extLst>
+              <a:ext uri="{28A0092B-C50C-407E-A947-70E740481C1C}">
+                <a14:useLocalDpi xmlns:a14="http://schemas.microsoft.com/office/drawing/2010/main" val="0"/>
+              </a:ext>
+            </a:extLst>
+          </a:blip>
+          <a:srcRect/>
+          <a:stretch>
+            <a:fillRect/>
+          </a:stretch>
+        </p:blipFill>
+        <p:spPr bwMode="auto">
+          <a:xfrm>
+            <a:off x="3054909" y="676111"/>
+            <a:ext cx="6096000" cy="6096000"/>
+          </a:xfrm>
+          <a:prstGeom prst="rect">
+            <a:avLst/>
+          </a:prstGeom>
+          <a:noFill/>
+          <a:extLst>
+            <a:ext uri="{909E8E84-426E-40DD-AFC4-6F175D3DCCD1}">
+              <a14:hiddenFill xmlns:a14="http://schemas.microsoft.com/office/drawing/2010/main">
+                <a:solidFill>
+                  <a:srgbClr val="FFFFFF"/>
+                </a:solidFill>
+              </a14:hiddenFill>
+            </a:ext>
+          </a:extLst>
+        </p:spPr>
+      </p:pic>
+      <p:pic>
+        <p:nvPicPr>
+          <p:cNvPr id="44" name="Picture 4">
+            <a:extLst>
+              <a:ext uri="{FF2B5EF4-FFF2-40B4-BE49-F238E27FC236}">
+                <a16:creationId xmlns:a16="http://schemas.microsoft.com/office/drawing/2014/main" id="{DD2F5E64-EE01-40F6-BFD3-EE21CED1CDED}"/>
+              </a:ext>
+            </a:extLst>
+          </p:cNvPr>
+          <p:cNvPicPr>
+            <a:picLocks noChangeAspect="1" noChangeArrowheads="1"/>
+          </p:cNvPicPr>
+          <p:nvPr/>
+        </p:nvPicPr>
+        <p:blipFill>
+          <a:blip r:embed="rId4">
+            <a:extLst>
+              <a:ext uri="{28A0092B-C50C-407E-A947-70E740481C1C}">
+                <a14:useLocalDpi xmlns:a14="http://schemas.microsoft.com/office/drawing/2010/main" val="0"/>
+              </a:ext>
+            </a:extLst>
+          </a:blip>
+          <a:srcRect/>
+          <a:stretch>
+            <a:fillRect/>
+          </a:stretch>
+        </p:blipFill>
+        <p:spPr bwMode="auto">
+          <a:xfrm>
+            <a:off x="3877452" y="1485560"/>
+            <a:ext cx="4406986" cy="4406986"/>
+          </a:xfrm>
+          <a:prstGeom prst="rect">
+            <a:avLst/>
+          </a:prstGeom>
+          <a:noFill/>
+          <a:extLst>
+            <a:ext uri="{909E8E84-426E-40DD-AFC4-6F175D3DCCD1}">
+              <a14:hiddenFill xmlns:a14="http://schemas.microsoft.com/office/drawing/2010/main">
+                <a:solidFill>
+                  <a:srgbClr val="FFFFFF"/>
+                </a:solidFill>
+              </a14:hiddenFill>
+            </a:ext>
+          </a:extLst>
+        </p:spPr>
+      </p:pic>
+      <p:sp>
+        <p:nvSpPr>
+          <p:cNvPr id="2" name="Freeform: Shape 1">
+            <a:extLst>
+              <a:ext uri="{FF2B5EF4-FFF2-40B4-BE49-F238E27FC236}">
+                <a16:creationId xmlns:a16="http://schemas.microsoft.com/office/drawing/2014/main" id="{E05D17FC-538C-1FFD-A118-2932B2033AE3}"/>
+              </a:ext>
+            </a:extLst>
+          </p:cNvPr>
+          <p:cNvSpPr/>
+          <p:nvPr/>
+        </p:nvSpPr>
+        <p:spPr>
+          <a:xfrm>
+            <a:off x="4230229" y="1789921"/>
+            <a:ext cx="3721608" cy="3721608"/>
+          </a:xfrm>
+          <a:custGeom>
+            <a:avLst/>
+            <a:gdLst>
+              <a:gd name="connsiteX0" fmla="*/ 1860804 w 3721608"/>
+              <a:gd name="connsiteY0" fmla="*/ 0 h 3721608"/>
+              <a:gd name="connsiteX1" fmla="*/ 3027130 w 3721608"/>
+              <a:gd name="connsiteY1" fmla="*/ 410798 h 3721608"/>
+              <a:gd name="connsiteX2" fmla="*/ 3170679 w 3721608"/>
+              <a:gd name="connsiteY2" fmla="*/ 542833 h 3721608"/>
+              <a:gd name="connsiteX3" fmla="*/ 3015458 w 3721608"/>
+              <a:gd name="connsiteY3" fmla="*/ 654952 h 3721608"/>
+              <a:gd name="connsiteX4" fmla="*/ 2995668 w 3721608"/>
+              <a:gd name="connsiteY4" fmla="*/ 669247 h 3721608"/>
+              <a:gd name="connsiteX5" fmla="*/ 2996856 w 3721608"/>
+              <a:gd name="connsiteY5" fmla="*/ 670892 h 3721608"/>
+              <a:gd name="connsiteX6" fmla="*/ 2976925 w 3721608"/>
+              <a:gd name="connsiteY6" fmla="*/ 687970 h 3721608"/>
+              <a:gd name="connsiteX7" fmla="*/ 2933190 w 3721608"/>
+              <a:gd name="connsiteY7" fmla="*/ 969591 h 3721608"/>
+              <a:gd name="connsiteX8" fmla="*/ 3214287 w 3721608"/>
+              <a:gd name="connsiteY8" fmla="*/ 1016582 h 3721608"/>
+              <a:gd name="connsiteX9" fmla="*/ 3236764 w 3721608"/>
+              <a:gd name="connsiteY9" fmla="*/ 1003028 h 3721608"/>
+              <a:gd name="connsiteX10" fmla="*/ 3237952 w 3721608"/>
+              <a:gd name="connsiteY10" fmla="*/ 1004673 h 3721608"/>
+              <a:gd name="connsiteX11" fmla="*/ 3257742 w 3721608"/>
+              <a:gd name="connsiteY11" fmla="*/ 990378 h 3721608"/>
+              <a:gd name="connsiteX12" fmla="*/ 3429168 w 3721608"/>
+              <a:gd name="connsiteY12" fmla="*/ 866555 h 3721608"/>
+              <a:gd name="connsiteX13" fmla="*/ 3497019 w 3721608"/>
+              <a:gd name="connsiteY13" fmla="*/ 973834 h 3721608"/>
+              <a:gd name="connsiteX14" fmla="*/ 3529588 w 3721608"/>
+              <a:gd name="connsiteY14" fmla="*/ 1041442 h 3721608"/>
+              <a:gd name="connsiteX15" fmla="*/ 3362962 w 3721608"/>
+              <a:gd name="connsiteY15" fmla="*/ 1103515 h 3721608"/>
+              <a:gd name="connsiteX16" fmla="*/ 3340085 w 3721608"/>
+              <a:gd name="connsiteY16" fmla="*/ 1112037 h 3721608"/>
+              <a:gd name="connsiteX17" fmla="*/ 3340794 w 3721608"/>
+              <a:gd name="connsiteY17" fmla="*/ 1113938 h 3721608"/>
+              <a:gd name="connsiteX18" fmla="*/ 3317041 w 3721608"/>
+              <a:gd name="connsiteY18" fmla="*/ 1125107 h 3721608"/>
+              <a:gd name="connsiteX19" fmla="*/ 3200048 w 3721608"/>
+              <a:gd name="connsiteY19" fmla="*/ 1384984 h 3721608"/>
+              <a:gd name="connsiteX20" fmla="*/ 3458554 w 3721608"/>
+              <a:gd name="connsiteY20" fmla="*/ 1504976 h 3721608"/>
+              <a:gd name="connsiteX21" fmla="*/ 3483824 w 3721608"/>
+              <a:gd name="connsiteY21" fmla="*/ 1497882 h 3721608"/>
+              <a:gd name="connsiteX22" fmla="*/ 3484532 w 3721608"/>
+              <a:gd name="connsiteY22" fmla="*/ 1499783 h 3721608"/>
+              <a:gd name="connsiteX23" fmla="*/ 3507410 w 3721608"/>
+              <a:gd name="connsiteY23" fmla="*/ 1491261 h 3721608"/>
+              <a:gd name="connsiteX24" fmla="*/ 3669668 w 3721608"/>
+              <a:gd name="connsiteY24" fmla="*/ 1430815 h 3721608"/>
+              <a:gd name="connsiteX25" fmla="*/ 3683803 w 3721608"/>
+              <a:gd name="connsiteY25" fmla="*/ 1485787 h 3721608"/>
+              <a:gd name="connsiteX26" fmla="*/ 3721608 w 3721608"/>
+              <a:gd name="connsiteY26" fmla="*/ 1860804 h 3721608"/>
+              <a:gd name="connsiteX27" fmla="*/ 3683803 w 3721608"/>
+              <a:gd name="connsiteY27" fmla="*/ 2235821 h 3721608"/>
+              <a:gd name="connsiteX28" fmla="*/ 3668199 w 3721608"/>
+              <a:gd name="connsiteY28" fmla="*/ 2296507 h 3721608"/>
+              <a:gd name="connsiteX29" fmla="*/ 3521153 w 3721608"/>
+              <a:gd name="connsiteY29" fmla="*/ 2233674 h 3721608"/>
+              <a:gd name="connsiteX30" fmla="*/ 3498704 w 3721608"/>
+              <a:gd name="connsiteY30" fmla="*/ 2224081 h 3721608"/>
+              <a:gd name="connsiteX31" fmla="*/ 3497907 w 3721608"/>
+              <a:gd name="connsiteY31" fmla="*/ 2225947 h 3721608"/>
+              <a:gd name="connsiteX32" fmla="*/ 3472999 w 3721608"/>
+              <a:gd name="connsiteY32" fmla="*/ 2217668 h 3721608"/>
+              <a:gd name="connsiteX33" fmla="*/ 3209118 w 3721608"/>
+              <a:gd name="connsiteY33" fmla="*/ 2325326 h 3721608"/>
+              <a:gd name="connsiteX34" fmla="*/ 3313715 w 3721608"/>
+              <a:gd name="connsiteY34" fmla="*/ 2590435 h 3721608"/>
+              <a:gd name="connsiteX35" fmla="*/ 3336914 w 3721608"/>
+              <a:gd name="connsiteY35" fmla="*/ 2602712 h 3721608"/>
+              <a:gd name="connsiteX36" fmla="*/ 3336117 w 3721608"/>
+              <a:gd name="connsiteY36" fmla="*/ 2604578 h 3721608"/>
+              <a:gd name="connsiteX37" fmla="*/ 3358566 w 3721608"/>
+              <a:gd name="connsiteY37" fmla="*/ 2614170 h 3721608"/>
+              <a:gd name="connsiteX38" fmla="*/ 3526758 w 3721608"/>
+              <a:gd name="connsiteY38" fmla="*/ 2686039 h 3721608"/>
+              <a:gd name="connsiteX39" fmla="*/ 3497019 w 3721608"/>
+              <a:gd name="connsiteY39" fmla="*/ 2747774 h 3721608"/>
+              <a:gd name="connsiteX40" fmla="*/ 1860804 w 3721608"/>
+              <a:gd name="connsiteY40" fmla="*/ 3721608 h 3721608"/>
+              <a:gd name="connsiteX41" fmla="*/ 694478 w 3721608"/>
+              <a:gd name="connsiteY41" fmla="*/ 3310810 h 3721608"/>
+              <a:gd name="connsiteX42" fmla="*/ 623876 w 3721608"/>
+              <a:gd name="connsiteY42" fmla="*/ 3245871 h 3721608"/>
+              <a:gd name="connsiteX43" fmla="*/ 634440 w 3721608"/>
+              <a:gd name="connsiteY43" fmla="*/ 3238490 h 3721608"/>
+              <a:gd name="connsiteX44" fmla="*/ 654452 w 3721608"/>
+              <a:gd name="connsiteY44" fmla="*/ 3224507 h 3721608"/>
+              <a:gd name="connsiteX45" fmla="*/ 653290 w 3721608"/>
+              <a:gd name="connsiteY45" fmla="*/ 3222845 h 3721608"/>
+              <a:gd name="connsiteX46" fmla="*/ 663375 w 3721608"/>
+              <a:gd name="connsiteY46" fmla="*/ 3214474 h 3721608"/>
+              <a:gd name="connsiteX47" fmla="*/ 701524 w 3721608"/>
+              <a:gd name="connsiteY47" fmla="*/ 3219549 h 3721608"/>
+              <a:gd name="connsiteX48" fmla="*/ 832378 w 3721608"/>
+              <a:gd name="connsiteY48" fmla="*/ 3179629 h 3721608"/>
+              <a:gd name="connsiteX49" fmla="*/ 850515 w 3721608"/>
+              <a:gd name="connsiteY49" fmla="*/ 2821920 h 3721608"/>
+              <a:gd name="connsiteX50" fmla="*/ 501609 w 3721608"/>
+              <a:gd name="connsiteY50" fmla="*/ 2740993 h 3721608"/>
+              <a:gd name="connsiteX51" fmla="*/ 427245 w 3721608"/>
+              <a:gd name="connsiteY51" fmla="*/ 2855825 h 3721608"/>
+              <a:gd name="connsiteX52" fmla="*/ 423031 w 3721608"/>
+              <a:gd name="connsiteY52" fmla="*/ 2884420 h 3721608"/>
+              <a:gd name="connsiteX53" fmla="*/ 418630 w 3721608"/>
+              <a:gd name="connsiteY53" fmla="*/ 2886980 h 3721608"/>
+              <a:gd name="connsiteX54" fmla="*/ 417468 w 3721608"/>
+              <a:gd name="connsiteY54" fmla="*/ 2885317 h 3721608"/>
+              <a:gd name="connsiteX55" fmla="*/ 397455 w 3721608"/>
+              <a:gd name="connsiteY55" fmla="*/ 2899299 h 3721608"/>
+              <a:gd name="connsiteX56" fmla="*/ 344031 w 3721608"/>
+              <a:gd name="connsiteY56" fmla="*/ 2936625 h 3721608"/>
+              <a:gd name="connsiteX57" fmla="*/ 224589 w 3721608"/>
+              <a:gd name="connsiteY57" fmla="*/ 2747774 h 3721608"/>
+              <a:gd name="connsiteX58" fmla="*/ 208466 w 3721608"/>
+              <a:gd name="connsiteY58" fmla="*/ 2714304 h 3721608"/>
+              <a:gd name="connsiteX59" fmla="*/ 236707 w 3721608"/>
+              <a:gd name="connsiteY59" fmla="*/ 2703546 h 3721608"/>
+              <a:gd name="connsiteX60" fmla="*/ 259520 w 3721608"/>
+              <a:gd name="connsiteY60" fmla="*/ 2694854 h 3721608"/>
+              <a:gd name="connsiteX61" fmla="*/ 258798 w 3721608"/>
+              <a:gd name="connsiteY61" fmla="*/ 2692959 h 3721608"/>
+              <a:gd name="connsiteX62" fmla="*/ 270617 w 3721608"/>
+              <a:gd name="connsiteY62" fmla="*/ 2687294 h 3721608"/>
+              <a:gd name="connsiteX63" fmla="*/ 306383 w 3721608"/>
+              <a:gd name="connsiteY63" fmla="*/ 2701501 h 3721608"/>
+              <a:gd name="connsiteX64" fmla="*/ 443018 w 3721608"/>
+              <a:gd name="connsiteY64" fmla="*/ 2694629 h 3721608"/>
+              <a:gd name="connsiteX65" fmla="*/ 547670 w 3721608"/>
+              <a:gd name="connsiteY65" fmla="*/ 2352090 h 3721608"/>
+              <a:gd name="connsiteX66" fmla="*/ 228951 w 3721608"/>
+              <a:gd name="connsiteY66" fmla="*/ 2188679 h 3721608"/>
+              <a:gd name="connsiteX67" fmla="*/ 128876 w 3721608"/>
+              <a:gd name="connsiteY67" fmla="*/ 2281959 h 3721608"/>
+              <a:gd name="connsiteX68" fmla="*/ 117829 w 3721608"/>
+              <a:gd name="connsiteY68" fmla="*/ 2308669 h 3721608"/>
+              <a:gd name="connsiteX69" fmla="*/ 112937 w 3721608"/>
+              <a:gd name="connsiteY69" fmla="*/ 2310081 h 3721608"/>
+              <a:gd name="connsiteX70" fmla="*/ 112215 w 3721608"/>
+              <a:gd name="connsiteY70" fmla="*/ 2308185 h 3721608"/>
+              <a:gd name="connsiteX71" fmla="*/ 89401 w 3721608"/>
+              <a:gd name="connsiteY71" fmla="*/ 2316876 h 3721608"/>
+              <a:gd name="connsiteX72" fmla="*/ 61390 w 3721608"/>
+              <a:gd name="connsiteY72" fmla="*/ 2327547 h 3721608"/>
+              <a:gd name="connsiteX73" fmla="*/ 37805 w 3721608"/>
+              <a:gd name="connsiteY73" fmla="*/ 2235821 h 3721608"/>
+              <a:gd name="connsiteX74" fmla="*/ 0 w 3721608"/>
+              <a:gd name="connsiteY74" fmla="*/ 1860804 h 3721608"/>
+              <a:gd name="connsiteX75" fmla="*/ 14951 w 3721608"/>
+              <a:gd name="connsiteY75" fmla="*/ 1623806 h 3721608"/>
+              <a:gd name="connsiteX76" fmla="*/ 47671 w 3721608"/>
+              <a:gd name="connsiteY76" fmla="*/ 1452795 h 3721608"/>
+              <a:gd name="connsiteX77" fmla="*/ 92757 w 3721608"/>
+              <a:gd name="connsiteY77" fmla="*/ 1468349 h 3721608"/>
+              <a:gd name="connsiteX78" fmla="*/ 115836 w 3721608"/>
+              <a:gd name="connsiteY78" fmla="*/ 1476310 h 3721608"/>
+              <a:gd name="connsiteX79" fmla="*/ 116497 w 3721608"/>
+              <a:gd name="connsiteY79" fmla="*/ 1474392 h 3721608"/>
+              <a:gd name="connsiteX80" fmla="*/ 129198 w 3721608"/>
+              <a:gd name="connsiteY80" fmla="*/ 1477625 h 3721608"/>
+              <a:gd name="connsiteX81" fmla="*/ 147531 w 3721608"/>
+              <a:gd name="connsiteY81" fmla="*/ 1511463 h 3721608"/>
+              <a:gd name="connsiteX82" fmla="*/ 256778 w 3721608"/>
+              <a:gd name="connsiteY82" fmla="*/ 1593813 h 3721608"/>
+              <a:gd name="connsiteX83" fmla="*/ 556744 w 3721608"/>
+              <a:gd name="connsiteY83" fmla="*/ 1398096 h 3721608"/>
+              <a:gd name="connsiteX84" fmla="*/ 416986 w 3721608"/>
+              <a:gd name="connsiteY84" fmla="*/ 1068320 h 3721608"/>
+              <a:gd name="connsiteX85" fmla="*/ 280378 w 3721608"/>
+              <a:gd name="connsiteY85" fmla="*/ 1075715 h 3721608"/>
+              <a:gd name="connsiteX86" fmla="*/ 254774 w 3721608"/>
+              <a:gd name="connsiteY86" fmla="*/ 1089126 h 3721608"/>
+              <a:gd name="connsiteX87" fmla="*/ 250114 w 3721608"/>
+              <a:gd name="connsiteY87" fmla="*/ 1087071 h 3721608"/>
+              <a:gd name="connsiteX88" fmla="*/ 250776 w 3721608"/>
+              <a:gd name="connsiteY88" fmla="*/ 1085154 h 3721608"/>
+              <a:gd name="connsiteX89" fmla="*/ 227698 w 3721608"/>
+              <a:gd name="connsiteY89" fmla="*/ 1077192 h 3721608"/>
+              <a:gd name="connsiteX90" fmla="*/ 183472 w 3721608"/>
+              <a:gd name="connsiteY90" fmla="*/ 1061935 h 3721608"/>
+              <a:gd name="connsiteX91" fmla="*/ 224589 w 3721608"/>
+              <a:gd name="connsiteY91" fmla="*/ 973834 h 3721608"/>
+              <a:gd name="connsiteX92" fmla="*/ 282157 w 3721608"/>
+              <a:gd name="connsiteY92" fmla="*/ 879076 h 3721608"/>
+              <a:gd name="connsiteX93" fmla="*/ 343265 w 3721608"/>
+              <a:gd name="connsiteY93" fmla="*/ 915632 h 3721608"/>
+              <a:gd name="connsiteX94" fmla="*/ 364215 w 3721608"/>
+              <a:gd name="connsiteY94" fmla="*/ 928164 h 3721608"/>
+              <a:gd name="connsiteX95" fmla="*/ 365256 w 3721608"/>
+              <a:gd name="connsiteY95" fmla="*/ 926423 h 3721608"/>
+              <a:gd name="connsiteX96" fmla="*/ 377022 w 3721608"/>
+              <a:gd name="connsiteY96" fmla="*/ 932196 h 3721608"/>
+              <a:gd name="connsiteX97" fmla="*/ 388013 w 3721608"/>
+              <a:gd name="connsiteY97" fmla="*/ 969079 h 3721608"/>
+              <a:gd name="connsiteX98" fmla="*/ 478011 w 3721608"/>
+              <a:gd name="connsiteY98" fmla="*/ 1072116 h 3721608"/>
+              <a:gd name="connsiteX99" fmla="*/ 811787 w 3721608"/>
+              <a:gd name="connsiteY99" fmla="*/ 942201 h 3721608"/>
+              <a:gd name="connsiteX100" fmla="*/ 742760 w 3721608"/>
+              <a:gd name="connsiteY100" fmla="*/ 590746 h 3721608"/>
+              <a:gd name="connsiteX101" fmla="*/ 607547 w 3721608"/>
+              <a:gd name="connsiteY101" fmla="*/ 569919 h 3721608"/>
+              <a:gd name="connsiteX102" fmla="*/ 579734 w 3721608"/>
+              <a:gd name="connsiteY102" fmla="*/ 577783 h 3721608"/>
+              <a:gd name="connsiteX103" fmla="*/ 575596 w 3721608"/>
+              <a:gd name="connsiteY103" fmla="*/ 574816 h 3721608"/>
+              <a:gd name="connsiteX104" fmla="*/ 576637 w 3721608"/>
+              <a:gd name="connsiteY104" fmla="*/ 573075 h 3721608"/>
+              <a:gd name="connsiteX105" fmla="*/ 555687 w 3721608"/>
+              <a:gd name="connsiteY105" fmla="*/ 560542 h 3721608"/>
+              <a:gd name="connsiteX106" fmla="*/ 539635 w 3721608"/>
+              <a:gd name="connsiteY106" fmla="*/ 550939 h 3721608"/>
+              <a:gd name="connsiteX107" fmla="*/ 545017 w 3721608"/>
+              <a:gd name="connsiteY107" fmla="*/ 545017 h 3721608"/>
+              <a:gd name="connsiteX108" fmla="*/ 1860804 w 3721608"/>
+              <a:gd name="connsiteY108" fmla="*/ 0 h 3721608"/>
+            </a:gdLst>
+            <a:ahLst/>
+            <a:cxnLst>
+              <a:cxn ang="0">
+                <a:pos x="connsiteX0" y="connsiteY0"/>
+              </a:cxn>
+              <a:cxn ang="0">
+                <a:pos x="connsiteX1" y="connsiteY1"/>
+              </a:cxn>
+              <a:cxn ang="0">
+                <a:pos x="connsiteX2" y="connsiteY2"/>
+              </a:cxn>
+              <a:cxn ang="0">
+                <a:pos x="connsiteX3" y="connsiteY3"/>
+              </a:cxn>
+              <a:cxn ang="0">
+                <a:pos x="connsiteX4" y="connsiteY4"/>
+              </a:cxn>
+              <a:cxn ang="0">
+                <a:pos x="connsiteX5" y="connsiteY5"/>
+              </a:cxn>
+              <a:cxn ang="0">
+                <a:pos x="connsiteX6" y="connsiteY6"/>
+              </a:cxn>
+              <a:cxn ang="0">
+                <a:pos x="connsiteX7" y="connsiteY7"/>
+              </a:cxn>
+              <a:cxn ang="0">
+                <a:pos x="connsiteX8" y="connsiteY8"/>
+              </a:cxn>
+              <a:cxn ang="0">
+                <a:pos x="connsiteX9" y="connsiteY9"/>
+              </a:cxn>
+              <a:cxn ang="0">
+                <a:pos x="connsiteX10" y="connsiteY10"/>
+              </a:cxn>
+              <a:cxn ang="0">
+                <a:pos x="connsiteX11" y="connsiteY11"/>
+              </a:cxn>
+              <a:cxn ang="0">
+                <a:pos x="connsiteX12" y="connsiteY12"/>
+              </a:cxn>
+              <a:cxn ang="0">
+                <a:pos x="connsiteX13" y="connsiteY13"/>
+              </a:cxn>
+              <a:cxn ang="0">
+                <a:pos x="connsiteX14" y="connsiteY14"/>
+              </a:cxn>
+              <a:cxn ang="0">
+                <a:pos x="connsiteX15" y="connsiteY15"/>
+              </a:cxn>
+              <a:cxn ang="0">
+                <a:pos x="connsiteX16" y="connsiteY16"/>
+              </a:cxn>
+              <a:cxn ang="0">
+                <a:pos x="connsiteX17" y="connsiteY17"/>
+              </a:cxn>
+              <a:cxn ang="0">
+                <a:pos x="connsiteX18" y="connsiteY18"/>
+              </a:cxn>
+              <a:cxn ang="0">
+                <a:pos x="connsiteX19" y="connsiteY19"/>
+              </a:cxn>
+              <a:cxn ang="0">
+                <a:pos x="connsiteX20" y="connsiteY20"/>
+              </a:cxn>
+              <a:cxn ang="0">
+                <a:pos x="connsiteX21" y="connsiteY21"/>
+              </a:cxn>
+              <a:cxn ang="0">
+                <a:pos x="connsiteX22" y="connsiteY22"/>
+              </a:cxn>
+              <a:cxn ang="0">
+                <a:pos x="connsiteX23" y="connsiteY23"/>
+              </a:cxn>
+              <a:cxn ang="0">
+                <a:pos x="connsiteX24" y="connsiteY24"/>
+              </a:cxn>
+              <a:cxn ang="0">
+                <a:pos x="connsiteX25" y="connsiteY25"/>
+              </a:cxn>
+              <a:cxn ang="0">
+                <a:pos x="connsiteX26" y="connsiteY26"/>
+              </a:cxn>
+              <a:cxn ang="0">
+                <a:pos x="connsiteX27" y="connsiteY27"/>
+              </a:cxn>
+              <a:cxn ang="0">
+                <a:pos x="connsiteX28" y="connsiteY28"/>
+              </a:cxn>
+              <a:cxn ang="0">
+                <a:pos x="connsiteX29" y="connsiteY29"/>
+              </a:cxn>
+              <a:cxn ang="0">
+                <a:pos x="connsiteX30" y="connsiteY30"/>
+              </a:cxn>
+              <a:cxn ang="0">
+                <a:pos x="connsiteX31" y="connsiteY31"/>
+              </a:cxn>
+              <a:cxn ang="0">
+                <a:pos x="connsiteX32" y="connsiteY32"/>
+              </a:cxn>
+              <a:cxn ang="0">
+                <a:pos x="connsiteX33" y="connsiteY33"/>
+              </a:cxn>
+              <a:cxn ang="0">
+                <a:pos x="connsiteX34" y="connsiteY34"/>
+              </a:cxn>
+              <a:cxn ang="0">
+                <a:pos x="connsiteX35" y="connsiteY35"/>
+              </a:cxn>
+              <a:cxn ang="0">
+                <a:pos x="connsiteX36" y="connsiteY36"/>
+              </a:cxn>
+              <a:cxn ang="0">
+                <a:pos x="connsiteX37" y="connsiteY37"/>
+              </a:cxn>
+              <a:cxn ang="0">
+                <a:pos x="connsiteX38" y="connsiteY38"/>
+              </a:cxn>
+              <a:cxn ang="0">
+                <a:pos x="connsiteX39" y="connsiteY39"/>
+              </a:cxn>
+              <a:cxn ang="0">
+                <a:pos x="connsiteX40" y="connsiteY40"/>
+              </a:cxn>
+              <a:cxn ang="0">
+                <a:pos x="connsiteX41" y="connsiteY41"/>
+              </a:cxn>
+              <a:cxn ang="0">
+                <a:pos x="connsiteX42" y="connsiteY42"/>
+              </a:cxn>
+              <a:cxn ang="0">
+                <a:pos x="connsiteX43" y="connsiteY43"/>
+              </a:cxn>
+              <a:cxn ang="0">
+                <a:pos x="connsiteX44" y="connsiteY44"/>
+              </a:cxn>
+              <a:cxn ang="0">
+                <a:pos x="connsiteX45" y="connsiteY45"/>
+              </a:cxn>
+              <a:cxn ang="0">
+                <a:pos x="connsiteX46" y="connsiteY46"/>
+              </a:cxn>
+              <a:cxn ang="0">
+                <a:pos x="connsiteX47" y="connsiteY47"/>
+              </a:cxn>
+              <a:cxn ang="0">
+                <a:pos x="connsiteX48" y="connsiteY48"/>
+              </a:cxn>
+              <a:cxn ang="0">
+                <a:pos x="connsiteX49" y="connsiteY49"/>
+              </a:cxn>
+              <a:cxn ang="0">
+                <a:pos x="connsiteX50" y="connsiteY50"/>
+              </a:cxn>
+              <a:cxn ang="0">
+                <a:pos x="connsiteX51" y="connsiteY51"/>
+              </a:cxn>
+              <a:cxn ang="0">
+                <a:pos x="connsiteX52" y="connsiteY52"/>
+              </a:cxn>
+              <a:cxn ang="0">
+                <a:pos x="connsiteX53" y="connsiteY53"/>
+              </a:cxn>
+              <a:cxn ang="0">
+                <a:pos x="connsiteX54" y="connsiteY54"/>
+              </a:cxn>
+              <a:cxn ang="0">
+                <a:pos x="connsiteX55" y="connsiteY55"/>
+              </a:cxn>
+              <a:cxn ang="0">
+                <a:pos x="connsiteX56" y="connsiteY56"/>
+              </a:cxn>
+              <a:cxn ang="0">
+                <a:pos x="connsiteX57" y="connsiteY57"/>
+              </a:cxn>
+              <a:cxn ang="0">
+                <a:pos x="connsiteX58" y="connsiteY58"/>
+              </a:cxn>
+              <a:cxn ang="0">
+                <a:pos x="connsiteX59" y="connsiteY59"/>
+              </a:cxn>
+              <a:cxn ang="0">
+                <a:pos x="connsiteX60" y="connsiteY60"/>
+              </a:cxn>
+              <a:cxn ang="0">
+                <a:pos x="connsiteX61" y="connsiteY61"/>
+              </a:cxn>
+              <a:cxn ang="0">
+                <a:pos x="connsiteX62" y="connsiteY62"/>
+              </a:cxn>
+              <a:cxn ang="0">
+                <a:pos x="connsiteX63" y="connsiteY63"/>
+              </a:cxn>
+              <a:cxn ang="0">
+                <a:pos x="connsiteX64" y="connsiteY64"/>
+              </a:cxn>
+              <a:cxn ang="0">
+                <a:pos x="connsiteX65" y="connsiteY65"/>
+              </a:cxn>
+              <a:cxn ang="0">
+                <a:pos x="connsiteX66" y="connsiteY66"/>
+              </a:cxn>
+              <a:cxn ang="0">
+                <a:pos x="connsiteX67" y="connsiteY67"/>
+              </a:cxn>
+              <a:cxn ang="0">
+                <a:pos x="connsiteX68" y="connsiteY68"/>
+              </a:cxn>
+              <a:cxn ang="0">
+                <a:pos x="connsiteX69" y="connsiteY69"/>
+              </a:cxn>
+              <a:cxn ang="0">
+                <a:pos x="connsiteX70" y="connsiteY70"/>
+              </a:cxn>
+              <a:cxn ang="0">
+                <a:pos x="connsiteX71" y="connsiteY71"/>
+              </a:cxn>
+              <a:cxn ang="0">
+                <a:pos x="connsiteX72" y="connsiteY72"/>
+              </a:cxn>
+              <a:cxn ang="0">
+                <a:pos x="connsiteX73" y="connsiteY73"/>
+              </a:cxn>
+              <a:cxn ang="0">
+                <a:pos x="connsiteX74" y="connsiteY74"/>
+              </a:cxn>
+              <a:cxn ang="0">
+                <a:pos x="connsiteX75" y="connsiteY75"/>
+              </a:cxn>
+              <a:cxn ang="0">
+                <a:pos x="connsiteX76" y="connsiteY76"/>
+              </a:cxn>
+              <a:cxn ang="0">
+                <a:pos x="connsiteX77" y="connsiteY77"/>
+              </a:cxn>
+              <a:cxn ang="0">
+                <a:pos x="connsiteX78" y="connsiteY78"/>
+              </a:cxn>
+              <a:cxn ang="0">
+                <a:pos x="connsiteX79" y="connsiteY79"/>
+              </a:cxn>
+              <a:cxn ang="0">
+                <a:pos x="connsiteX80" y="connsiteY80"/>
+              </a:cxn>
+              <a:cxn ang="0">
+                <a:pos x="connsiteX81" y="connsiteY81"/>
+              </a:cxn>
+              <a:cxn ang="0">
+                <a:pos x="connsiteX82" y="connsiteY82"/>
+              </a:cxn>
+              <a:cxn ang="0">
+                <a:pos x="connsiteX83" y="connsiteY83"/>
+              </a:cxn>
+              <a:cxn ang="0">
+                <a:pos x="connsiteX84" y="connsiteY84"/>
+              </a:cxn>
+              <a:cxn ang="0">
+                <a:pos x="connsiteX85" y="connsiteY85"/>
+              </a:cxn>
+              <a:cxn ang="0">
+                <a:pos x="connsiteX86" y="connsiteY86"/>
+              </a:cxn>
+              <a:cxn ang="0">
+                <a:pos x="connsiteX87" y="connsiteY87"/>
+              </a:cxn>
+              <a:cxn ang="0">
+                <a:pos x="connsiteX88" y="connsiteY88"/>
+              </a:cxn>
+              <a:cxn ang="0">
+                <a:pos x="connsiteX89" y="connsiteY89"/>
+              </a:cxn>
+              <a:cxn ang="0">
+                <a:pos x="connsiteX90" y="connsiteY90"/>
+              </a:cxn>
+              <a:cxn ang="0">
+                <a:pos x="connsiteX91" y="connsiteY91"/>
+              </a:cxn>
+              <a:cxn ang="0">
+                <a:pos x="connsiteX92" y="connsiteY92"/>
+              </a:cxn>
+              <a:cxn ang="0">
+                <a:pos x="connsiteX93" y="connsiteY93"/>
+              </a:cxn>
+              <a:cxn ang="0">
+                <a:pos x="connsiteX94" y="connsiteY94"/>
+              </a:cxn>
+              <a:cxn ang="0">
+                <a:pos x="connsiteX95" y="connsiteY95"/>
+              </a:cxn>
+              <a:cxn ang="0">
+                <a:pos x="connsiteX96" y="connsiteY96"/>
+              </a:cxn>
+              <a:cxn ang="0">
+                <a:pos x="connsiteX97" y="connsiteY97"/>
+              </a:cxn>
+              <a:cxn ang="0">
+                <a:pos x="connsiteX98" y="connsiteY98"/>
+              </a:cxn>
+              <a:cxn ang="0">
+                <a:pos x="connsiteX99" y="connsiteY99"/>
+              </a:cxn>
+              <a:cxn ang="0">
+                <a:pos x="connsiteX100" y="connsiteY100"/>
+              </a:cxn>
+              <a:cxn ang="0">
+                <a:pos x="connsiteX101" y="connsiteY101"/>
+              </a:cxn>
+              <a:cxn ang="0">
+                <a:pos x="connsiteX102" y="connsiteY102"/>
+              </a:cxn>
+              <a:cxn ang="0">
+                <a:pos x="connsiteX103" y="connsiteY103"/>
+              </a:cxn>
+              <a:cxn ang="0">
+                <a:pos x="connsiteX104" y="connsiteY104"/>
+              </a:cxn>
+              <a:cxn ang="0">
+                <a:pos x="connsiteX105" y="connsiteY105"/>
+              </a:cxn>
+              <a:cxn ang="0">
+                <a:pos x="connsiteX106" y="connsiteY106"/>
+              </a:cxn>
+              <a:cxn ang="0">
+                <a:pos x="connsiteX107" y="connsiteY107"/>
+              </a:cxn>
+              <a:cxn ang="0">
+                <a:pos x="connsiteX108" y="connsiteY108"/>
+              </a:cxn>
+            </a:cxnLst>
+            <a:rect l="l" t="t" r="r" b="b"/>
+            <a:pathLst>
+              <a:path w="3721608" h="3721608">
+                <a:moveTo>
+                  <a:pt x="1860804" y="0"/>
+                </a:moveTo>
+                <a:cubicBezTo>
+                  <a:pt x="2302391" y="0"/>
+                  <a:pt x="2708052" y="153818"/>
+                  <a:pt x="3027130" y="410798"/>
+                </a:cubicBezTo>
+                <a:lnTo>
+                  <a:pt x="3170679" y="542833"/>
+                </a:lnTo>
+                <a:lnTo>
+                  <a:pt x="3015458" y="654952"/>
+                </a:lnTo>
+                <a:lnTo>
+                  <a:pt x="2995668" y="669247"/>
+                </a:lnTo>
+                <a:lnTo>
+                  <a:pt x="2996856" y="670892"/>
+                </a:lnTo>
+                <a:lnTo>
+                  <a:pt x="2976925" y="687970"/>
+                </a:lnTo>
+                <a:cubicBezTo>
+                  <a:pt x="2895531" y="770561"/>
+                  <a:pt x="2874649" y="888544"/>
+                  <a:pt x="2933190" y="969591"/>
+                </a:cubicBezTo>
+                <a:cubicBezTo>
+                  <a:pt x="2991732" y="1050639"/>
+                  <a:pt x="3110300" y="1067895"/>
+                  <a:pt x="3214287" y="1016582"/>
+                </a:cubicBezTo>
+                <a:lnTo>
+                  <a:pt x="3236764" y="1003028"/>
+                </a:lnTo>
+                <a:lnTo>
+                  <a:pt x="3237952" y="1004673"/>
+                </a:lnTo>
+                <a:lnTo>
+                  <a:pt x="3257742" y="990378"/>
+                </a:lnTo>
+                <a:lnTo>
+                  <a:pt x="3429168" y="866555"/>
+                </a:lnTo>
+                <a:lnTo>
+                  <a:pt x="3497019" y="973834"/>
+                </a:lnTo>
+                <a:lnTo>
+                  <a:pt x="3529588" y="1041442"/>
+                </a:lnTo>
+                <a:lnTo>
+                  <a:pt x="3362962" y="1103515"/>
+                </a:lnTo>
+                <a:lnTo>
+                  <a:pt x="3340085" y="1112037"/>
+                </a:lnTo>
+                <a:lnTo>
+                  <a:pt x="3340794" y="1113938"/>
+                </a:lnTo>
+                <a:lnTo>
+                  <a:pt x="3317041" y="1125107"/>
+                </a:lnTo>
+                <a:cubicBezTo>
+                  <a:pt x="3216627" y="1183101"/>
+                  <a:pt x="3165146" y="1291295"/>
+                  <a:pt x="3200048" y="1384984"/>
+                </a:cubicBezTo>
+                <a:cubicBezTo>
+                  <a:pt x="3234950" y="1478673"/>
+                  <a:pt x="3344671" y="1526814"/>
+                  <a:pt x="3458554" y="1504976"/>
+                </a:cubicBezTo>
+                <a:lnTo>
+                  <a:pt x="3483824" y="1497882"/>
+                </a:lnTo>
+                <a:lnTo>
+                  <a:pt x="3484532" y="1499783"/>
+                </a:lnTo>
+                <a:lnTo>
+                  <a:pt x="3507410" y="1491261"/>
+                </a:lnTo>
+                <a:lnTo>
+                  <a:pt x="3669668" y="1430815"/>
+                </a:lnTo>
+                <a:lnTo>
+                  <a:pt x="3683803" y="1485787"/>
+                </a:lnTo>
+                <a:cubicBezTo>
+                  <a:pt x="3708591" y="1606921"/>
+                  <a:pt x="3721608" y="1732342"/>
+                  <a:pt x="3721608" y="1860804"/>
+                </a:cubicBezTo>
+                <a:cubicBezTo>
+                  <a:pt x="3721608" y="1989266"/>
+                  <a:pt x="3708591" y="2114687"/>
+                  <a:pt x="3683803" y="2235821"/>
+                </a:cubicBezTo>
+                <a:lnTo>
+                  <a:pt x="3668199" y="2296507"/>
+                </a:lnTo>
+                <a:lnTo>
+                  <a:pt x="3521153" y="2233674"/>
+                </a:lnTo>
+                <a:lnTo>
+                  <a:pt x="3498704" y="2224081"/>
+                </a:lnTo>
+                <a:lnTo>
+                  <a:pt x="3497907" y="2225947"/>
+                </a:lnTo>
+                <a:lnTo>
+                  <a:pt x="3472999" y="2217668"/>
+                </a:lnTo>
+                <a:cubicBezTo>
+                  <a:pt x="3360274" y="2190479"/>
+                  <a:pt x="3248403" y="2233388"/>
+                  <a:pt x="3209118" y="2325326"/>
+                </a:cubicBezTo>
+                <a:cubicBezTo>
+                  <a:pt x="3169833" y="2417263"/>
+                  <a:pt x="3216150" y="2527766"/>
+                  <a:pt x="3313715" y="2590435"/>
+                </a:cubicBezTo>
+                <a:lnTo>
+                  <a:pt x="3336914" y="2602712"/>
+                </a:lnTo>
+                <a:lnTo>
+                  <a:pt x="3336117" y="2604578"/>
+                </a:lnTo>
+                <a:lnTo>
+                  <a:pt x="3358566" y="2614170"/>
+                </a:lnTo>
+                <a:lnTo>
+                  <a:pt x="3526758" y="2686039"/>
+                </a:lnTo>
+                <a:lnTo>
+                  <a:pt x="3497019" y="2747774"/>
+                </a:lnTo>
+                <a:cubicBezTo>
+                  <a:pt x="3181912" y="3327834"/>
+                  <a:pt x="2567344" y="3721608"/>
+                  <a:pt x="1860804" y="3721608"/>
+                </a:cubicBezTo>
+                <a:cubicBezTo>
+                  <a:pt x="1419217" y="3721608"/>
+                  <a:pt x="1013556" y="3567790"/>
+                  <a:pt x="694478" y="3310810"/>
+                </a:cubicBezTo>
+                <a:lnTo>
+                  <a:pt x="623876" y="3245871"/>
+                </a:lnTo>
+                <a:lnTo>
+                  <a:pt x="634440" y="3238490"/>
+                </a:lnTo>
+                <a:lnTo>
+                  <a:pt x="654452" y="3224507"/>
+                </a:lnTo>
+                <a:lnTo>
+                  <a:pt x="653290" y="3222845"/>
+                </a:lnTo>
+                <a:lnTo>
+                  <a:pt x="663375" y="3214474"/>
+                </a:lnTo>
+                <a:lnTo>
+                  <a:pt x="701524" y="3219549"/>
+                </a:lnTo>
+                <a:cubicBezTo>
+                  <a:pt x="748647" y="3221109"/>
+                  <a:pt x="794369" y="3208291"/>
+                  <a:pt x="832378" y="3179629"/>
+                </a:cubicBezTo>
+                <a:cubicBezTo>
+                  <a:pt x="933734" y="3103198"/>
+                  <a:pt x="941855" y="2943046"/>
+                  <a:pt x="850515" y="2821920"/>
+                </a:cubicBezTo>
+                <a:cubicBezTo>
+                  <a:pt x="759176" y="2700794"/>
+                  <a:pt x="602965" y="2664562"/>
+                  <a:pt x="501609" y="2740993"/>
+                </a:cubicBezTo>
+                <a:cubicBezTo>
+                  <a:pt x="463600" y="2769655"/>
+                  <a:pt x="438703" y="2810089"/>
+                  <a:pt x="427245" y="2855825"/>
+                </a:cubicBezTo>
+                <a:lnTo>
+                  <a:pt x="423031" y="2884420"/>
+                </a:lnTo>
+                <a:lnTo>
+                  <a:pt x="418630" y="2886980"/>
+                </a:lnTo>
+                <a:lnTo>
+                  <a:pt x="417468" y="2885317"/>
+                </a:lnTo>
+                <a:lnTo>
+                  <a:pt x="397455" y="2899299"/>
+                </a:lnTo>
+                <a:lnTo>
+                  <a:pt x="344031" y="2936625"/>
+                </a:lnTo>
+                <a:lnTo>
+                  <a:pt x="224589" y="2747774"/>
+                </a:lnTo>
+                <a:lnTo>
+                  <a:pt x="208466" y="2714304"/>
+                </a:lnTo>
+                <a:lnTo>
+                  <a:pt x="236707" y="2703546"/>
+                </a:lnTo>
+                <a:lnTo>
+                  <a:pt x="259520" y="2694854"/>
+                </a:lnTo>
+                <a:lnTo>
+                  <a:pt x="258798" y="2692959"/>
+                </a:lnTo>
+                <a:lnTo>
+                  <a:pt x="270617" y="2687294"/>
+                </a:lnTo>
+                <a:lnTo>
+                  <a:pt x="306383" y="2701501"/>
+                </a:lnTo>
+                <a:cubicBezTo>
+                  <a:pt x="351710" y="2714483"/>
+                  <a:pt x="399177" y="2713178"/>
+                  <a:pt x="443018" y="2694629"/>
+                </a:cubicBezTo>
+                <a:cubicBezTo>
+                  <a:pt x="559929" y="2645164"/>
+                  <a:pt x="606783" y="2491805"/>
+                  <a:pt x="547670" y="2352090"/>
+                </a:cubicBezTo>
+                <a:cubicBezTo>
+                  <a:pt x="488557" y="2212376"/>
+                  <a:pt x="345862" y="2139215"/>
+                  <a:pt x="228951" y="2188679"/>
+                </a:cubicBezTo>
+                <a:cubicBezTo>
+                  <a:pt x="185110" y="2207229"/>
+                  <a:pt x="151120" y="2240388"/>
+                  <a:pt x="128876" y="2281959"/>
+                </a:cubicBezTo>
+                <a:lnTo>
+                  <a:pt x="117829" y="2308669"/>
+                </a:lnTo>
+                <a:lnTo>
+                  <a:pt x="112937" y="2310081"/>
+                </a:lnTo>
+                <a:lnTo>
+                  <a:pt x="112215" y="2308185"/>
+                </a:lnTo>
+                <a:lnTo>
+                  <a:pt x="89401" y="2316876"/>
+                </a:lnTo>
+                <a:lnTo>
+                  <a:pt x="61390" y="2327547"/>
+                </a:lnTo>
+                <a:lnTo>
+                  <a:pt x="37805" y="2235821"/>
+                </a:lnTo>
+                <a:cubicBezTo>
+                  <a:pt x="13018" y="2114687"/>
+                  <a:pt x="0" y="1989266"/>
+                  <a:pt x="0" y="1860804"/>
+                </a:cubicBezTo>
+                <a:cubicBezTo>
+                  <a:pt x="0" y="1780516"/>
+                  <a:pt x="5085" y="1701415"/>
+                  <a:pt x="14951" y="1623806"/>
+                </a:cubicBezTo>
+                <a:lnTo>
+                  <a:pt x="47671" y="1452795"/>
+                </a:lnTo>
+                <a:lnTo>
+                  <a:pt x="92757" y="1468349"/>
+                </a:lnTo>
+                <a:lnTo>
+                  <a:pt x="115836" y="1476310"/>
+                </a:lnTo>
+                <a:lnTo>
+                  <a:pt x="116497" y="1474392"/>
+                </a:lnTo>
+                <a:lnTo>
+                  <a:pt x="129198" y="1477625"/>
+                </a:lnTo>
+                <a:lnTo>
+                  <a:pt x="147531" y="1511463"/>
+                </a:lnTo>
+                <a:cubicBezTo>
+                  <a:pt x="173985" y="1550491"/>
+                  <a:pt x="211243" y="1579930"/>
+                  <a:pt x="256778" y="1593813"/>
+                </a:cubicBezTo>
+                <a:cubicBezTo>
+                  <a:pt x="378204" y="1630832"/>
+                  <a:pt x="512504" y="1543207"/>
+                  <a:pt x="556744" y="1398096"/>
+                </a:cubicBezTo>
+                <a:cubicBezTo>
+                  <a:pt x="600984" y="1252985"/>
+                  <a:pt x="538412" y="1105339"/>
+                  <a:pt x="416986" y="1068320"/>
+                </a:cubicBezTo>
+                <a:cubicBezTo>
+                  <a:pt x="371451" y="1054437"/>
+                  <a:pt x="324106" y="1058083"/>
+                  <a:pt x="280378" y="1075715"/>
+                </a:cubicBezTo>
+                <a:lnTo>
+                  <a:pt x="254774" y="1089126"/>
+                </a:lnTo>
+                <a:lnTo>
+                  <a:pt x="250114" y="1087071"/>
+                </a:lnTo>
+                <a:lnTo>
+                  <a:pt x="250776" y="1085154"/>
+                </a:lnTo>
+                <a:lnTo>
+                  <a:pt x="227698" y="1077192"/>
+                </a:lnTo>
+                <a:lnTo>
+                  <a:pt x="183472" y="1061935"/>
+                </a:lnTo>
+                <a:lnTo>
+                  <a:pt x="224589" y="973834"/>
+                </a:lnTo>
+                <a:lnTo>
+                  <a:pt x="282157" y="879076"/>
+                </a:lnTo>
+                <a:lnTo>
+                  <a:pt x="343265" y="915632"/>
+                </a:lnTo>
+                <a:lnTo>
+                  <a:pt x="364215" y="928164"/>
+                </a:lnTo>
+                <a:lnTo>
+                  <a:pt x="365256" y="926423"/>
+                </a:lnTo>
+                <a:lnTo>
+                  <a:pt x="377022" y="932196"/>
+                </a:lnTo>
+                <a:lnTo>
+                  <a:pt x="388013" y="969079"/>
+                </a:lnTo>
+                <a:cubicBezTo>
+                  <a:pt x="405883" y="1012710"/>
+                  <a:pt x="436299" y="1049175"/>
+                  <a:pt x="478011" y="1072116"/>
+                </a:cubicBezTo>
+                <a:cubicBezTo>
+                  <a:pt x="589241" y="1133292"/>
+                  <a:pt x="738678" y="1075127"/>
+                  <a:pt x="811787" y="942201"/>
+                </a:cubicBezTo>
+                <a:cubicBezTo>
+                  <a:pt x="884896" y="809274"/>
+                  <a:pt x="853991" y="651922"/>
+                  <a:pt x="742760" y="590746"/>
+                </a:cubicBezTo>
+                <a:cubicBezTo>
+                  <a:pt x="701049" y="567805"/>
+                  <a:pt x="653965" y="561647"/>
+                  <a:pt x="607547" y="569919"/>
+                </a:cubicBezTo>
+                <a:lnTo>
+                  <a:pt x="579734" y="577783"/>
+                </a:lnTo>
+                <a:lnTo>
+                  <a:pt x="575596" y="574816"/>
+                </a:lnTo>
+                <a:lnTo>
+                  <a:pt x="576637" y="573075"/>
+                </a:lnTo>
+                <a:lnTo>
+                  <a:pt x="555687" y="560542"/>
+                </a:lnTo>
+                <a:lnTo>
+                  <a:pt x="539635" y="550939"/>
+                </a:lnTo>
+                <a:lnTo>
+                  <a:pt x="545017" y="545017"/>
+                </a:lnTo>
+                <a:cubicBezTo>
+                  <a:pt x="881756" y="208278"/>
+                  <a:pt x="1346957" y="0"/>
+                  <a:pt x="1860804" y="0"/>
+                </a:cubicBezTo>
+                <a:close/>
+              </a:path>
+            </a:pathLst>
+          </a:custGeom>
+          <a:solidFill>
+            <a:schemeClr val="tx1">
+              <a:alpha val="70000"/>
+            </a:schemeClr>
+          </a:solidFill>
+          <a:ln>
+            <a:noFill/>
+          </a:ln>
+        </p:spPr>
+        <p:style>
+          <a:lnRef idx="2">
+            <a:schemeClr val="accent1">
+              <a:shade val="50000"/>
+            </a:schemeClr>
+          </a:lnRef>
+          <a:fillRef idx="1">
+            <a:schemeClr val="accent1"/>
+          </a:fillRef>
+          <a:effectRef idx="0">
+            <a:schemeClr val="accent1"/>
+          </a:effectRef>
+          <a:fontRef idx="minor">
+            <a:schemeClr val="lt1"/>
+          </a:fontRef>
+        </p:style>
+        <p:txBody>
+          <a:bodyPr wrap="square" rtlCol="0" anchor="ctr">
+            <a:noAutofit/>
+          </a:bodyPr>
+          <a:lstStyle/>
+          <a:p>
+            <a:pPr algn="ctr"/>
+            <a:endParaRPr lang="en-US"/>
+          </a:p>
+        </p:txBody>
+      </p:sp>
+      <p:pic>
+        <p:nvPicPr>
+          <p:cNvPr id="2050" name="Picture 2">
+            <a:extLst>
+              <a:ext uri="{FF2B5EF4-FFF2-40B4-BE49-F238E27FC236}">
+                <a16:creationId xmlns:a16="http://schemas.microsoft.com/office/drawing/2014/main" id="{D7009883-AACA-4B6F-8315-225410359D8B}"/>
+              </a:ext>
+            </a:extLst>
+          </p:cNvPr>
+          <p:cNvPicPr>
+            <a:picLocks noChangeAspect="1" noChangeArrowheads="1"/>
+          </p:cNvPicPr>
+          <p:nvPr/>
+        </p:nvPicPr>
+        <p:blipFill>
+          <a:blip r:embed="rId5">
+            <a:extLst>
+              <a:ext uri="{28A0092B-C50C-407E-A947-70E740481C1C}">
+                <a14:useLocalDpi xmlns:a14="http://schemas.microsoft.com/office/drawing/2010/main" val="0"/>
+              </a:ext>
+            </a:extLst>
+          </a:blip>
+          <a:srcRect/>
+          <a:stretch>
+            <a:fillRect/>
+          </a:stretch>
+        </p:blipFill>
+        <p:spPr bwMode="auto">
+          <a:xfrm>
+            <a:off x="-1951146" y="0"/>
+            <a:ext cx="1385570" cy="1124043"/>
+          </a:xfrm>
+          <a:prstGeom prst="rect">
+            <a:avLst/>
+          </a:prstGeom>
+          <a:noFill/>
+          <a:extLst>
+            <a:ext uri="{909E8E84-426E-40DD-AFC4-6F175D3DCCD1}">
+              <a14:hiddenFill xmlns:a14="http://schemas.microsoft.com/office/drawing/2010/main">
+                <a:solidFill>
+                  <a:srgbClr val="FFFFFF"/>
+                </a:solidFill>
+              </a14:hiddenFill>
+            </a:ext>
+          </a:extLst>
+        </p:spPr>
+      </p:pic>
+      <p:sp>
+        <p:nvSpPr>
+          <p:cNvPr id="6" name="TextBox 5">
+            <a:extLst>
+              <a:ext uri="{FF2B5EF4-FFF2-40B4-BE49-F238E27FC236}">
+                <a16:creationId xmlns:a16="http://schemas.microsoft.com/office/drawing/2014/main" id="{BB090F8C-68F9-49C3-86D1-10750B84A578}"/>
+              </a:ext>
+            </a:extLst>
+          </p:cNvPr>
+          <p:cNvSpPr txBox="1"/>
+          <p:nvPr/>
+        </p:nvSpPr>
+        <p:spPr>
+          <a:xfrm>
+            <a:off x="3454459" y="574786"/>
+            <a:ext cx="5145989" cy="707886"/>
+          </a:xfrm>
+          <a:prstGeom prst="rect">
+            <a:avLst/>
+          </a:prstGeom>
+          <a:noFill/>
+        </p:spPr>
+        <p:txBody>
+          <a:bodyPr wrap="square" rtlCol="0">
+            <a:spAutoFit/>
+          </a:bodyPr>
+          <a:lstStyle/>
+          <a:p>
+            <a:pPr algn="ctr"/>
+            <a:r>
+              <a:rPr lang="en-US" sz="4000" dirty="0">
+                <a:latin typeface="Bebas Neue" panose="020B0606020202050201" pitchFamily="34" charset="0"/>
+              </a:rPr>
+              <a:t>Analog Input</a:t>
+            </a:r>
+          </a:p>
+        </p:txBody>
+      </p:sp>
+      <p:pic>
+        <p:nvPicPr>
+          <p:cNvPr id="7" name="Picture 6">
+            <a:extLst>
+              <a:ext uri="{FF2B5EF4-FFF2-40B4-BE49-F238E27FC236}">
+                <a16:creationId xmlns:a16="http://schemas.microsoft.com/office/drawing/2014/main" id="{263BBA7D-7D6A-7025-DB5B-189D116456F4}"/>
+              </a:ext>
+            </a:extLst>
+          </p:cNvPr>
+          <p:cNvPicPr>
+            <a:picLocks noChangeAspect="1"/>
+          </p:cNvPicPr>
+          <p:nvPr/>
+        </p:nvPicPr>
+        <p:blipFill>
+          <a:blip r:embed="rId6"/>
+          <a:stretch>
+            <a:fillRect/>
+          </a:stretch>
+        </p:blipFill>
+        <p:spPr>
+          <a:xfrm>
+            <a:off x="12271221" y="21764"/>
+            <a:ext cx="4679439" cy="6858000"/>
+          </a:xfrm>
+          <a:prstGeom prst="rect">
+            <a:avLst/>
+          </a:prstGeom>
+        </p:spPr>
+      </p:pic>
+      <p:pic>
+        <p:nvPicPr>
+          <p:cNvPr id="9" name="Picture 8">
+            <a:extLst>
+              <a:ext uri="{FF2B5EF4-FFF2-40B4-BE49-F238E27FC236}">
+                <a16:creationId xmlns:a16="http://schemas.microsoft.com/office/drawing/2014/main" id="{31DEEC0B-2502-B7FE-2C90-A0F4D38D0AE2}"/>
+              </a:ext>
+            </a:extLst>
+          </p:cNvPr>
+          <p:cNvPicPr>
+            <a:picLocks noChangeAspect="1"/>
+          </p:cNvPicPr>
+          <p:nvPr/>
+        </p:nvPicPr>
+        <p:blipFill>
+          <a:blip r:embed="rId7"/>
+          <a:stretch>
+            <a:fillRect/>
+          </a:stretch>
+        </p:blipFill>
+        <p:spPr>
+          <a:xfrm>
+            <a:off x="12313450" y="7149099"/>
+            <a:ext cx="5409051" cy="5068079"/>
+          </a:xfrm>
+          <a:prstGeom prst="rect">
+            <a:avLst/>
+          </a:prstGeom>
+        </p:spPr>
+      </p:pic>
+      <p:sp>
+        <p:nvSpPr>
+          <p:cNvPr id="5" name="TextBox 4">
+            <a:extLst>
+              <a:ext uri="{FF2B5EF4-FFF2-40B4-BE49-F238E27FC236}">
+                <a16:creationId xmlns:a16="http://schemas.microsoft.com/office/drawing/2014/main" id="{778E242C-9CDF-1F7C-3579-6214C8596642}"/>
+              </a:ext>
+            </a:extLst>
+          </p:cNvPr>
+          <p:cNvSpPr txBox="1"/>
+          <p:nvPr/>
+        </p:nvSpPr>
+        <p:spPr>
+          <a:xfrm>
+            <a:off x="8211764" y="4167244"/>
+            <a:ext cx="2956296" cy="523220"/>
+          </a:xfrm>
+          <a:prstGeom prst="rect">
+            <a:avLst/>
+          </a:prstGeom>
+          <a:noFill/>
+        </p:spPr>
+        <p:txBody>
+          <a:bodyPr wrap="square" rtlCol="0">
+            <a:spAutoFit/>
+          </a:bodyPr>
+          <a:lstStyle/>
+          <a:p>
+            <a:r>
+              <a:rPr lang="en-US" b="1" dirty="0">
+                <a:solidFill>
+                  <a:srgbClr val="ED7D31"/>
+                </a:solidFill>
+                <a:latin typeface="Segoe Condensed" panose="020B0606040200020203" pitchFamily="34" charset="0"/>
+              </a:rPr>
+              <a:t>A1</a:t>
+            </a:r>
+            <a:endParaRPr lang="en-US" b="1" baseline="-25000" dirty="0">
+              <a:solidFill>
+                <a:srgbClr val="ED7D31"/>
+              </a:solidFill>
+              <a:latin typeface="Segoe Condensed" panose="020B0606040200020203" pitchFamily="34" charset="0"/>
+            </a:endParaRPr>
+          </a:p>
+          <a:p>
+            <a:r>
+              <a:rPr lang="en-US" sz="1000" dirty="0">
+                <a:solidFill>
+                  <a:srgbClr val="ED7D31"/>
+                </a:solidFill>
+                <a:latin typeface="Segoe Condensed" panose="020B0606040200020203" pitchFamily="34" charset="0"/>
+              </a:rPr>
+              <a:t>Input Range: 0-1023</a:t>
+            </a:r>
+          </a:p>
+        </p:txBody>
+      </p:sp>
+      <p:sp>
+        <p:nvSpPr>
+          <p:cNvPr id="8" name="Freeform: Shape 7">
+            <a:extLst>
+              <a:ext uri="{FF2B5EF4-FFF2-40B4-BE49-F238E27FC236}">
+                <a16:creationId xmlns:a16="http://schemas.microsoft.com/office/drawing/2014/main" id="{1EFA981E-FF95-4B42-F609-438E703E1420}"/>
+              </a:ext>
+            </a:extLst>
+          </p:cNvPr>
+          <p:cNvSpPr/>
+          <p:nvPr/>
+        </p:nvSpPr>
+        <p:spPr>
+          <a:xfrm rot="10800000">
+            <a:off x="7721143" y="4238801"/>
+            <a:ext cx="517088" cy="136230"/>
+          </a:xfrm>
+          <a:custGeom>
+            <a:avLst/>
+            <a:gdLst>
+              <a:gd name="connsiteX0" fmla="*/ 1835888 w 1835888"/>
+              <a:gd name="connsiteY0" fmla="*/ 311888 h 311888"/>
+              <a:gd name="connsiteX1" fmla="*/ 1524000 w 1835888"/>
+              <a:gd name="connsiteY1" fmla="*/ 0 h 311888"/>
+              <a:gd name="connsiteX2" fmla="*/ 0 w 1835888"/>
+              <a:gd name="connsiteY2" fmla="*/ 0 h 311888"/>
+            </a:gdLst>
+            <a:ahLst/>
+            <a:cxnLst>
+              <a:cxn ang="0">
+                <a:pos x="connsiteX0" y="connsiteY0"/>
+              </a:cxn>
+              <a:cxn ang="0">
+                <a:pos x="connsiteX1" y="connsiteY1"/>
+              </a:cxn>
+              <a:cxn ang="0">
+                <a:pos x="connsiteX2" y="connsiteY2"/>
+              </a:cxn>
+            </a:cxnLst>
+            <a:rect l="l" t="t" r="r" b="b"/>
+            <a:pathLst>
+              <a:path w="1835888" h="311888">
+                <a:moveTo>
+                  <a:pt x="1835888" y="311888"/>
+                </a:moveTo>
+                <a:lnTo>
+                  <a:pt x="1524000" y="0"/>
+                </a:lnTo>
+                <a:lnTo>
+                  <a:pt x="0" y="0"/>
+                </a:lnTo>
+              </a:path>
+            </a:pathLst>
+          </a:custGeom>
+          <a:noFill/>
+          <a:ln>
+            <a:solidFill>
+              <a:srgbClr val="ED7D31"/>
+            </a:solidFill>
+            <a:headEnd type="oval" w="med" len="med"/>
+            <a:tailEnd type="none" w="med" len="med"/>
+          </a:ln>
+        </p:spPr>
+        <p:style>
+          <a:lnRef idx="2">
+            <a:schemeClr val="accent1">
+              <a:shade val="50000"/>
+            </a:schemeClr>
+          </a:lnRef>
+          <a:fillRef idx="1">
+            <a:schemeClr val="accent1"/>
+          </a:fillRef>
+          <a:effectRef idx="0">
+            <a:schemeClr val="accent1"/>
+          </a:effectRef>
+          <a:fontRef idx="minor">
+            <a:schemeClr val="lt1"/>
+          </a:fontRef>
+        </p:style>
+        <p:txBody>
+          <a:bodyPr rtlCol="0" anchor="ctr"/>
+          <a:lstStyle/>
+          <a:p>
+            <a:pPr algn="ctr"/>
+            <a:endParaRPr lang="en-US">
+              <a:solidFill>
+                <a:srgbClr val="ED7D31"/>
+              </a:solidFill>
+            </a:endParaRPr>
+          </a:p>
+        </p:txBody>
+      </p:sp>
+      <p:sp>
+        <p:nvSpPr>
+          <p:cNvPr id="27" name="TextBox 26">
+            <a:extLst>
+              <a:ext uri="{FF2B5EF4-FFF2-40B4-BE49-F238E27FC236}">
+                <a16:creationId xmlns:a16="http://schemas.microsoft.com/office/drawing/2014/main" id="{26E962DF-47A9-BAEA-88AE-6AD8ADF7119D}"/>
+              </a:ext>
+            </a:extLst>
+          </p:cNvPr>
+          <p:cNvSpPr txBox="1"/>
+          <p:nvPr/>
+        </p:nvSpPr>
+        <p:spPr>
+          <a:xfrm>
+            <a:off x="8211764" y="2678709"/>
+            <a:ext cx="2956296" cy="538609"/>
+          </a:xfrm>
+          <a:prstGeom prst="rect">
+            <a:avLst/>
+          </a:prstGeom>
+          <a:noFill/>
+        </p:spPr>
+        <p:txBody>
+          <a:bodyPr wrap="square" rtlCol="0">
+            <a:spAutoFit/>
+          </a:bodyPr>
+          <a:lstStyle/>
+          <a:p>
+            <a:r>
+              <a:rPr lang="en-US" b="1" dirty="0">
+                <a:solidFill>
+                  <a:srgbClr val="ED7D31"/>
+                </a:solidFill>
+                <a:latin typeface="Segoe Condensed" panose="020B0606040200020203" pitchFamily="34" charset="0"/>
+              </a:rPr>
+              <a:t>A2</a:t>
+            </a:r>
+            <a:endParaRPr lang="en-US" b="1" baseline="-25000" dirty="0">
+              <a:solidFill>
+                <a:srgbClr val="ED7D31"/>
+              </a:solidFill>
+              <a:latin typeface="Segoe Condensed" panose="020B0606040200020203" pitchFamily="34" charset="0"/>
+            </a:endParaRPr>
+          </a:p>
+          <a:p>
+            <a:r>
+              <a:rPr lang="en-US" sz="1100" dirty="0">
+                <a:solidFill>
+                  <a:srgbClr val="ED7D31"/>
+                </a:solidFill>
+                <a:latin typeface="Segoe Condensed" panose="020B0606040200020203" pitchFamily="34" charset="0"/>
+              </a:rPr>
+              <a:t>Input Range: 0-1023</a:t>
+            </a:r>
+          </a:p>
+        </p:txBody>
+      </p:sp>
+      <p:sp>
+        <p:nvSpPr>
+          <p:cNvPr id="28" name="Freeform: Shape 27">
+            <a:extLst>
+              <a:ext uri="{FF2B5EF4-FFF2-40B4-BE49-F238E27FC236}">
+                <a16:creationId xmlns:a16="http://schemas.microsoft.com/office/drawing/2014/main" id="{0A6EBF60-757D-BD86-F3B4-3A38CCDBCB9E}"/>
+              </a:ext>
+            </a:extLst>
+          </p:cNvPr>
+          <p:cNvSpPr/>
+          <p:nvPr/>
+        </p:nvSpPr>
+        <p:spPr>
+          <a:xfrm rot="10800000" flipV="1">
+            <a:off x="7429846" y="2331919"/>
+            <a:ext cx="440541" cy="225638"/>
+          </a:xfrm>
+          <a:custGeom>
+            <a:avLst/>
+            <a:gdLst>
+              <a:gd name="connsiteX0" fmla="*/ 1835888 w 1835888"/>
+              <a:gd name="connsiteY0" fmla="*/ 311888 h 311888"/>
+              <a:gd name="connsiteX1" fmla="*/ 1524000 w 1835888"/>
+              <a:gd name="connsiteY1" fmla="*/ 0 h 311888"/>
+              <a:gd name="connsiteX2" fmla="*/ 0 w 1835888"/>
+              <a:gd name="connsiteY2" fmla="*/ 0 h 311888"/>
+            </a:gdLst>
+            <a:ahLst/>
+            <a:cxnLst>
+              <a:cxn ang="0">
+                <a:pos x="connsiteX0" y="connsiteY0"/>
+              </a:cxn>
+              <a:cxn ang="0">
+                <a:pos x="connsiteX1" y="connsiteY1"/>
+              </a:cxn>
+              <a:cxn ang="0">
+                <a:pos x="connsiteX2" y="connsiteY2"/>
+              </a:cxn>
+            </a:cxnLst>
+            <a:rect l="l" t="t" r="r" b="b"/>
+            <a:pathLst>
+              <a:path w="1835888" h="311888">
+                <a:moveTo>
+                  <a:pt x="1835888" y="311888"/>
+                </a:moveTo>
+                <a:lnTo>
+                  <a:pt x="1524000" y="0"/>
+                </a:lnTo>
+                <a:lnTo>
+                  <a:pt x="0" y="0"/>
+                </a:lnTo>
+              </a:path>
+            </a:pathLst>
+          </a:custGeom>
+          <a:noFill/>
+          <a:ln>
+            <a:solidFill>
+              <a:srgbClr val="ED7D31"/>
+            </a:solidFill>
+            <a:headEnd type="oval" w="med" len="med"/>
+            <a:tailEnd type="none" w="med" len="med"/>
+          </a:ln>
+        </p:spPr>
+        <p:style>
+          <a:lnRef idx="2">
+            <a:schemeClr val="accent1">
+              <a:shade val="50000"/>
+            </a:schemeClr>
+          </a:lnRef>
+          <a:fillRef idx="1">
+            <a:schemeClr val="accent1"/>
+          </a:fillRef>
+          <a:effectRef idx="0">
+            <a:schemeClr val="accent1"/>
+          </a:effectRef>
+          <a:fontRef idx="minor">
+            <a:schemeClr val="lt1"/>
+          </a:fontRef>
+        </p:style>
+        <p:txBody>
+          <a:bodyPr rtlCol="0" anchor="ctr"/>
+          <a:lstStyle/>
+          <a:p>
+            <a:pPr algn="ctr"/>
+            <a:endParaRPr lang="en-US">
+              <a:solidFill>
+                <a:srgbClr val="ED7D31"/>
+              </a:solidFill>
+            </a:endParaRPr>
+          </a:p>
+        </p:txBody>
+      </p:sp>
+      <p:sp>
+        <p:nvSpPr>
+          <p:cNvPr id="29" name="TextBox 28">
+            <a:extLst>
+              <a:ext uri="{FF2B5EF4-FFF2-40B4-BE49-F238E27FC236}">
+                <a16:creationId xmlns:a16="http://schemas.microsoft.com/office/drawing/2014/main" id="{955E00D1-6791-09B1-9C9D-E4785179F8B8}"/>
+              </a:ext>
+            </a:extLst>
+          </p:cNvPr>
+          <p:cNvSpPr txBox="1"/>
+          <p:nvPr/>
+        </p:nvSpPr>
+        <p:spPr>
+          <a:xfrm>
+            <a:off x="7833351" y="2133645"/>
+            <a:ext cx="2956296" cy="530915"/>
+          </a:xfrm>
+          <a:prstGeom prst="rect">
+            <a:avLst/>
+          </a:prstGeom>
+          <a:noFill/>
+        </p:spPr>
+        <p:txBody>
+          <a:bodyPr wrap="square" rtlCol="0">
+            <a:spAutoFit/>
+          </a:bodyPr>
+          <a:lstStyle/>
+          <a:p>
+            <a:r>
+              <a:rPr lang="en-US" b="1" dirty="0">
+                <a:solidFill>
+                  <a:srgbClr val="ED7D31"/>
+                </a:solidFill>
+                <a:latin typeface="Segoe Condensed" panose="020B0606040200020203" pitchFamily="34" charset="0"/>
+              </a:rPr>
+              <a:t>A3</a:t>
+            </a:r>
+            <a:endParaRPr lang="en-US" b="1" baseline="-25000" dirty="0">
+              <a:solidFill>
+                <a:srgbClr val="ED7D31"/>
+              </a:solidFill>
+              <a:latin typeface="Segoe Condensed" panose="020B0606040200020203" pitchFamily="34" charset="0"/>
+            </a:endParaRPr>
+          </a:p>
+          <a:p>
+            <a:r>
+              <a:rPr lang="en-US" sz="1000" dirty="0">
+                <a:solidFill>
+                  <a:srgbClr val="ED7D31"/>
+                </a:solidFill>
+                <a:latin typeface="Segoe Condensed" panose="020B0606040200020203" pitchFamily="34" charset="0"/>
+              </a:rPr>
+              <a:t>Input Range: 0-1023</a:t>
+            </a:r>
+            <a:endParaRPr lang="en-US" sz="1600" dirty="0">
+              <a:solidFill>
+                <a:srgbClr val="ED7D31"/>
+              </a:solidFill>
+              <a:latin typeface="Segoe Condensed" panose="020B0606040200020203" pitchFamily="34" charset="0"/>
+            </a:endParaRPr>
+          </a:p>
+        </p:txBody>
+      </p:sp>
+      <p:grpSp>
+        <p:nvGrpSpPr>
+          <p:cNvPr id="30" name="Group 29">
+            <a:extLst>
+              <a:ext uri="{FF2B5EF4-FFF2-40B4-BE49-F238E27FC236}">
+                <a16:creationId xmlns:a16="http://schemas.microsoft.com/office/drawing/2014/main" id="{9CC7C8E2-9741-5169-BCE0-ABF3D14F379F}"/>
+              </a:ext>
+            </a:extLst>
+          </p:cNvPr>
+          <p:cNvGrpSpPr/>
+          <p:nvPr/>
+        </p:nvGrpSpPr>
+        <p:grpSpPr>
+          <a:xfrm flipH="1">
+            <a:off x="3972575" y="2292994"/>
+            <a:ext cx="861408" cy="2780564"/>
+            <a:chOff x="7967899" y="2420914"/>
+            <a:chExt cx="861408" cy="2780564"/>
+          </a:xfrm>
+        </p:grpSpPr>
+        <p:sp>
+          <p:nvSpPr>
+            <p:cNvPr id="11" name="Freeform: Shape 10">
+              <a:extLst>
+                <a:ext uri="{FF2B5EF4-FFF2-40B4-BE49-F238E27FC236}">
+                  <a16:creationId xmlns:a16="http://schemas.microsoft.com/office/drawing/2014/main" id="{06EA8D52-871B-290F-C8EB-B23FE401EEA3}"/>
+                </a:ext>
+              </a:extLst>
+            </p:cNvPr>
+            <p:cNvSpPr/>
+            <p:nvPr/>
+          </p:nvSpPr>
+          <p:spPr>
+            <a:xfrm rot="10800000" flipV="1">
+              <a:off x="8311878" y="3050626"/>
+              <a:ext cx="517429" cy="187004"/>
+            </a:xfrm>
+            <a:custGeom>
+              <a:avLst/>
+              <a:gdLst>
+                <a:gd name="connsiteX0" fmla="*/ 1835888 w 1835888"/>
+                <a:gd name="connsiteY0" fmla="*/ 311888 h 311888"/>
+                <a:gd name="connsiteX1" fmla="*/ 1524000 w 1835888"/>
+                <a:gd name="connsiteY1" fmla="*/ 0 h 311888"/>
+                <a:gd name="connsiteX2" fmla="*/ 0 w 1835888"/>
+                <a:gd name="connsiteY2" fmla="*/ 0 h 311888"/>
+              </a:gdLst>
+              <a:ahLst/>
+              <a:cxnLst>
+                <a:cxn ang="0">
+                  <a:pos x="connsiteX0" y="connsiteY0"/>
+                </a:cxn>
+                <a:cxn ang="0">
+                  <a:pos x="connsiteX1" y="connsiteY1"/>
+                </a:cxn>
+                <a:cxn ang="0">
+                  <a:pos x="connsiteX2" y="connsiteY2"/>
+                </a:cxn>
+              </a:cxnLst>
+              <a:rect l="l" t="t" r="r" b="b"/>
+              <a:pathLst>
+                <a:path w="1835888" h="311888">
+                  <a:moveTo>
+                    <a:pt x="1835888" y="311888"/>
+                  </a:moveTo>
+                  <a:lnTo>
+                    <a:pt x="1524000" y="0"/>
+                  </a:lnTo>
+                  <a:lnTo>
+                    <a:pt x="0" y="0"/>
+                  </a:lnTo>
+                </a:path>
+              </a:pathLst>
+            </a:custGeom>
+            <a:noFill/>
+            <a:ln>
+              <a:solidFill>
+                <a:srgbClr val="ED7D31"/>
+              </a:solidFill>
+              <a:headEnd type="oval" w="med" len="med"/>
+              <a:tailEnd type="none" w="med" len="med"/>
+            </a:ln>
+          </p:spPr>
+          <p:style>
+            <a:lnRef idx="2">
+              <a:schemeClr val="accent1">
+                <a:shade val="50000"/>
+              </a:schemeClr>
+            </a:lnRef>
+            <a:fillRef idx="1">
+              <a:schemeClr val="accent1"/>
+            </a:fillRef>
+            <a:effectRef idx="0">
+              <a:schemeClr val="accent1"/>
+            </a:effectRef>
+            <a:fontRef idx="minor">
+              <a:schemeClr val="lt1"/>
+            </a:fontRef>
+          </p:style>
+          <p:txBody>
+            <a:bodyPr rtlCol="0" anchor="ctr"/>
+            <a:lstStyle/>
+            <a:p>
+              <a:pPr algn="ctr"/>
+              <a:endParaRPr lang="en-US">
+                <a:solidFill>
+                  <a:srgbClr val="ED7D31"/>
+                </a:solidFill>
+              </a:endParaRPr>
+            </a:p>
+          </p:txBody>
+        </p:sp>
+        <p:sp>
+          <p:nvSpPr>
+            <p:cNvPr id="32" name="Freeform: Shape 31">
+              <a:extLst>
+                <a:ext uri="{FF2B5EF4-FFF2-40B4-BE49-F238E27FC236}">
+                  <a16:creationId xmlns:a16="http://schemas.microsoft.com/office/drawing/2014/main" id="{BD449380-3C47-C0B6-F13F-C1631D77DAE1}"/>
+                </a:ext>
+              </a:extLst>
+            </p:cNvPr>
+            <p:cNvSpPr/>
+            <p:nvPr/>
+          </p:nvSpPr>
+          <p:spPr>
+            <a:xfrm rot="10800000">
+              <a:off x="7967899" y="4880706"/>
+              <a:ext cx="455966" cy="320772"/>
+            </a:xfrm>
+            <a:custGeom>
+              <a:avLst/>
+              <a:gdLst>
+                <a:gd name="connsiteX0" fmla="*/ 1835888 w 1835888"/>
+                <a:gd name="connsiteY0" fmla="*/ 311888 h 311888"/>
+                <a:gd name="connsiteX1" fmla="*/ 1524000 w 1835888"/>
+                <a:gd name="connsiteY1" fmla="*/ 0 h 311888"/>
+                <a:gd name="connsiteX2" fmla="*/ 0 w 1835888"/>
+                <a:gd name="connsiteY2" fmla="*/ 0 h 311888"/>
+              </a:gdLst>
+              <a:ahLst/>
+              <a:cxnLst>
+                <a:cxn ang="0">
+                  <a:pos x="connsiteX0" y="connsiteY0"/>
+                </a:cxn>
+                <a:cxn ang="0">
+                  <a:pos x="connsiteX1" y="connsiteY1"/>
+                </a:cxn>
+                <a:cxn ang="0">
+                  <a:pos x="connsiteX2" y="connsiteY2"/>
+                </a:cxn>
+              </a:cxnLst>
+              <a:rect l="l" t="t" r="r" b="b"/>
+              <a:pathLst>
+                <a:path w="1835888" h="311888">
+                  <a:moveTo>
+                    <a:pt x="1835888" y="311888"/>
+                  </a:moveTo>
+                  <a:lnTo>
+                    <a:pt x="1524000" y="0"/>
+                  </a:lnTo>
+                  <a:lnTo>
+                    <a:pt x="0" y="0"/>
+                  </a:lnTo>
+                </a:path>
+              </a:pathLst>
+            </a:custGeom>
+            <a:noFill/>
+            <a:ln>
+              <a:solidFill>
+                <a:srgbClr val="ED7D31"/>
+              </a:solidFill>
+              <a:headEnd type="oval" w="med" len="med"/>
+              <a:tailEnd type="none" w="med" len="med"/>
+            </a:ln>
+          </p:spPr>
+          <p:style>
+            <a:lnRef idx="2">
+              <a:schemeClr val="accent1">
+                <a:shade val="50000"/>
+              </a:schemeClr>
+            </a:lnRef>
+            <a:fillRef idx="1">
+              <a:schemeClr val="accent1"/>
+            </a:fillRef>
+            <a:effectRef idx="0">
+              <a:schemeClr val="accent1"/>
+            </a:effectRef>
+            <a:fontRef idx="minor">
+              <a:schemeClr val="lt1"/>
+            </a:fontRef>
+          </p:style>
+          <p:txBody>
+            <a:bodyPr rtlCol="0" anchor="ctr"/>
+            <a:lstStyle/>
+            <a:p>
+              <a:pPr algn="ctr"/>
+              <a:endParaRPr lang="en-US">
+                <a:solidFill>
+                  <a:srgbClr val="ED7D31"/>
+                </a:solidFill>
+              </a:endParaRPr>
+            </a:p>
+          </p:txBody>
+        </p:sp>
+        <p:sp>
+          <p:nvSpPr>
+            <p:cNvPr id="33" name="Freeform: Shape 32">
+              <a:extLst>
+                <a:ext uri="{FF2B5EF4-FFF2-40B4-BE49-F238E27FC236}">
+                  <a16:creationId xmlns:a16="http://schemas.microsoft.com/office/drawing/2014/main" id="{309A8FDE-10D6-6FC7-1C4D-751B20977E9B}"/>
+                </a:ext>
+              </a:extLst>
+            </p:cNvPr>
+            <p:cNvSpPr/>
+            <p:nvPr/>
+          </p:nvSpPr>
+          <p:spPr>
+            <a:xfrm rot="10800000">
+              <a:off x="8280415" y="4373985"/>
+              <a:ext cx="517088" cy="136230"/>
+            </a:xfrm>
+            <a:custGeom>
+              <a:avLst/>
+              <a:gdLst>
+                <a:gd name="connsiteX0" fmla="*/ 1835888 w 1835888"/>
+                <a:gd name="connsiteY0" fmla="*/ 311888 h 311888"/>
+                <a:gd name="connsiteX1" fmla="*/ 1524000 w 1835888"/>
+                <a:gd name="connsiteY1" fmla="*/ 0 h 311888"/>
+                <a:gd name="connsiteX2" fmla="*/ 0 w 1835888"/>
+                <a:gd name="connsiteY2" fmla="*/ 0 h 311888"/>
+              </a:gdLst>
+              <a:ahLst/>
+              <a:cxnLst>
+                <a:cxn ang="0">
+                  <a:pos x="connsiteX0" y="connsiteY0"/>
+                </a:cxn>
+                <a:cxn ang="0">
+                  <a:pos x="connsiteX1" y="connsiteY1"/>
+                </a:cxn>
+                <a:cxn ang="0">
+                  <a:pos x="connsiteX2" y="connsiteY2"/>
+                </a:cxn>
+              </a:cxnLst>
+              <a:rect l="l" t="t" r="r" b="b"/>
+              <a:pathLst>
+                <a:path w="1835888" h="311888">
+                  <a:moveTo>
+                    <a:pt x="1835888" y="311888"/>
+                  </a:moveTo>
+                  <a:lnTo>
+                    <a:pt x="1524000" y="0"/>
+                  </a:lnTo>
+                  <a:lnTo>
+                    <a:pt x="0" y="0"/>
+                  </a:lnTo>
+                </a:path>
+              </a:pathLst>
+            </a:custGeom>
+            <a:noFill/>
+            <a:ln>
+              <a:solidFill>
+                <a:srgbClr val="ED7D31"/>
+              </a:solidFill>
+              <a:headEnd type="oval" w="med" len="med"/>
+              <a:tailEnd type="none" w="med" len="med"/>
+            </a:ln>
+          </p:spPr>
+          <p:style>
+            <a:lnRef idx="2">
+              <a:schemeClr val="accent1">
+                <a:shade val="50000"/>
+              </a:schemeClr>
+            </a:lnRef>
+            <a:fillRef idx="1">
+              <a:schemeClr val="accent1"/>
+            </a:fillRef>
+            <a:effectRef idx="0">
+              <a:schemeClr val="accent1"/>
+            </a:effectRef>
+            <a:fontRef idx="minor">
+              <a:schemeClr val="lt1"/>
+            </a:fontRef>
+          </p:style>
+          <p:txBody>
+            <a:bodyPr rtlCol="0" anchor="ctr"/>
+            <a:lstStyle/>
+            <a:p>
+              <a:pPr algn="ctr"/>
+              <a:endParaRPr lang="en-US">
+                <a:solidFill>
+                  <a:srgbClr val="ED7D31"/>
+                </a:solidFill>
+              </a:endParaRPr>
+            </a:p>
+          </p:txBody>
+        </p:sp>
+        <p:sp>
+          <p:nvSpPr>
+            <p:cNvPr id="13" name="Freeform: Shape 12">
+              <a:extLst>
+                <a:ext uri="{FF2B5EF4-FFF2-40B4-BE49-F238E27FC236}">
+                  <a16:creationId xmlns:a16="http://schemas.microsoft.com/office/drawing/2014/main" id="{C64540E7-89BE-2E81-707C-EA793A8FD1B5}"/>
+                </a:ext>
+              </a:extLst>
+            </p:cNvPr>
+            <p:cNvSpPr/>
+            <p:nvPr/>
+          </p:nvSpPr>
+          <p:spPr>
+            <a:xfrm rot="10800000" flipV="1">
+              <a:off x="8020926" y="2420914"/>
+              <a:ext cx="440541" cy="303631"/>
+            </a:xfrm>
+            <a:custGeom>
+              <a:avLst/>
+              <a:gdLst>
+                <a:gd name="connsiteX0" fmla="*/ 1835888 w 1835888"/>
+                <a:gd name="connsiteY0" fmla="*/ 311888 h 311888"/>
+                <a:gd name="connsiteX1" fmla="*/ 1524000 w 1835888"/>
+                <a:gd name="connsiteY1" fmla="*/ 0 h 311888"/>
+                <a:gd name="connsiteX2" fmla="*/ 0 w 1835888"/>
+                <a:gd name="connsiteY2" fmla="*/ 0 h 311888"/>
+              </a:gdLst>
+              <a:ahLst/>
+              <a:cxnLst>
+                <a:cxn ang="0">
+                  <a:pos x="connsiteX0" y="connsiteY0"/>
+                </a:cxn>
+                <a:cxn ang="0">
+                  <a:pos x="connsiteX1" y="connsiteY1"/>
+                </a:cxn>
+                <a:cxn ang="0">
+                  <a:pos x="connsiteX2" y="connsiteY2"/>
+                </a:cxn>
+              </a:cxnLst>
+              <a:rect l="l" t="t" r="r" b="b"/>
+              <a:pathLst>
+                <a:path w="1835888" h="311888">
+                  <a:moveTo>
+                    <a:pt x="1835888" y="311888"/>
+                  </a:moveTo>
+                  <a:lnTo>
+                    <a:pt x="1524000" y="0"/>
+                  </a:lnTo>
+                  <a:lnTo>
+                    <a:pt x="0" y="0"/>
+                  </a:lnTo>
+                </a:path>
+              </a:pathLst>
+            </a:custGeom>
+            <a:noFill/>
+            <a:ln>
+              <a:solidFill>
+                <a:srgbClr val="ED7D31"/>
+              </a:solidFill>
+              <a:headEnd type="oval" w="med" len="med"/>
+              <a:tailEnd type="none" w="med" len="med"/>
+            </a:ln>
+          </p:spPr>
+          <p:style>
+            <a:lnRef idx="2">
+              <a:schemeClr val="accent1">
+                <a:shade val="50000"/>
+              </a:schemeClr>
+            </a:lnRef>
+            <a:fillRef idx="1">
+              <a:schemeClr val="accent1"/>
+            </a:fillRef>
+            <a:effectRef idx="0">
+              <a:schemeClr val="accent1"/>
+            </a:effectRef>
+            <a:fontRef idx="minor">
+              <a:schemeClr val="lt1"/>
+            </a:fontRef>
+          </p:style>
+          <p:txBody>
+            <a:bodyPr rtlCol="0" anchor="ctr"/>
+            <a:lstStyle/>
+            <a:p>
+              <a:pPr algn="ctr"/>
+              <a:endParaRPr lang="en-US">
+                <a:solidFill>
+                  <a:srgbClr val="ED7D31"/>
+                </a:solidFill>
+              </a:endParaRPr>
+            </a:p>
+          </p:txBody>
+        </p:sp>
+      </p:grpSp>
+      <p:sp>
+        <p:nvSpPr>
+          <p:cNvPr id="14" name="TextBox 13">
+            <a:extLst>
+              <a:ext uri="{FF2B5EF4-FFF2-40B4-BE49-F238E27FC236}">
+                <a16:creationId xmlns:a16="http://schemas.microsoft.com/office/drawing/2014/main" id="{5B44D26B-281F-30E9-FB8A-85C957749C1F}"/>
+              </a:ext>
+            </a:extLst>
+          </p:cNvPr>
+          <p:cNvSpPr txBox="1"/>
+          <p:nvPr/>
+        </p:nvSpPr>
+        <p:spPr>
+          <a:xfrm>
+            <a:off x="1034715" y="2090857"/>
+            <a:ext cx="3315360" cy="530915"/>
+          </a:xfrm>
+          <a:prstGeom prst="rect">
+            <a:avLst/>
+          </a:prstGeom>
+          <a:noFill/>
+        </p:spPr>
+        <p:txBody>
+          <a:bodyPr wrap="square" rtlCol="0">
+            <a:spAutoFit/>
+          </a:bodyPr>
+          <a:lstStyle/>
+          <a:p>
+            <a:pPr algn="r"/>
+            <a:r>
+              <a:rPr lang="en-US" b="1" dirty="0">
+                <a:solidFill>
+                  <a:srgbClr val="ED7D31"/>
+                </a:solidFill>
+                <a:latin typeface="Segoe Condensed" panose="020B0606040200020203" pitchFamily="34" charset="0"/>
+              </a:rPr>
+              <a:t>A4</a:t>
+            </a:r>
+            <a:br>
+              <a:rPr lang="en-US" b="1" dirty="0">
+                <a:solidFill>
+                  <a:srgbClr val="ED7D31"/>
+                </a:solidFill>
+                <a:latin typeface="Segoe Condensed" panose="020B0606040200020203" pitchFamily="34" charset="0"/>
+              </a:rPr>
+            </a:br>
+            <a:r>
+              <a:rPr lang="en-US" sz="1000" dirty="0">
+                <a:solidFill>
+                  <a:srgbClr val="ED7D31"/>
+                </a:solidFill>
+                <a:latin typeface="Segoe Condensed" panose="020B0606040200020203" pitchFamily="34" charset="0"/>
+              </a:rPr>
+              <a:t>Input Range: 0-1023</a:t>
+            </a:r>
+            <a:endParaRPr lang="en-US" baseline="-25000" dirty="0">
+              <a:solidFill>
+                <a:srgbClr val="ED7D31"/>
+              </a:solidFill>
+              <a:latin typeface="Segoe Condensed" panose="020B0606040200020203" pitchFamily="34" charset="0"/>
+            </a:endParaRPr>
+          </a:p>
+        </p:txBody>
+      </p:sp>
+      <p:sp>
+        <p:nvSpPr>
+          <p:cNvPr id="15" name="TextBox 14">
+            <a:extLst>
+              <a:ext uri="{FF2B5EF4-FFF2-40B4-BE49-F238E27FC236}">
+                <a16:creationId xmlns:a16="http://schemas.microsoft.com/office/drawing/2014/main" id="{A009C137-2D8E-5198-9DB1-E575BBF78A98}"/>
+              </a:ext>
+            </a:extLst>
+          </p:cNvPr>
+          <p:cNvSpPr txBox="1"/>
+          <p:nvPr/>
+        </p:nvSpPr>
+        <p:spPr>
+          <a:xfrm>
+            <a:off x="1034715" y="2728844"/>
+            <a:ext cx="2956296" cy="523220"/>
+          </a:xfrm>
+          <a:prstGeom prst="rect">
+            <a:avLst/>
+          </a:prstGeom>
+          <a:noFill/>
+        </p:spPr>
+        <p:txBody>
+          <a:bodyPr wrap="square" rtlCol="0">
+            <a:spAutoFit/>
+          </a:bodyPr>
+          <a:lstStyle/>
+          <a:p>
+            <a:pPr algn="r"/>
+            <a:r>
+              <a:rPr lang="en-US" b="1" dirty="0">
+                <a:solidFill>
+                  <a:srgbClr val="ED7D31"/>
+                </a:solidFill>
+                <a:latin typeface="Segoe Condensed" panose="020B0606040200020203" pitchFamily="34" charset="0"/>
+              </a:rPr>
+              <a:t>A5</a:t>
+            </a:r>
+            <a:br>
+              <a:rPr lang="en-US" b="1" dirty="0">
+                <a:solidFill>
+                  <a:srgbClr val="ED7D31"/>
+                </a:solidFill>
+                <a:latin typeface="Segoe Condensed" panose="020B0606040200020203" pitchFamily="34" charset="0"/>
+              </a:rPr>
+            </a:br>
+            <a:r>
+              <a:rPr lang="en-US" sz="1000" dirty="0">
+                <a:solidFill>
+                  <a:srgbClr val="ED7D31"/>
+                </a:solidFill>
+                <a:latin typeface="Segoe Condensed" panose="020B0606040200020203" pitchFamily="34" charset="0"/>
+              </a:rPr>
+              <a:t>Input Range: 0-1023</a:t>
+            </a:r>
+            <a:endParaRPr lang="en-US" sz="1000" b="1" baseline="-25000" dirty="0">
+              <a:solidFill>
+                <a:srgbClr val="ED7D31"/>
+              </a:solidFill>
+              <a:latin typeface="Segoe Condensed" panose="020B0606040200020203" pitchFamily="34" charset="0"/>
+            </a:endParaRPr>
+          </a:p>
+        </p:txBody>
+      </p:sp>
+      <p:sp>
+        <p:nvSpPr>
+          <p:cNvPr id="16" name="TextBox 15">
+            <a:extLst>
+              <a:ext uri="{FF2B5EF4-FFF2-40B4-BE49-F238E27FC236}">
+                <a16:creationId xmlns:a16="http://schemas.microsoft.com/office/drawing/2014/main" id="{7E183980-C87C-1833-83D7-8C923AC2EEE5}"/>
+              </a:ext>
+            </a:extLst>
+          </p:cNvPr>
+          <p:cNvSpPr txBox="1"/>
+          <p:nvPr/>
+        </p:nvSpPr>
+        <p:spPr>
+          <a:xfrm>
+            <a:off x="689019" y="4179824"/>
+            <a:ext cx="3315359" cy="523220"/>
+          </a:xfrm>
+          <a:prstGeom prst="rect">
+            <a:avLst/>
+          </a:prstGeom>
+          <a:noFill/>
+        </p:spPr>
+        <p:txBody>
+          <a:bodyPr wrap="square" rtlCol="0">
+            <a:spAutoFit/>
+          </a:bodyPr>
+          <a:lstStyle/>
+          <a:p>
+            <a:pPr algn="r"/>
+            <a:r>
+              <a:rPr lang="en-US" b="1" dirty="0">
+                <a:solidFill>
+                  <a:srgbClr val="ED7D31"/>
+                </a:solidFill>
+                <a:latin typeface="Segoe Condensed" panose="020B0606040200020203" pitchFamily="34" charset="0"/>
+              </a:rPr>
+              <a:t>A6</a:t>
+            </a:r>
+            <a:br>
+              <a:rPr lang="en-US" dirty="0">
+                <a:solidFill>
+                  <a:srgbClr val="ED7D31"/>
+                </a:solidFill>
+                <a:latin typeface="Segoe Condensed" panose="020B0606040200020203" pitchFamily="34" charset="0"/>
+              </a:rPr>
+            </a:br>
+            <a:r>
+              <a:rPr lang="en-US" sz="1000" dirty="0">
+                <a:solidFill>
+                  <a:srgbClr val="ED7D31"/>
+                </a:solidFill>
+                <a:latin typeface="Segoe Condensed" panose="020B0606040200020203" pitchFamily="34" charset="0"/>
+              </a:rPr>
+              <a:t>Input Range: 0-1023</a:t>
+            </a:r>
+            <a:endParaRPr lang="en-US" sz="1000" b="1" baseline="-25000" dirty="0">
+              <a:solidFill>
+                <a:srgbClr val="ED7D31"/>
+              </a:solidFill>
+              <a:latin typeface="Segoe Condensed" panose="020B0606040200020203" pitchFamily="34" charset="0"/>
+            </a:endParaRPr>
+          </a:p>
+        </p:txBody>
+      </p:sp>
+      <p:sp>
+        <p:nvSpPr>
+          <p:cNvPr id="17" name="TextBox 16">
+            <a:extLst>
+              <a:ext uri="{FF2B5EF4-FFF2-40B4-BE49-F238E27FC236}">
+                <a16:creationId xmlns:a16="http://schemas.microsoft.com/office/drawing/2014/main" id="{F93DF608-1E8F-2925-A3B9-51D48302AD0A}"/>
+              </a:ext>
+            </a:extLst>
+          </p:cNvPr>
+          <p:cNvSpPr txBox="1"/>
+          <p:nvPr/>
+        </p:nvSpPr>
+        <p:spPr>
+          <a:xfrm>
+            <a:off x="1076416" y="4891647"/>
+            <a:ext cx="3315359" cy="523220"/>
+          </a:xfrm>
+          <a:prstGeom prst="rect">
+            <a:avLst/>
+          </a:prstGeom>
+          <a:noFill/>
+        </p:spPr>
+        <p:txBody>
+          <a:bodyPr wrap="square" rtlCol="0">
+            <a:spAutoFit/>
+          </a:bodyPr>
+          <a:lstStyle/>
+          <a:p>
+            <a:pPr algn="r"/>
+            <a:r>
+              <a:rPr lang="en-US" b="1" dirty="0">
+                <a:solidFill>
+                  <a:srgbClr val="ED7D31"/>
+                </a:solidFill>
+                <a:latin typeface="Segoe Condensed" panose="020B0606040200020203" pitchFamily="34" charset="0"/>
+              </a:rPr>
+              <a:t>A7</a:t>
+            </a:r>
+            <a:br>
+              <a:rPr lang="en-US" b="1" dirty="0">
+                <a:solidFill>
+                  <a:srgbClr val="ED7D31"/>
+                </a:solidFill>
+                <a:latin typeface="Segoe Condensed" panose="020B0606040200020203" pitchFamily="34" charset="0"/>
+              </a:rPr>
+            </a:br>
+            <a:r>
+              <a:rPr lang="en-US" sz="1000" dirty="0">
+                <a:solidFill>
+                  <a:srgbClr val="ED7D31"/>
+                </a:solidFill>
+                <a:latin typeface="Segoe Condensed" panose="020B0606040200020203" pitchFamily="34" charset="0"/>
+              </a:rPr>
+              <a:t>Input Range: 0-1023</a:t>
+            </a:r>
+            <a:endParaRPr lang="en-US" sz="1000" baseline="-25000" dirty="0">
+              <a:solidFill>
+                <a:srgbClr val="ED7D31"/>
+              </a:solidFill>
+              <a:latin typeface="Segoe Condensed" panose="020B0606040200020203" pitchFamily="34" charset="0"/>
+            </a:endParaRPr>
+          </a:p>
+        </p:txBody>
+      </p:sp>
+      <p:sp>
+        <p:nvSpPr>
+          <p:cNvPr id="18" name="Freeform: Shape 17">
+            <a:extLst>
+              <a:ext uri="{FF2B5EF4-FFF2-40B4-BE49-F238E27FC236}">
+                <a16:creationId xmlns:a16="http://schemas.microsoft.com/office/drawing/2014/main" id="{F1004E5F-3BB4-2EA9-A5E3-8A0BA5C655E2}"/>
+              </a:ext>
+            </a:extLst>
+          </p:cNvPr>
+          <p:cNvSpPr/>
+          <p:nvPr/>
+        </p:nvSpPr>
+        <p:spPr>
+          <a:xfrm rot="10800000" flipV="1">
+            <a:off x="7727274" y="2873687"/>
+            <a:ext cx="517429" cy="225638"/>
+          </a:xfrm>
+          <a:custGeom>
+            <a:avLst/>
+            <a:gdLst>
+              <a:gd name="connsiteX0" fmla="*/ 1835888 w 1835888"/>
+              <a:gd name="connsiteY0" fmla="*/ 311888 h 311888"/>
+              <a:gd name="connsiteX1" fmla="*/ 1524000 w 1835888"/>
+              <a:gd name="connsiteY1" fmla="*/ 0 h 311888"/>
+              <a:gd name="connsiteX2" fmla="*/ 0 w 1835888"/>
+              <a:gd name="connsiteY2" fmla="*/ 0 h 311888"/>
+            </a:gdLst>
+            <a:ahLst/>
+            <a:cxnLst>
+              <a:cxn ang="0">
+                <a:pos x="connsiteX0" y="connsiteY0"/>
+              </a:cxn>
+              <a:cxn ang="0">
+                <a:pos x="connsiteX1" y="connsiteY1"/>
+              </a:cxn>
+              <a:cxn ang="0">
+                <a:pos x="connsiteX2" y="connsiteY2"/>
+              </a:cxn>
+            </a:cxnLst>
+            <a:rect l="l" t="t" r="r" b="b"/>
+            <a:pathLst>
+              <a:path w="1835888" h="311888">
+                <a:moveTo>
+                  <a:pt x="1835888" y="311888"/>
+                </a:moveTo>
+                <a:lnTo>
+                  <a:pt x="1524000" y="0"/>
+                </a:lnTo>
+                <a:lnTo>
+                  <a:pt x="0" y="0"/>
+                </a:lnTo>
+              </a:path>
+            </a:pathLst>
+          </a:custGeom>
+          <a:noFill/>
+          <a:ln>
+            <a:solidFill>
+              <a:srgbClr val="ED7D31"/>
+            </a:solidFill>
+            <a:headEnd type="oval" w="med" len="med"/>
+            <a:tailEnd type="none" w="med" len="med"/>
+          </a:ln>
+        </p:spPr>
+        <p:style>
+          <a:lnRef idx="2">
+            <a:schemeClr val="accent1">
+              <a:shade val="50000"/>
+            </a:schemeClr>
+          </a:lnRef>
+          <a:fillRef idx="1">
+            <a:schemeClr val="accent1"/>
+          </a:fillRef>
+          <a:effectRef idx="0">
+            <a:schemeClr val="accent1"/>
+          </a:effectRef>
+          <a:fontRef idx="minor">
+            <a:schemeClr val="lt1"/>
+          </a:fontRef>
+        </p:style>
+        <p:txBody>
+          <a:bodyPr rtlCol="0" anchor="ctr"/>
+          <a:lstStyle/>
+          <a:p>
+            <a:pPr algn="ctr"/>
+            <a:endParaRPr lang="en-US">
+              <a:solidFill>
+                <a:srgbClr val="ED7D31"/>
+              </a:solidFill>
+            </a:endParaRPr>
+          </a:p>
+        </p:txBody>
+      </p:sp>
+      <p:sp>
+        <p:nvSpPr>
+          <p:cNvPr id="20" name="TextBox 19">
+            <a:extLst>
+              <a:ext uri="{FF2B5EF4-FFF2-40B4-BE49-F238E27FC236}">
+                <a16:creationId xmlns:a16="http://schemas.microsoft.com/office/drawing/2014/main" id="{F6AC9CB0-E374-CC9C-00F3-A3159C3A3CA3}"/>
+              </a:ext>
+            </a:extLst>
+          </p:cNvPr>
+          <p:cNvSpPr txBox="1"/>
+          <p:nvPr/>
+        </p:nvSpPr>
+        <p:spPr>
+          <a:xfrm>
+            <a:off x="3181359" y="1161195"/>
+            <a:ext cx="5692188" cy="523220"/>
+          </a:xfrm>
+          <a:prstGeom prst="rect">
+            <a:avLst/>
+          </a:prstGeom>
+          <a:noFill/>
+        </p:spPr>
+        <p:txBody>
+          <a:bodyPr wrap="square" rtlCol="0">
+            <a:spAutoFit/>
+          </a:bodyPr>
+          <a:lstStyle/>
+          <a:p>
+            <a:pPr algn="ctr"/>
+            <a:r>
+              <a:rPr lang="en-US" sz="1400" dirty="0">
+                <a:solidFill>
+                  <a:schemeClr val="tx1">
+                    <a:lumMod val="75000"/>
+                    <a:lumOff val="25000"/>
+                  </a:schemeClr>
+                </a:solidFill>
+                <a:latin typeface="Segoe Condensed" panose="020B0606040200020203" pitchFamily="34" charset="0"/>
+              </a:rPr>
+              <a:t>In MakeCode, you can use A1-A7 as analog input, which converts a voltage to a number between 0-1023 (using a 10-bit ADC)</a:t>
+            </a:r>
+          </a:p>
+        </p:txBody>
+      </p:sp>
+    </p:spTree>
+    <p:extLst>
+      <p:ext uri="{BB962C8B-B14F-4D97-AF65-F5344CB8AC3E}">
+        <p14:creationId xmlns:p14="http://schemas.microsoft.com/office/powerpoint/2010/main" val="54495071"/>
+      </p:ext>
+    </p:extLst>
+  </p:cSld>
+  <p:clrMapOvr>
+    <a:masterClrMapping/>
+  </p:clrMapOvr>
+</p:sld>
+</file>
+
+<file path=ppt/slides/slide12.xml><?xml version="1.0" encoding="utf-8"?>
 <p:sld xmlns:a="http://schemas.openxmlformats.org/drawingml/2006/main" xmlns:r="http://schemas.openxmlformats.org/officeDocument/2006/relationships" xmlns:p="http://schemas.openxmlformats.org/presentationml/2006/main">
   <p:cSld>
     <p:spTree>
@@ -9742,7 +12240,7 @@
 </p:sld>
 </file>
 
-<file path=ppt/slides/slide12.xml><?xml version="1.0" encoding="utf-8"?>
+<file path=ppt/slides/slide13.xml><?xml version="1.0" encoding="utf-8"?>
 <p:sld xmlns:a="http://schemas.openxmlformats.org/drawingml/2006/main" xmlns:r="http://schemas.openxmlformats.org/officeDocument/2006/relationships" xmlns:p="http://schemas.openxmlformats.org/presentationml/2006/main">
   <p:cSld>
     <p:spTree>
@@ -13711,7 +16209,7 @@
 </p:sld>
 </file>
 
-<file path=ppt/slides/slide13.xml><?xml version="1.0" encoding="utf-8"?>
+<file path=ppt/slides/slide14.xml><?xml version="1.0" encoding="utf-8"?>
 <p:sld xmlns:a="http://schemas.openxmlformats.org/drawingml/2006/main" xmlns:r="http://schemas.openxmlformats.org/officeDocument/2006/relationships" xmlns:p="http://schemas.openxmlformats.org/presentationml/2006/main">
   <p:cSld>
     <p:spTree>
@@ -15636,7 +18134,7 @@
 </p:sld>
 </file>
 
-<file path=ppt/slides/slide14.xml><?xml version="1.0" encoding="utf-8"?>
+<file path=ppt/slides/slide15.xml><?xml version="1.0" encoding="utf-8"?>
 <p:sld xmlns:a="http://schemas.openxmlformats.org/drawingml/2006/main" xmlns:r="http://schemas.openxmlformats.org/officeDocument/2006/relationships" xmlns:p="http://schemas.openxmlformats.org/presentationml/2006/main">
   <p:cSld>
     <p:spTree>
@@ -17073,7 +19571,7 @@
                 </a:solidFill>
                 <a:latin typeface="Segoe Condensed" panose="020B0606040200020203" pitchFamily="34" charset="0"/>
               </a:rPr>
-              <a:t>All I/O pads can be used as digital I/O and analog input (12-bit ADC). All but A0 can be used for capacitive touch. Each pad is 3.3V and can provide up to ~20mA of current.</a:t>
+              <a:t>All I/O pads can be used as digital I/O and analog input (10-bit ADC). All but A0 can be used for capacitive touch. Each pad is 3.3V and can provide up to ~20mA of current.</a:t>
             </a:r>
           </a:p>
         </p:txBody>
@@ -18421,7 +20919,7 @@
 </p:sld>
 </file>
 
-<file path=ppt/slides/slide15.xml><?xml version="1.0" encoding="utf-8"?>
+<file path=ppt/slides/slide16.xml><?xml version="1.0" encoding="utf-8"?>
 <p:sld xmlns:a="http://schemas.openxmlformats.org/drawingml/2006/main" xmlns:r="http://schemas.openxmlformats.org/officeDocument/2006/relationships" xmlns:p="http://schemas.openxmlformats.org/presentationml/2006/main">
   <p:cSld>
     <p:spTree>
@@ -20863,7 +23361,7 @@
 </p:sld>
 </file>
 
-<file path=ppt/slides/slide16.xml><?xml version="1.0" encoding="utf-8"?>
+<file path=ppt/slides/slide17.xml><?xml version="1.0" encoding="utf-8"?>
 <p:sld xmlns:a="http://schemas.openxmlformats.org/drawingml/2006/main" xmlns:r="http://schemas.openxmlformats.org/officeDocument/2006/relationships" xmlns:p="http://schemas.openxmlformats.org/presentationml/2006/main">
   <p:cSld>
     <p:spTree>

</xml_diff>

<commit_message>
added more cpx circuit diagrams
</commit_message>
<xml_diff>
--- a/cpx/CPX.pptx
+++ b/cpx/CPX.pptx
@@ -5,7 +5,7 @@
     <p:sldMasterId id="2147483648" r:id="rId1"/>
   </p:sldMasterIdLst>
   <p:notesMasterIdLst>
-    <p:notesMasterId r:id="rId19"/>
+    <p:notesMasterId r:id="rId20"/>
   </p:notesMasterIdLst>
   <p:sldIdLst>
     <p:sldId id="256" r:id="rId2"/>
@@ -18,13 +18,14 @@
     <p:sldId id="261" r:id="rId9"/>
     <p:sldId id="265" r:id="rId10"/>
     <p:sldId id="268" r:id="rId11"/>
-    <p:sldId id="272" r:id="rId12"/>
-    <p:sldId id="266" r:id="rId13"/>
-    <p:sldId id="270" r:id="rId14"/>
-    <p:sldId id="267" r:id="rId15"/>
-    <p:sldId id="269" r:id="rId16"/>
-    <p:sldId id="271" r:id="rId17"/>
-    <p:sldId id="264" r:id="rId18"/>
+    <p:sldId id="273" r:id="rId12"/>
+    <p:sldId id="272" r:id="rId13"/>
+    <p:sldId id="266" r:id="rId14"/>
+    <p:sldId id="270" r:id="rId15"/>
+    <p:sldId id="267" r:id="rId16"/>
+    <p:sldId id="269" r:id="rId17"/>
+    <p:sldId id="271" r:id="rId18"/>
+    <p:sldId id="264" r:id="rId19"/>
   </p:sldIdLst>
   <p:sldSz cx="12192000" cy="6858000"/>
   <p:notesSz cx="6858000" cy="9144000"/>
@@ -644,7 +645,7 @@
     </p:spTree>
     <p:extLst>
       <p:ext uri="{BB962C8B-B14F-4D97-AF65-F5344CB8AC3E}">
-        <p14:creationId xmlns:p14="http://schemas.microsoft.com/office/powerpoint/2010/main" val="1657849380"/>
+        <p14:creationId xmlns:p14="http://schemas.microsoft.com/office/powerpoint/2010/main" val="1138593247"/>
       </p:ext>
     </p:extLst>
   </p:cSld>
@@ -703,15 +704,6 @@
               <a:t>https://learn.adafruit.com/adafruit-circuit-playground-express/guided-tour</a:t>
             </a:r>
           </a:p>
-          <a:p>
-            <a:endParaRPr lang="en-US" dirty="0"/>
-          </a:p>
-          <a:p>
-            <a:r>
-              <a:rPr lang="en-US" dirty="0"/>
-              <a:t>https://learn.adafruit.com/adafruit-circuit-playground-express/pinouts</a:t>
-            </a:r>
-          </a:p>
         </p:txBody>
       </p:sp>
       <p:sp>
@@ -740,7 +732,7 @@
     </p:spTree>
     <p:extLst>
       <p:ext uri="{BB962C8B-B14F-4D97-AF65-F5344CB8AC3E}">
-        <p14:creationId xmlns:p14="http://schemas.microsoft.com/office/powerpoint/2010/main" val="495886665"/>
+        <p14:creationId xmlns:p14="http://schemas.microsoft.com/office/powerpoint/2010/main" val="1657849380"/>
       </p:ext>
     </p:extLst>
   </p:cSld>
@@ -799,6 +791,15 @@
               <a:t>https://learn.adafruit.com/adafruit-circuit-playground-express/guided-tour</a:t>
             </a:r>
           </a:p>
+          <a:p>
+            <a:endParaRPr lang="en-US" dirty="0"/>
+          </a:p>
+          <a:p>
+            <a:r>
+              <a:rPr lang="en-US" dirty="0"/>
+              <a:t>https://learn.adafruit.com/adafruit-circuit-playground-express/pinouts</a:t>
+            </a:r>
+          </a:p>
         </p:txBody>
       </p:sp>
       <p:sp>
@@ -827,7 +828,7 @@
     </p:spTree>
     <p:extLst>
       <p:ext uri="{BB962C8B-B14F-4D97-AF65-F5344CB8AC3E}">
-        <p14:creationId xmlns:p14="http://schemas.microsoft.com/office/powerpoint/2010/main" val="4036427155"/>
+        <p14:creationId xmlns:p14="http://schemas.microsoft.com/office/powerpoint/2010/main" val="495886665"/>
       </p:ext>
     </p:extLst>
   </p:cSld>
@@ -914,7 +915,7 @@
     </p:spTree>
     <p:extLst>
       <p:ext uri="{BB962C8B-B14F-4D97-AF65-F5344CB8AC3E}">
-        <p14:creationId xmlns:p14="http://schemas.microsoft.com/office/powerpoint/2010/main" val="2830599142"/>
+        <p14:creationId xmlns:p14="http://schemas.microsoft.com/office/powerpoint/2010/main" val="4036427155"/>
       </p:ext>
     </p:extLst>
   </p:cSld>
@@ -970,7 +971,7 @@
           <a:p>
             <a:r>
               <a:rPr lang="en-US" dirty="0"/>
-              <a:t>https://krisswanson.blog/2017/05/05/circuit-circuit-a-makey-makey-like-setup-for-the-adafruit-circuit-playground/</a:t>
+              <a:t>https://learn.adafruit.com/adafruit-circuit-playground-express/guided-tour</a:t>
             </a:r>
           </a:p>
         </p:txBody>
@@ -993,6 +994,93 @@
             <a:fld id="{71596CF9-A975-4239-BDE0-B84240AD6B4E}" type="slidenum">
               <a:rPr lang="en-US" smtClean="0"/>
               <a:t>17</a:t>
+            </a:fld>
+            <a:endParaRPr lang="en-US"/>
+          </a:p>
+        </p:txBody>
+      </p:sp>
+    </p:spTree>
+    <p:extLst>
+      <p:ext uri="{BB962C8B-B14F-4D97-AF65-F5344CB8AC3E}">
+        <p14:creationId xmlns:p14="http://schemas.microsoft.com/office/powerpoint/2010/main" val="2830599142"/>
+      </p:ext>
+    </p:extLst>
+  </p:cSld>
+  <p:clrMapOvr>
+    <a:masterClrMapping/>
+  </p:clrMapOvr>
+</p:notes>
+</file>
+
+<file path=ppt/notesSlides/notesSlide15.xml><?xml version="1.0" encoding="utf-8"?>
+<p:notes xmlns:a="http://schemas.openxmlformats.org/drawingml/2006/main" xmlns:r="http://schemas.openxmlformats.org/officeDocument/2006/relationships" xmlns:p="http://schemas.openxmlformats.org/presentationml/2006/main">
+  <p:cSld>
+    <p:spTree>
+      <p:nvGrpSpPr>
+        <p:cNvPr id="1" name=""/>
+        <p:cNvGrpSpPr/>
+        <p:nvPr/>
+      </p:nvGrpSpPr>
+      <p:grpSpPr>
+        <a:xfrm>
+          <a:off x="0" y="0"/>
+          <a:ext cx="0" cy="0"/>
+          <a:chOff x="0" y="0"/>
+          <a:chExt cx="0" cy="0"/>
+        </a:xfrm>
+      </p:grpSpPr>
+      <p:sp>
+        <p:nvSpPr>
+          <p:cNvPr id="2" name="Slide Image Placeholder 1"/>
+          <p:cNvSpPr>
+            <a:spLocks noGrp="1" noRot="1" noChangeAspect="1"/>
+          </p:cNvSpPr>
+          <p:nvPr>
+            <p:ph type="sldImg"/>
+          </p:nvPr>
+        </p:nvSpPr>
+        <p:spPr/>
+      </p:sp>
+      <p:sp>
+        <p:nvSpPr>
+          <p:cNvPr id="3" name="Notes Placeholder 2"/>
+          <p:cNvSpPr>
+            <a:spLocks noGrp="1"/>
+          </p:cNvSpPr>
+          <p:nvPr>
+            <p:ph type="body" idx="1"/>
+          </p:nvPr>
+        </p:nvSpPr>
+        <p:spPr/>
+        <p:txBody>
+          <a:bodyPr/>
+          <a:lstStyle/>
+          <a:p>
+            <a:r>
+              <a:rPr lang="en-US" dirty="0"/>
+              <a:t>https://krisswanson.blog/2017/05/05/circuit-circuit-a-makey-makey-like-setup-for-the-adafruit-circuit-playground/</a:t>
+            </a:r>
+          </a:p>
+        </p:txBody>
+      </p:sp>
+      <p:sp>
+        <p:nvSpPr>
+          <p:cNvPr id="4" name="Slide Number Placeholder 3"/>
+          <p:cNvSpPr>
+            <a:spLocks noGrp="1"/>
+          </p:cNvSpPr>
+          <p:nvPr>
+            <p:ph type="sldNum" sz="quarter" idx="5"/>
+          </p:nvPr>
+        </p:nvSpPr>
+        <p:spPr/>
+        <p:txBody>
+          <a:bodyPr/>
+          <a:lstStyle/>
+          <a:p>
+            <a:fld id="{71596CF9-A975-4239-BDE0-B84240AD6B4E}" type="slidenum">
+              <a:rPr lang="en-US" smtClean="0"/>
+              <a:t>18</a:t>
             </a:fld>
             <a:endParaRPr lang="en-US"/>
           </a:p>
@@ -1610,7 +1698,7 @@
     </p:spTree>
     <p:extLst>
       <p:ext uri="{BB962C8B-B14F-4D97-AF65-F5344CB8AC3E}">
-        <p14:creationId xmlns:p14="http://schemas.microsoft.com/office/powerpoint/2010/main" val="52787969"/>
+        <p14:creationId xmlns:p14="http://schemas.microsoft.com/office/powerpoint/2010/main" val="85376074"/>
       </p:ext>
     </p:extLst>
   </p:cSld>
@@ -1697,7 +1785,7 @@
     </p:spTree>
     <p:extLst>
       <p:ext uri="{BB962C8B-B14F-4D97-AF65-F5344CB8AC3E}">
-        <p14:creationId xmlns:p14="http://schemas.microsoft.com/office/powerpoint/2010/main" val="1138593247"/>
+        <p14:creationId xmlns:p14="http://schemas.microsoft.com/office/powerpoint/2010/main" val="52787969"/>
       </p:ext>
     </p:extLst>
   </p:cSld>
@@ -7598,6 +7686,83 @@
 </file>
 
 <file path=ppt/slides/slide11.xml><?xml version="1.0" encoding="utf-8"?>
+<p:sld xmlns:a="http://schemas.openxmlformats.org/drawingml/2006/main" xmlns:r="http://schemas.openxmlformats.org/officeDocument/2006/relationships" xmlns:p="http://schemas.openxmlformats.org/presentationml/2006/main">
+  <p:cSld>
+    <p:spTree>
+      <p:nvGrpSpPr>
+        <p:cNvPr id="1" name=""/>
+        <p:cNvGrpSpPr/>
+        <p:nvPr/>
+      </p:nvGrpSpPr>
+      <p:grpSpPr>
+        <a:xfrm>
+          <a:off x="0" y="0"/>
+          <a:ext cx="0" cy="0"/>
+          <a:chOff x="0" y="0"/>
+          <a:chExt cx="0" cy="0"/>
+        </a:xfrm>
+      </p:grpSpPr>
+      <p:pic>
+        <p:nvPicPr>
+          <p:cNvPr id="44" name="Picture 4">
+            <a:extLst>
+              <a:ext uri="{FF2B5EF4-FFF2-40B4-BE49-F238E27FC236}">
+                <a16:creationId xmlns:a16="http://schemas.microsoft.com/office/drawing/2014/main" id="{DD2F5E64-EE01-40F6-BFD3-EE21CED1CDED}"/>
+              </a:ext>
+            </a:extLst>
+          </p:cNvPr>
+          <p:cNvPicPr>
+            <a:picLocks noChangeAspect="1" noChangeArrowheads="1"/>
+          </p:cNvPicPr>
+          <p:nvPr/>
+        </p:nvPicPr>
+        <p:blipFill>
+          <a:blip r:embed="rId3">
+            <a:extLst>
+              <a:ext uri="{28A0092B-C50C-407E-A947-70E740481C1C}">
+                <a14:useLocalDpi xmlns:a14="http://schemas.microsoft.com/office/drawing/2010/main" val="0"/>
+              </a:ext>
+            </a:extLst>
+          </a:blip>
+          <a:srcRect/>
+          <a:stretch>
+            <a:fillRect/>
+          </a:stretch>
+        </p:blipFill>
+        <p:spPr bwMode="auto">
+          <a:xfrm>
+            <a:off x="3877452" y="1485560"/>
+            <a:ext cx="4406986" cy="4406986"/>
+          </a:xfrm>
+          <a:prstGeom prst="rect">
+            <a:avLst/>
+          </a:prstGeom>
+          <a:noFill/>
+          <a:extLst>
+            <a:ext uri="{909E8E84-426E-40DD-AFC4-6F175D3DCCD1}">
+              <a14:hiddenFill xmlns:a14="http://schemas.microsoft.com/office/drawing/2010/main">
+                <a:solidFill>
+                  <a:srgbClr val="FFFFFF"/>
+                </a:solidFill>
+              </a14:hiddenFill>
+            </a:ext>
+          </a:extLst>
+        </p:spPr>
+      </p:pic>
+    </p:spTree>
+    <p:extLst>
+      <p:ext uri="{BB962C8B-B14F-4D97-AF65-F5344CB8AC3E}">
+        <p14:creationId xmlns:p14="http://schemas.microsoft.com/office/powerpoint/2010/main" val="3103615688"/>
+      </p:ext>
+    </p:extLst>
+  </p:cSld>
+  <p:clrMapOvr>
+    <a:masterClrMapping/>
+  </p:clrMapOvr>
+</p:sld>
+</file>
+
+<file path=ppt/slides/slide12.xml><?xml version="1.0" encoding="utf-8"?>
 <p:sld xmlns:a="http://schemas.openxmlformats.org/drawingml/2006/main" xmlns:r="http://schemas.openxmlformats.org/officeDocument/2006/relationships" xmlns:p="http://schemas.openxmlformats.org/presentationml/2006/main">
   <p:cSld>
     <p:spTree>
@@ -10007,7 +10172,7 @@
 </p:sld>
 </file>
 
-<file path=ppt/slides/slide12.xml><?xml version="1.0" encoding="utf-8"?>
+<file path=ppt/slides/slide13.xml><?xml version="1.0" encoding="utf-8"?>
 <p:sld xmlns:a="http://schemas.openxmlformats.org/drawingml/2006/main" xmlns:r="http://schemas.openxmlformats.org/officeDocument/2006/relationships" xmlns:p="http://schemas.openxmlformats.org/presentationml/2006/main">
   <p:cSld>
     <p:spTree>
@@ -12240,7 +12405,7 @@
 </p:sld>
 </file>
 
-<file path=ppt/slides/slide13.xml><?xml version="1.0" encoding="utf-8"?>
+<file path=ppt/slides/slide14.xml><?xml version="1.0" encoding="utf-8"?>
 <p:sld xmlns:a="http://schemas.openxmlformats.org/drawingml/2006/main" xmlns:r="http://schemas.openxmlformats.org/officeDocument/2006/relationships" xmlns:p="http://schemas.openxmlformats.org/presentationml/2006/main">
   <p:cSld>
     <p:spTree>
@@ -16209,7 +16374,7 @@
 </p:sld>
 </file>
 
-<file path=ppt/slides/slide14.xml><?xml version="1.0" encoding="utf-8"?>
+<file path=ppt/slides/slide15.xml><?xml version="1.0" encoding="utf-8"?>
 <p:sld xmlns:a="http://schemas.openxmlformats.org/drawingml/2006/main" xmlns:r="http://schemas.openxmlformats.org/officeDocument/2006/relationships" xmlns:p="http://schemas.openxmlformats.org/presentationml/2006/main">
   <p:cSld>
     <p:spTree>
@@ -18134,7 +18299,7 @@
 </p:sld>
 </file>
 
-<file path=ppt/slides/slide15.xml><?xml version="1.0" encoding="utf-8"?>
+<file path=ppt/slides/slide16.xml><?xml version="1.0" encoding="utf-8"?>
 <p:sld xmlns:a="http://schemas.openxmlformats.org/drawingml/2006/main" xmlns:r="http://schemas.openxmlformats.org/officeDocument/2006/relationships" xmlns:p="http://schemas.openxmlformats.org/presentationml/2006/main">
   <p:cSld>
     <p:spTree>
@@ -20919,7 +21084,7 @@
 </p:sld>
 </file>
 
-<file path=ppt/slides/slide16.xml><?xml version="1.0" encoding="utf-8"?>
+<file path=ppt/slides/slide17.xml><?xml version="1.0" encoding="utf-8"?>
 <p:sld xmlns:a="http://schemas.openxmlformats.org/drawingml/2006/main" xmlns:r="http://schemas.openxmlformats.org/officeDocument/2006/relationships" xmlns:p="http://schemas.openxmlformats.org/presentationml/2006/main">
   <p:cSld>
     <p:spTree>
@@ -23361,7 +23526,7 @@
 </p:sld>
 </file>
 
-<file path=ppt/slides/slide17.xml><?xml version="1.0" encoding="utf-8"?>
+<file path=ppt/slides/slide18.xml><?xml version="1.0" encoding="utf-8"?>
 <p:sld xmlns:a="http://schemas.openxmlformats.org/drawingml/2006/main" xmlns:r="http://schemas.openxmlformats.org/officeDocument/2006/relationships" xmlns:p="http://schemas.openxmlformats.org/presentationml/2006/main">
   <p:cSld>
     <p:spTree>

</xml_diff>